<commit_message>
update week 4 review game
</commit_message>
<xml_diff>
--- a/Week04/Review.pptx
+++ b/Week04/Review.pptx
@@ -223,7 +223,7 @@
           <a:p>
             <a:fld id="{19104133-B5B0-4351-8158-4F0E5EB1E2BF}" type="datetimeFigureOut">
               <a:rPr lang="en-US" smtClean="0"/>
-              <a:t>9/17/2020</a:t>
+              <a:t>10/20/2020</a:t>
             </a:fld>
             <a:endParaRPr lang="en-US"/>
           </a:p>
@@ -1234,7 +1234,7 @@
             <a:fld id="{1C2D31DE-C454-491C-B5C3-F097855E3DF7}" type="datetime4">
               <a:rPr lang="en-US" smtClean="0"/>
               <a:pPr/>
-              <a:t>September 17, 2020</a:t>
+              <a:t>October 20, 2020</a:t>
             </a:fld>
             <a:endParaRPr lang="en-US" dirty="0"/>
           </a:p>
@@ -4634,7 +4634,7 @@
           <a:p>
             <a:fld id="{5958763E-B898-436D-883D-03711491D54A}" type="datetimeFigureOut">
               <a:rPr lang="en-US" smtClean="0"/>
-              <a:t>9/17/2020</a:t>
+              <a:t>10/20/2020</a:t>
             </a:fld>
             <a:endParaRPr lang="en-US"/>
           </a:p>
@@ -4835,7 +4835,7 @@
           <a:p>
             <a:fld id="{5958763E-B898-436D-883D-03711491D54A}" type="datetimeFigureOut">
               <a:rPr lang="en-US" smtClean="0"/>
-              <a:t>9/17/2020</a:t>
+              <a:t>10/20/2020</a:t>
             </a:fld>
             <a:endParaRPr lang="en-US"/>
           </a:p>
@@ -5092,7 +5092,7 @@
           <a:p>
             <a:fld id="{5958763E-B898-436D-883D-03711491D54A}" type="datetimeFigureOut">
               <a:rPr lang="en-US" smtClean="0"/>
-              <a:t>9/17/2020</a:t>
+              <a:t>10/20/2020</a:t>
             </a:fld>
             <a:endParaRPr lang="en-US"/>
           </a:p>
@@ -5447,7 +5447,7 @@
           <a:p>
             <a:fld id="{5958763E-B898-436D-883D-03711491D54A}" type="datetimeFigureOut">
               <a:rPr lang="en-US" smtClean="0"/>
-              <a:t>9/17/2020</a:t>
+              <a:t>10/20/2020</a:t>
             </a:fld>
             <a:endParaRPr lang="en-US"/>
           </a:p>
@@ -5870,7 +5870,7 @@
           <a:p>
             <a:fld id="{5958763E-B898-436D-883D-03711491D54A}" type="datetimeFigureOut">
               <a:rPr lang="en-US" smtClean="0"/>
-              <a:t>9/17/2020</a:t>
+              <a:t>10/20/2020</a:t>
             </a:fld>
             <a:endParaRPr lang="en-US"/>
           </a:p>
@@ -6378,7 +6378,7 @@
           <a:p>
             <a:fld id="{5958763E-B898-436D-883D-03711491D54A}" type="datetimeFigureOut">
               <a:rPr lang="en-US" smtClean="0"/>
-              <a:t>9/17/2020</a:t>
+              <a:t>10/20/2020</a:t>
             </a:fld>
             <a:endParaRPr lang="en-US"/>
           </a:p>
@@ -6836,7 +6836,7 @@
           <a:p>
             <a:fld id="{5958763E-B898-436D-883D-03711491D54A}" type="datetimeFigureOut">
               <a:rPr lang="en-US" smtClean="0"/>
-              <a:t>9/17/2020</a:t>
+              <a:t>10/20/2020</a:t>
             </a:fld>
             <a:endParaRPr lang="en-US"/>
           </a:p>
@@ -7454,7 +7454,7 @@
           <a:p>
             <a:fld id="{5958763E-B898-436D-883D-03711491D54A}" type="datetimeFigureOut">
               <a:rPr lang="en-US" smtClean="0"/>
-              <a:t>9/17/2020</a:t>
+              <a:t>10/20/2020</a:t>
             </a:fld>
             <a:endParaRPr lang="en-US"/>
           </a:p>
@@ -8232,7 +8232,7 @@
           <a:p>
             <a:fld id="{5958763E-B898-436D-883D-03711491D54A}" type="datetimeFigureOut">
               <a:rPr lang="en-US" smtClean="0"/>
-              <a:t>9/17/2020</a:t>
+              <a:t>10/20/2020</a:t>
             </a:fld>
             <a:endParaRPr lang="en-US"/>
           </a:p>
@@ -8343,7 +8343,7 @@
           <a:p>
             <a:fld id="{5958763E-B898-436D-883D-03711491D54A}" type="datetimeFigureOut">
               <a:rPr lang="en-US" smtClean="0"/>
-              <a:t>9/17/2020</a:t>
+              <a:t>10/20/2020</a:t>
             </a:fld>
             <a:endParaRPr lang="en-US"/>
           </a:p>
@@ -8685,7 +8685,7 @@
             <a:fld id="{1C2D31DE-C454-491C-B5C3-F097855E3DF7}" type="datetime4">
               <a:rPr lang="en-US" smtClean="0"/>
               <a:pPr/>
-              <a:t>September 17, 2020</a:t>
+              <a:t>October 20, 2020</a:t>
             </a:fld>
             <a:endParaRPr lang="en-US" dirty="0"/>
           </a:p>
@@ -11845,7 +11845,7 @@
           <a:p>
             <a:fld id="{5958763E-B898-436D-883D-03711491D54A}" type="datetimeFigureOut">
               <a:rPr lang="en-US" smtClean="0"/>
-              <a:t>9/17/2020</a:t>
+              <a:t>10/20/2020</a:t>
             </a:fld>
             <a:endParaRPr lang="en-US"/>
           </a:p>
@@ -11976,7 +11976,7 @@
           <a:p>
             <a:fld id="{5958763E-B898-436D-883D-03711491D54A}" type="datetimeFigureOut">
               <a:rPr lang="en-US" smtClean="0"/>
-              <a:t>9/17/2020</a:t>
+              <a:t>10/20/2020</a:t>
             </a:fld>
             <a:endParaRPr lang="en-US"/>
           </a:p>
@@ -12107,7 +12107,7 @@
           <a:p>
             <a:fld id="{5958763E-B898-436D-883D-03711491D54A}" type="datetimeFigureOut">
               <a:rPr lang="en-US" smtClean="0"/>
-              <a:t>9/17/2020</a:t>
+              <a:t>10/20/2020</a:t>
             </a:fld>
             <a:endParaRPr lang="en-US"/>
           </a:p>
@@ -12238,7 +12238,7 @@
           <a:p>
             <a:fld id="{5958763E-B898-436D-883D-03711491D54A}" type="datetimeFigureOut">
               <a:rPr lang="en-US" smtClean="0"/>
-              <a:t>9/17/2020</a:t>
+              <a:t>10/20/2020</a:t>
             </a:fld>
             <a:endParaRPr lang="en-US"/>
           </a:p>
@@ -12369,7 +12369,7 @@
           <a:p>
             <a:fld id="{5958763E-B898-436D-883D-03711491D54A}" type="datetimeFigureOut">
               <a:rPr lang="en-US" smtClean="0"/>
-              <a:t>9/17/2020</a:t>
+              <a:t>10/20/2020</a:t>
             </a:fld>
             <a:endParaRPr lang="en-US"/>
           </a:p>
@@ -12500,7 +12500,7 @@
           <a:p>
             <a:fld id="{5958763E-B898-436D-883D-03711491D54A}" type="datetimeFigureOut">
               <a:rPr lang="en-US" smtClean="0"/>
-              <a:t>9/17/2020</a:t>
+              <a:t>10/20/2020</a:t>
             </a:fld>
             <a:endParaRPr lang="en-US"/>
           </a:p>
@@ -12631,7 +12631,7 @@
           <a:p>
             <a:fld id="{5958763E-B898-436D-883D-03711491D54A}" type="datetimeFigureOut">
               <a:rPr lang="en-US" smtClean="0"/>
-              <a:t>9/17/2020</a:t>
+              <a:t>10/20/2020</a:t>
             </a:fld>
             <a:endParaRPr lang="en-US"/>
           </a:p>
@@ -12762,7 +12762,7 @@
           <a:p>
             <a:fld id="{5958763E-B898-436D-883D-03711491D54A}" type="datetimeFigureOut">
               <a:rPr lang="en-US" smtClean="0"/>
-              <a:t>9/17/2020</a:t>
+              <a:t>10/20/2020</a:t>
             </a:fld>
             <a:endParaRPr lang="en-US"/>
           </a:p>
@@ -12902,7 +12902,7 @@
           <a:p>
             <a:fld id="{5958763E-B898-436D-883D-03711491D54A}" type="datetimeFigureOut">
               <a:rPr lang="en-US" smtClean="0"/>
-              <a:t>9/17/2020</a:t>
+              <a:t>10/20/2020</a:t>
             </a:fld>
             <a:endParaRPr lang="en-US"/>
           </a:p>
@@ -16263,7 +16263,7 @@
             <a:fld id="{1C2D31DE-C454-491C-B5C3-F097855E3DF7}" type="datetime4">
               <a:rPr lang="en-US" smtClean="0"/>
               <a:pPr/>
-              <a:t>September 17, 2020</a:t>
+              <a:t>October 20, 2020</a:t>
             </a:fld>
             <a:endParaRPr lang="en-US" dirty="0"/>
           </a:p>
@@ -28508,7 +28508,7 @@
           <a:p>
             <a:fld id="{5958763E-B898-436D-883D-03711491D54A}" type="datetimeFigureOut">
               <a:rPr lang="en-US" smtClean="0"/>
-              <a:t>9/17/2020</a:t>
+              <a:t>10/20/2020</a:t>
             </a:fld>
             <a:endParaRPr lang="en-US"/>
           </a:p>
@@ -28917,7 +28917,7 @@
           <a:p>
             <a:fld id="{5958763E-B898-436D-883D-03711491D54A}" type="datetimeFigureOut">
               <a:rPr lang="en-US" smtClean="0"/>
-              <a:t>9/17/2020</a:t>
+              <a:t>10/20/2020</a:t>
             </a:fld>
             <a:endParaRPr lang="en-US"/>
           </a:p>
@@ -29218,7 +29218,7 @@
           <a:p>
             <a:fld id="{5958763E-B898-436D-883D-03711491D54A}" type="datetimeFigureOut">
               <a:rPr lang="en-US" smtClean="0"/>
-              <a:t>9/17/2020</a:t>
+              <a:t>10/20/2020</a:t>
             </a:fld>
             <a:endParaRPr lang="en-US"/>
           </a:p>
@@ -29426,7 +29426,7 @@
           <a:p>
             <a:fld id="{5958763E-B898-436D-883D-03711491D54A}" type="datetimeFigureOut">
               <a:rPr lang="en-US" smtClean="0"/>
-              <a:t>9/17/2020</a:t>
+              <a:t>10/20/2020</a:t>
             </a:fld>
             <a:endParaRPr lang="en-US"/>
           </a:p>
@@ -29694,7 +29694,7 @@
           <a:p>
             <a:fld id="{5958763E-B898-436D-883D-03711491D54A}" type="datetimeFigureOut">
               <a:rPr lang="en-US" smtClean="0"/>
-              <a:t>9/17/2020</a:t>
+              <a:t>10/20/2020</a:t>
             </a:fld>
             <a:endParaRPr lang="en-US"/>
           </a:p>
@@ -30211,7 +30211,7 @@
           <a:p>
             <a:fld id="{5958763E-B898-436D-883D-03711491D54A}" type="datetimeFigureOut">
               <a:rPr lang="en-US" smtClean="0"/>
-              <a:t>9/17/2020</a:t>
+              <a:t>10/20/2020</a:t>
             </a:fld>
             <a:endParaRPr lang="en-US"/>
           </a:p>
@@ -30699,7 +30699,7 @@
           <a:p>
             <a:fld id="{5958763E-B898-436D-883D-03711491D54A}" type="datetimeFigureOut">
               <a:rPr lang="en-US" smtClean="0"/>
-              <a:t>9/17/2020</a:t>
+              <a:t>10/20/2020</a:t>
             </a:fld>
             <a:endParaRPr lang="en-US"/>
           </a:p>
@@ -31525,7 +31525,7 @@
           <a:p>
             <a:fld id="{5958763E-B898-436D-883D-03711491D54A}" type="datetimeFigureOut">
               <a:rPr lang="en-US" smtClean="0"/>
-              <a:t>9/17/2020</a:t>
+              <a:t>10/20/2020</a:t>
             </a:fld>
             <a:endParaRPr lang="en-US"/>
           </a:p>
@@ -31733,7 +31733,7 @@
           <a:p>
             <a:fld id="{5958763E-B898-436D-883D-03711491D54A}" type="datetimeFigureOut">
               <a:rPr lang="en-US" smtClean="0"/>
-              <a:t>9/17/2020</a:t>
+              <a:t>10/20/2020</a:t>
             </a:fld>
             <a:endParaRPr lang="en-US"/>
           </a:p>
@@ -32075,7 +32075,7 @@
           <a:p>
             <a:fld id="{5958763E-B898-436D-883D-03711491D54A}" type="datetimeFigureOut">
               <a:rPr lang="en-US" smtClean="0"/>
-              <a:t>9/17/2020</a:t>
+              <a:t>10/20/2020</a:t>
             </a:fld>
             <a:endParaRPr lang="en-US"/>
           </a:p>
@@ -32312,7 +32312,7 @@
           <a:p>
             <a:fld id="{5958763E-B898-436D-883D-03711491D54A}" type="datetimeFigureOut">
               <a:rPr lang="en-US" smtClean="0"/>
-              <a:t>9/17/2020</a:t>
+              <a:t>10/20/2020</a:t>
             </a:fld>
             <a:endParaRPr lang="en-US"/>
           </a:p>
@@ -32563,7 +32563,7 @@
           <a:p>
             <a:fld id="{5958763E-B898-436D-883D-03711491D54A}" type="datetimeFigureOut">
               <a:rPr lang="en-US" smtClean="0"/>
-              <a:t>9/17/2020</a:t>
+              <a:t>10/20/2020</a:t>
             </a:fld>
             <a:endParaRPr lang="en-US"/>
           </a:p>
@@ -36167,8 +36167,16 @@
           <a:lstStyle/>
           <a:p>
             <a:r>
+              <a:rPr lang="en-US" dirty="0"/>
+              <a:t>5</a:t>
+            </a:r>
+            <a:r>
               <a:rPr lang="en-US" dirty="0" smtClean="0"/>
-              <a:t>Define a function named </a:t>
+              <a:t>. Define </a:t>
+            </a:r>
+            <a:r>
+              <a:rPr lang="en-US" dirty="0" smtClean="0"/>
+              <a:t>a function named </a:t>
             </a:r>
             <a:r>
               <a:rPr lang="en-US" sz="4000" cap="none" dirty="0" err="1" smtClean="0">
@@ -36661,7 +36669,7 @@
         <p:spPr>
           <a:xfrm>
             <a:off x="495300" y="1257300"/>
-            <a:ext cx="10726654" cy="3850285"/>
+            <a:ext cx="11327781" cy="3850285"/>
           </a:xfrm>
           <a:prstGeom prst="rect">
             <a:avLst/>
@@ -36683,12 +36691,28 @@
               </a:spcAft>
             </a:pPr>
             <a:r>
+              <a:rPr lang="en-US" sz="6000" dirty="0">
+                <a:solidFill>
+                  <a:schemeClr val="bg1"/>
+                </a:solidFill>
+              </a:rPr>
+              <a:t>6</a:t>
+            </a:r>
+            <a:r>
               <a:rPr lang="en-US" sz="6000" dirty="0" smtClean="0">
                 <a:solidFill>
                   <a:schemeClr val="bg1"/>
                 </a:solidFill>
               </a:rPr>
-              <a:t>Create a </a:t>
+              <a:t>. Create </a:t>
+            </a:r>
+            <a:r>
+              <a:rPr lang="en-US" sz="6000" dirty="0" smtClean="0">
+                <a:solidFill>
+                  <a:schemeClr val="bg1"/>
+                </a:solidFill>
+              </a:rPr>
+              <a:t>a </a:t>
             </a:r>
             <a:r>
               <a:rPr lang="en-US" sz="6000" i="1" dirty="0" smtClean="0">
@@ -36757,11 +36781,6 @@
               </a:rPr>
               <a:t>”</a:t>
             </a:r>
-            <a:endParaRPr lang="en-US" sz="6000" dirty="0" smtClean="0">
-              <a:solidFill>
-                <a:schemeClr val="bg1"/>
-              </a:solidFill>
-            </a:endParaRPr>
           </a:p>
           <a:p>
             <a:pPr marL="857250" indent="-857250">
@@ -36807,12 +36826,6 @@
               </a:rPr>
               <a:t>fun</a:t>
             </a:r>
-            <a:endParaRPr lang="en-US" sz="6000" b="1" dirty="0" smtClean="0">
-              <a:solidFill>
-                <a:schemeClr val="bg1"/>
-              </a:solidFill>
-              <a:latin typeface="Consolas" panose="020B0609020204030204" pitchFamily="49" charset="0"/>
-            </a:endParaRPr>
           </a:p>
         </p:txBody>
       </p:sp>
@@ -37049,7 +37062,7 @@
           <a:p>
             <a:r>
               <a:rPr lang="en-US" dirty="0" smtClean="0"/>
-              <a:t>Tie-breaker</a:t>
+              <a:t>7. Tie-breaker</a:t>
             </a:r>
             <a:endParaRPr lang="en-US" dirty="0"/>
           </a:p>
@@ -37646,11 +37659,7 @@
             </a:r>
             <a:r>
               <a:rPr lang="en-US" sz="4400" dirty="0" smtClean="0"/>
-              <a:t>HTML </a:t>
-            </a:r>
-            <a:r>
-              <a:rPr lang="en-US" sz="4400" dirty="0" smtClean="0"/>
-              <a:t>🙂</a:t>
+              <a:t>HTML 🙂</a:t>
             </a:r>
             <a:endParaRPr lang="en-US" sz="4400" dirty="0"/>
           </a:p>
@@ -37724,7 +37733,11 @@
           <a:p>
             <a:r>
               <a:rPr lang="en-US" dirty="0" smtClean="0"/>
-              <a:t>Write the correct </a:t>
+              <a:t>1. Write </a:t>
+            </a:r>
+            <a:r>
+              <a:rPr lang="en-US" dirty="0" smtClean="0"/>
+              <a:t>the correct </a:t>
             </a:r>
             <a:r>
               <a:rPr lang="en-US" sz="4000" cap="none" dirty="0" smtClean="0">
@@ -38124,7 +38137,11 @@
           <a:p>
             <a:r>
               <a:rPr lang="en-US" dirty="0" smtClean="0"/>
-              <a:t>What do buttons </a:t>
+              <a:t>2. What </a:t>
+            </a:r>
+            <a:r>
+              <a:rPr lang="en-US" dirty="0" smtClean="0"/>
+              <a:t>do buttons </a:t>
             </a:r>
             <a:r>
               <a:rPr lang="en-US" i="1" dirty="0" smtClean="0"/>
@@ -38283,10 +38300,18 @@
           <a:lstStyle/>
           <a:p>
             <a:r>
-              <a:rPr lang="en-US" dirty="0" smtClean="0"/>
-              <a:t>What keyword is needed to define  a function?</a:t>
+              <a:rPr lang="en-US" sz="2800" dirty="0" smtClean="0"/>
+              <a:t>3. What </a:t>
             </a:r>
-            <a:endParaRPr lang="en-US" dirty="0"/>
+            <a:r>
+              <a:rPr lang="en-US" sz="2800" dirty="0" smtClean="0"/>
+              <a:t>keyword is needed to define  a </a:t>
+            </a:r>
+            <a:r>
+              <a:rPr lang="en-US" sz="2800" dirty="0" smtClean="0"/>
+              <a:t>function?</a:t>
+            </a:r>
+            <a:endParaRPr lang="en-US" sz="2800" dirty="0"/>
           </a:p>
         </p:txBody>
       </p:sp>
@@ -38316,7 +38341,7 @@
                   <a:srgbClr val="0000FF"/>
                 </a:solidFill>
               </a:rPr>
-              <a:t>&lt;here&gt;</a:t>
+              <a:t>???</a:t>
             </a:r>
             <a:r>
               <a:rPr lang="en-US" sz="4800" dirty="0">
@@ -38668,8 +38693,16 @@
           <a:lstStyle/>
           <a:p>
             <a:r>
+              <a:rPr lang="en-US" dirty="0"/>
+              <a:t>4</a:t>
+            </a:r>
+            <a:r>
               <a:rPr lang="en-US" dirty="0" smtClean="0"/>
-              <a:t>Write the proper attribute to call a function named </a:t>
+              <a:t>. Write </a:t>
+            </a:r>
+            <a:r>
+              <a:rPr lang="en-US" dirty="0" smtClean="0"/>
+              <a:t>the proper attribute to call a function named </a:t>
             </a:r>
             <a:r>
               <a:rPr lang="en-US" sz="4000" cap="none" dirty="0" err="1" smtClean="0">

</xml_diff>

<commit_message>
f22 week 4 updates
</commit_message>
<xml_diff>
--- a/Week04/Review.pptx
+++ b/Week04/Review.pptx
@@ -223,7 +223,7 @@
           <a:p>
             <a:fld id="{19104133-B5B0-4351-8158-4F0E5EB1E2BF}" type="datetimeFigureOut">
               <a:rPr lang="en-US" smtClean="0"/>
-              <a:t>10/20/2020</a:t>
+              <a:t>9/6/2022</a:t>
             </a:fld>
             <a:endParaRPr lang="en-US"/>
           </a:p>
@@ -287,38 +287,37 @@
           <a:p>
             <a:pPr lvl="0"/>
             <a:r>
-              <a:rPr lang="en-US" smtClean="0"/>
+              <a:rPr lang="en-US"/>
               <a:t>Edit Master text styles</a:t>
             </a:r>
           </a:p>
           <a:p>
             <a:pPr lvl="1"/>
             <a:r>
-              <a:rPr lang="en-US" smtClean="0"/>
+              <a:rPr lang="en-US"/>
               <a:t>Second level</a:t>
             </a:r>
           </a:p>
           <a:p>
             <a:pPr lvl="2"/>
             <a:r>
-              <a:rPr lang="en-US" smtClean="0"/>
+              <a:rPr lang="en-US"/>
               <a:t>Third level</a:t>
             </a:r>
           </a:p>
           <a:p>
             <a:pPr lvl="3"/>
             <a:r>
-              <a:rPr lang="en-US" smtClean="0"/>
+              <a:rPr lang="en-US"/>
               <a:t>Fourth level</a:t>
             </a:r>
           </a:p>
           <a:p>
             <a:pPr lvl="4"/>
             <a:r>
-              <a:rPr lang="en-US" smtClean="0"/>
+              <a:rPr lang="en-US"/>
               <a:t>Fifth level</a:t>
             </a:r>
-            <a:endParaRPr lang="en-US"/>
           </a:p>
         </p:txBody>
       </p:sp>
@@ -536,18 +535,17 @@
           <a:lstStyle/>
           <a:p>
             <a:r>
-              <a:rPr lang="en-US" dirty="0" smtClean="0"/>
+              <a:rPr lang="en-US" dirty="0"/>
               <a:t>&lt;script </a:t>
             </a:r>
             <a:r>
-              <a:rPr lang="en-US" dirty="0" err="1" smtClean="0"/>
+              <a:rPr lang="en-US" dirty="0" err="1"/>
               <a:t>src</a:t>
             </a:r>
             <a:r>
-              <a:rPr lang="en-US" dirty="0" smtClean="0"/>
+              <a:rPr lang="en-US" dirty="0"/>
               <a:t>=“script.js”&gt;&lt;/script&gt;</a:t>
             </a:r>
-            <a:endParaRPr lang="en-US" dirty="0"/>
           </a:p>
         </p:txBody>
       </p:sp>
@@ -632,7 +630,7 @@
           <a:lstStyle/>
           <a:p>
             <a:r>
-              <a:rPr lang="en-US" dirty="0" smtClean="0"/>
+              <a:rPr lang="en-US" dirty="0"/>
               <a:t>Need:</a:t>
             </a:r>
           </a:p>
@@ -642,11 +640,11 @@
               <a:buChar char="-"/>
             </a:pPr>
             <a:r>
-              <a:rPr lang="en-US" b="1" baseline="0" dirty="0" err="1" smtClean="0"/>
+              <a:rPr lang="en-US" b="1" baseline="0" dirty="0" err="1"/>
               <a:t>onclick</a:t>
             </a:r>
             <a:r>
-              <a:rPr lang="en-US" b="0" baseline="0" dirty="0" smtClean="0"/>
+              <a:rPr lang="en-US" b="0" baseline="0" dirty="0"/>
               <a:t> attribute name</a:t>
             </a:r>
           </a:p>
@@ -656,7 +654,7 @@
               <a:buChar char="-"/>
             </a:pPr>
             <a:r>
-              <a:rPr lang="en-US" b="0" baseline="0" dirty="0" smtClean="0"/>
+              <a:rPr lang="en-US" b="0" baseline="0" dirty="0"/>
               <a:t>Equals sign</a:t>
             </a:r>
           </a:p>
@@ -666,7 +664,7 @@
               <a:buChar char="-"/>
             </a:pPr>
             <a:r>
-              <a:rPr lang="en-US" b="0" baseline="0" dirty="0" smtClean="0"/>
+              <a:rPr lang="en-US" b="0" baseline="0" dirty="0"/>
               <a:t>Double quotes</a:t>
             </a:r>
           </a:p>
@@ -676,11 +674,11 @@
               <a:buChar char="-"/>
             </a:pPr>
             <a:r>
-              <a:rPr lang="en-US" b="1" baseline="0" dirty="0" err="1" smtClean="0"/>
+              <a:rPr lang="en-US" b="1" baseline="0" dirty="0" err="1"/>
               <a:t>SendMessage</a:t>
             </a:r>
             <a:r>
-              <a:rPr lang="en-US" b="0" baseline="0" dirty="0" smtClean="0"/>
+              <a:rPr lang="en-US" b="0" baseline="0" dirty="0"/>
               <a:t> function name</a:t>
             </a:r>
           </a:p>
@@ -690,7 +688,7 @@
               <a:buChar char="-"/>
             </a:pPr>
             <a:r>
-              <a:rPr lang="en-US" b="0" baseline="0" dirty="0" smtClean="0"/>
+              <a:rPr lang="en-US" b="0" baseline="0" dirty="0"/>
               <a:t>Parentheses</a:t>
             </a:r>
           </a:p>
@@ -700,7 +698,7 @@
               <a:buChar char="-"/>
             </a:pPr>
             <a:r>
-              <a:rPr lang="en-US" b="0" baseline="0" dirty="0" smtClean="0"/>
+              <a:rPr lang="en-US" b="0" baseline="0" dirty="0"/>
               <a:t>End double quotes</a:t>
             </a:r>
           </a:p>
@@ -709,7 +707,7 @@
               <a:buFontTx/>
               <a:buChar char="-"/>
             </a:pPr>
-            <a:endParaRPr lang="en-US" b="0" baseline="0" dirty="0" smtClean="0"/>
+            <a:endParaRPr lang="en-US" b="0" baseline="0" dirty="0"/>
           </a:p>
           <a:p>
             <a:pPr marL="0" indent="0">
@@ -717,7 +715,7 @@
               <a:buNone/>
             </a:pPr>
             <a:r>
-              <a:rPr lang="en-US" b="0" baseline="0" dirty="0" smtClean="0"/>
+              <a:rPr lang="en-US" b="0" baseline="0" dirty="0"/>
               <a:t>Also note the other parts of the button:</a:t>
             </a:r>
           </a:p>
@@ -727,11 +725,11 @@
               <a:buChar char="-"/>
             </a:pPr>
             <a:r>
-              <a:rPr lang="en-US" b="1" baseline="0" dirty="0" smtClean="0"/>
+              <a:rPr lang="en-US" b="1" baseline="0" dirty="0"/>
               <a:t>button</a:t>
             </a:r>
             <a:r>
-              <a:rPr lang="en-US" b="0" baseline="0" dirty="0" smtClean="0"/>
+              <a:rPr lang="en-US" b="0" baseline="0" dirty="0"/>
               <a:t> tag (opening and closing)</a:t>
             </a:r>
           </a:p>
@@ -741,10 +739,10 @@
               <a:buChar char="-"/>
             </a:pPr>
             <a:r>
-              <a:rPr lang="en-US" b="0" baseline="0" dirty="0" smtClean="0"/>
+              <a:rPr lang="en-US" b="0" baseline="0" dirty="0"/>
               <a:t>Button text (“Click me!”)</a:t>
             </a:r>
-            <a:endParaRPr lang="en-US" b="1" baseline="0" dirty="0" smtClean="0"/>
+            <a:endParaRPr lang="en-US" b="1" baseline="0" dirty="0"/>
           </a:p>
         </p:txBody>
       </p:sp>
@@ -997,11 +995,11 @@
           <a:lstStyle/>
           <a:p>
             <a:r>
-              <a:rPr lang="en-US" dirty="0" smtClean="0"/>
+              <a:rPr lang="en-US" dirty="0"/>
               <a:t>If necessary, the first to</a:t>
             </a:r>
             <a:r>
-              <a:rPr lang="en-US" baseline="0" dirty="0" smtClean="0"/>
+              <a:rPr lang="en-US" baseline="0" dirty="0"/>
               <a:t> answer the tie-breaker question wins.</a:t>
             </a:r>
             <a:endParaRPr lang="en-US" dirty="0"/>
@@ -1184,15 +1182,7 @@
           <a:p>
             <a:r>
               <a:rPr lang="en-US" dirty="0"/>
-              <a:t>Click to edit Master </a:t>
-            </a:r>
-            <a:r>
-              <a:rPr lang="en-US" dirty="0" smtClean="0"/>
-              <a:t>subtitle </a:t>
-            </a:r>
-            <a:r>
-              <a:rPr lang="en-US" dirty="0"/>
-              <a:t>style</a:t>
+              <a:t>Click to edit Master subtitle style</a:t>
             </a:r>
           </a:p>
         </p:txBody>
@@ -1234,7 +1224,7 @@
             <a:fld id="{1C2D31DE-C454-491C-B5C3-F097855E3DF7}" type="datetime4">
               <a:rPr lang="en-US" smtClean="0"/>
               <a:pPr/>
-              <a:t>October 20, 2020</a:t>
+              <a:t>September 6, 2022</a:t>
             </a:fld>
             <a:endParaRPr lang="en-US" dirty="0"/>
           </a:p>
@@ -4308,17 +4298,16 @@
           <a:p>
             <a:pPr lvl="0"/>
             <a:r>
-              <a:rPr lang="en-US" dirty="0" smtClean="0"/>
+              <a:rPr lang="en-US" dirty="0"/>
               <a:t>Presenter Name</a:t>
             </a:r>
             <a:br>
-              <a:rPr lang="en-US" dirty="0" smtClean="0"/>
+              <a:rPr lang="en-US" dirty="0"/>
             </a:br>
             <a:r>
-              <a:rPr lang="en-US" dirty="0" smtClean="0"/>
+              <a:rPr lang="en-US" dirty="0"/>
               <a:t>Presenter Title</a:t>
             </a:r>
-            <a:endParaRPr lang="en-US" dirty="0"/>
           </a:p>
         </p:txBody>
       </p:sp>
@@ -4335,13 +4324,6 @@
   <p:transition>
     <p:fade/>
   </p:transition>
-  <p:timing>
-    <p:tnLst>
-      <p:par>
-        <p:cTn id="1" dur="indefinite" restart="never" nodeType="tmRoot"/>
-      </p:par>
-    </p:tnLst>
-  </p:timing>
   <p:hf sldNum="0" hdr="0" ftr="0"/>
 </p:sldLayout>
 </file>
@@ -4634,7 +4616,7 @@
           <a:p>
             <a:fld id="{5958763E-B898-436D-883D-03711491D54A}" type="datetimeFigureOut">
               <a:rPr lang="en-US" smtClean="0"/>
-              <a:t>10/20/2020</a:t>
+              <a:t>9/6/2022</a:t>
             </a:fld>
             <a:endParaRPr lang="en-US"/>
           </a:p>
@@ -4707,13 +4689,6 @@
   <p:transition>
     <p:fade/>
   </p:transition>
-  <p:timing>
-    <p:tnLst>
-      <p:par>
-        <p:cTn id="1" dur="indefinite" restart="never" nodeType="tmRoot"/>
-      </p:par>
-    </p:tnLst>
-  </p:timing>
 </p:sldLayout>
 </file>
 
@@ -4762,10 +4737,9 @@
           </a:lstStyle>
           <a:p>
             <a:r>
-              <a:rPr lang="en-US" dirty="0" smtClean="0"/>
+              <a:rPr lang="en-US" dirty="0"/>
               <a:t>Click icon to add picture</a:t>
             </a:r>
-            <a:endParaRPr lang="en-US" dirty="0"/>
           </a:p>
         </p:txBody>
       </p:sp>
@@ -4835,7 +4809,7 @@
           <a:p>
             <a:fld id="{5958763E-B898-436D-883D-03711491D54A}" type="datetimeFigureOut">
               <a:rPr lang="en-US" smtClean="0"/>
-              <a:t>10/20/2020</a:t>
+              <a:t>9/6/2022</a:t>
             </a:fld>
             <a:endParaRPr lang="en-US"/>
           </a:p>
@@ -4908,13 +4882,6 @@
   <p:transition>
     <p:fade/>
   </p:transition>
-  <p:timing>
-    <p:tnLst>
-      <p:par>
-        <p:cTn id="1" dur="indefinite" restart="never" nodeType="tmRoot"/>
-      </p:par>
-    </p:tnLst>
-  </p:timing>
 </p:sldLayout>
 </file>
 
@@ -5092,7 +5059,7 @@
           <a:p>
             <a:fld id="{5958763E-B898-436D-883D-03711491D54A}" type="datetimeFigureOut">
               <a:rPr lang="en-US" smtClean="0"/>
-              <a:t>10/20/2020</a:t>
+              <a:t>9/6/2022</a:t>
             </a:fld>
             <a:endParaRPr lang="en-US"/>
           </a:p>
@@ -5165,13 +5132,6 @@
   <p:transition>
     <p:fade/>
   </p:transition>
-  <p:timing>
-    <p:tnLst>
-      <p:par>
-        <p:cTn id="1" dur="indefinite" restart="never" nodeType="tmRoot"/>
-      </p:par>
-    </p:tnLst>
-  </p:timing>
 </p:sldLayout>
 </file>
 
@@ -5447,7 +5407,7 @@
           <a:p>
             <a:fld id="{5958763E-B898-436D-883D-03711491D54A}" type="datetimeFigureOut">
               <a:rPr lang="en-US" smtClean="0"/>
-              <a:t>10/20/2020</a:t>
+              <a:t>9/6/2022</a:t>
             </a:fld>
             <a:endParaRPr lang="en-US"/>
           </a:p>
@@ -5508,13 +5468,6 @@
   <p:transition>
     <p:fade/>
   </p:transition>
-  <p:timing>
-    <p:tnLst>
-      <p:par>
-        <p:cTn id="1" dur="indefinite" restart="never" nodeType="tmRoot"/>
-      </p:par>
-    </p:tnLst>
-  </p:timing>
 </p:sldLayout>
 </file>
 
@@ -5870,7 +5823,7 @@
           <a:p>
             <a:fld id="{5958763E-B898-436D-883D-03711491D54A}" type="datetimeFigureOut">
               <a:rPr lang="en-US" smtClean="0"/>
-              <a:t>10/20/2020</a:t>
+              <a:t>9/6/2022</a:t>
             </a:fld>
             <a:endParaRPr lang="en-US"/>
           </a:p>
@@ -5931,13 +5884,6 @@
   <p:transition>
     <p:fade/>
   </p:transition>
-  <p:timing>
-    <p:tnLst>
-      <p:par>
-        <p:cTn id="1" dur="indefinite" restart="never" nodeType="tmRoot"/>
-      </p:par>
-    </p:tnLst>
-  </p:timing>
 </p:sldLayout>
 </file>
 
@@ -6378,7 +6324,7 @@
           <a:p>
             <a:fld id="{5958763E-B898-436D-883D-03711491D54A}" type="datetimeFigureOut">
               <a:rPr lang="en-US" smtClean="0"/>
-              <a:t>10/20/2020</a:t>
+              <a:t>9/6/2022</a:t>
             </a:fld>
             <a:endParaRPr lang="en-US"/>
           </a:p>
@@ -6439,13 +6385,6 @@
   <p:transition>
     <p:fade/>
   </p:transition>
-  <p:timing>
-    <p:tnLst>
-      <p:par>
-        <p:cTn id="1" dur="indefinite" restart="never" nodeType="tmRoot"/>
-      </p:par>
-    </p:tnLst>
-  </p:timing>
 </p:sldLayout>
 </file>
 
@@ -6836,7 +6775,7 @@
           <a:p>
             <a:fld id="{5958763E-B898-436D-883D-03711491D54A}" type="datetimeFigureOut">
               <a:rPr lang="en-US" smtClean="0"/>
-              <a:t>10/20/2020</a:t>
+              <a:t>9/6/2022</a:t>
             </a:fld>
             <a:endParaRPr lang="en-US"/>
           </a:p>
@@ -6897,13 +6836,6 @@
   <p:transition>
     <p:fade/>
   </p:transition>
-  <p:timing>
-    <p:tnLst>
-      <p:par>
-        <p:cTn id="1" dur="indefinite" restart="never" nodeType="tmRoot"/>
-      </p:par>
-    </p:tnLst>
-  </p:timing>
 </p:sldLayout>
 </file>
 
@@ -7454,7 +7386,7 @@
           <a:p>
             <a:fld id="{5958763E-B898-436D-883D-03711491D54A}" type="datetimeFigureOut">
               <a:rPr lang="en-US" smtClean="0"/>
-              <a:t>10/20/2020</a:t>
+              <a:t>9/6/2022</a:t>
             </a:fld>
             <a:endParaRPr lang="en-US"/>
           </a:p>
@@ -7515,13 +7447,6 @@
   <p:transition>
     <p:fade/>
   </p:transition>
-  <p:timing>
-    <p:tnLst>
-      <p:par>
-        <p:cTn id="1" dur="indefinite" restart="never" nodeType="tmRoot"/>
-      </p:par>
-    </p:tnLst>
-  </p:timing>
 </p:sldLayout>
 </file>
 
@@ -8232,7 +8157,7 @@
           <a:p>
             <a:fld id="{5958763E-B898-436D-883D-03711491D54A}" type="datetimeFigureOut">
               <a:rPr lang="en-US" smtClean="0"/>
-              <a:t>10/20/2020</a:t>
+              <a:t>9/6/2022</a:t>
             </a:fld>
             <a:endParaRPr lang="en-US"/>
           </a:p>
@@ -8293,13 +8218,6 @@
   <p:transition>
     <p:fade/>
   </p:transition>
-  <p:timing>
-    <p:tnLst>
-      <p:par>
-        <p:cTn id="1" dur="indefinite" restart="never" nodeType="tmRoot"/>
-      </p:par>
-    </p:tnLst>
-  </p:timing>
 </p:sldLayout>
 </file>
 
@@ -8343,7 +8261,7 @@
           <a:p>
             <a:fld id="{5958763E-B898-436D-883D-03711491D54A}" type="datetimeFigureOut">
               <a:rPr lang="en-US" smtClean="0"/>
-              <a:t>10/20/2020</a:t>
+              <a:t>9/6/2022</a:t>
             </a:fld>
             <a:endParaRPr lang="en-US"/>
           </a:p>
@@ -8416,13 +8334,6 @@
   <p:transition>
     <p:fade/>
   </p:transition>
-  <p:timing>
-    <p:tnLst>
-      <p:par>
-        <p:cTn id="1" dur="indefinite" restart="never" nodeType="tmRoot"/>
-      </p:par>
-    </p:tnLst>
-  </p:timing>
 </p:sldLayout>
 </file>
 
@@ -8502,7 +8413,7 @@
                 <a:spcPct val="0"/>
               </a:spcAft>
             </a:pPr>
-            <a:endParaRPr lang="en-US" sz="2400" dirty="0" err="1" smtClean="0">
+            <a:endParaRPr lang="en-US" sz="2400" dirty="0" err="1">
               <a:gradFill>
                 <a:gsLst>
                   <a:gs pos="0">
@@ -8635,15 +8546,7 @@
           <a:p>
             <a:r>
               <a:rPr lang="en-US" dirty="0"/>
-              <a:t>Click to edit Master </a:t>
-            </a:r>
-            <a:r>
-              <a:rPr lang="en-US" dirty="0" smtClean="0"/>
-              <a:t>subtitle </a:t>
-            </a:r>
-            <a:r>
-              <a:rPr lang="en-US" dirty="0"/>
-              <a:t>style</a:t>
+              <a:t>Click to edit Master subtitle style</a:t>
             </a:r>
           </a:p>
         </p:txBody>
@@ -8685,7 +8588,7 @@
             <a:fld id="{1C2D31DE-C454-491C-B5C3-F097855E3DF7}" type="datetime4">
               <a:rPr lang="en-US" smtClean="0"/>
               <a:pPr/>
-              <a:t>October 20, 2020</a:t>
+              <a:t>September 6, 2022</a:t>
             </a:fld>
             <a:endParaRPr lang="en-US" dirty="0"/>
           </a:p>
@@ -11759,17 +11662,16 @@
           <a:p>
             <a:pPr lvl="0"/>
             <a:r>
-              <a:rPr lang="en-US" dirty="0" smtClean="0"/>
+              <a:rPr lang="en-US" dirty="0"/>
               <a:t>Presenter Name</a:t>
             </a:r>
             <a:br>
-              <a:rPr lang="en-US" dirty="0" smtClean="0"/>
+              <a:rPr lang="en-US" dirty="0"/>
             </a:br>
             <a:r>
-              <a:rPr lang="en-US" dirty="0" smtClean="0"/>
+              <a:rPr lang="en-US" dirty="0"/>
               <a:t>Presenter Title</a:t>
             </a:r>
-            <a:endParaRPr lang="en-US" dirty="0"/>
           </a:p>
         </p:txBody>
       </p:sp>
@@ -11786,13 +11688,6 @@
   <p:transition>
     <p:fade/>
   </p:transition>
-  <p:timing>
-    <p:tnLst>
-      <p:par>
-        <p:cTn id="1" dur="indefinite" restart="never" nodeType="tmRoot"/>
-      </p:par>
-    </p:tnLst>
-  </p:timing>
   <p:hf sldNum="0" hdr="0" ftr="0"/>
 </p:sldLayout>
 </file>
@@ -11845,7 +11740,7 @@
           <a:p>
             <a:fld id="{5958763E-B898-436D-883D-03711491D54A}" type="datetimeFigureOut">
               <a:rPr lang="en-US" smtClean="0"/>
-              <a:t>10/20/2020</a:t>
+              <a:t>9/6/2022</a:t>
             </a:fld>
             <a:endParaRPr lang="en-US"/>
           </a:p>
@@ -11918,13 +11813,6 @@
   <p:transition>
     <p:fade/>
   </p:transition>
-  <p:timing>
-    <p:tnLst>
-      <p:par>
-        <p:cTn id="1" dur="indefinite" restart="never" nodeType="tmRoot"/>
-      </p:par>
-    </p:tnLst>
-  </p:timing>
 </p:sldLayout>
 </file>
 
@@ -11976,7 +11864,7 @@
           <a:p>
             <a:fld id="{5958763E-B898-436D-883D-03711491D54A}" type="datetimeFigureOut">
               <a:rPr lang="en-US" smtClean="0"/>
-              <a:t>10/20/2020</a:t>
+              <a:t>9/6/2022</a:t>
             </a:fld>
             <a:endParaRPr lang="en-US"/>
           </a:p>
@@ -12049,13 +11937,6 @@
   <p:transition>
     <p:fade/>
   </p:transition>
-  <p:timing>
-    <p:tnLst>
-      <p:par>
-        <p:cTn id="1" dur="indefinite" restart="never" nodeType="tmRoot"/>
-      </p:par>
-    </p:tnLst>
-  </p:timing>
 </p:sldLayout>
 </file>
 
@@ -12107,7 +11988,7 @@
           <a:p>
             <a:fld id="{5958763E-B898-436D-883D-03711491D54A}" type="datetimeFigureOut">
               <a:rPr lang="en-US" smtClean="0"/>
-              <a:t>10/20/2020</a:t>
+              <a:t>9/6/2022</a:t>
             </a:fld>
             <a:endParaRPr lang="en-US"/>
           </a:p>
@@ -12180,13 +12061,6 @@
   <p:transition>
     <p:fade/>
   </p:transition>
-  <p:timing>
-    <p:tnLst>
-      <p:par>
-        <p:cTn id="1" dur="indefinite" restart="never" nodeType="tmRoot"/>
-      </p:par>
-    </p:tnLst>
-  </p:timing>
 </p:sldLayout>
 </file>
 
@@ -12238,7 +12112,7 @@
           <a:p>
             <a:fld id="{5958763E-B898-436D-883D-03711491D54A}" type="datetimeFigureOut">
               <a:rPr lang="en-US" smtClean="0"/>
-              <a:t>10/20/2020</a:t>
+              <a:t>9/6/2022</a:t>
             </a:fld>
             <a:endParaRPr lang="en-US"/>
           </a:p>
@@ -12311,13 +12185,6 @@
   <p:transition>
     <p:fade/>
   </p:transition>
-  <p:timing>
-    <p:tnLst>
-      <p:par>
-        <p:cTn id="1" dur="indefinite" restart="never" nodeType="tmRoot"/>
-      </p:par>
-    </p:tnLst>
-  </p:timing>
 </p:sldLayout>
 </file>
 
@@ -12369,7 +12236,7 @@
           <a:p>
             <a:fld id="{5958763E-B898-436D-883D-03711491D54A}" type="datetimeFigureOut">
               <a:rPr lang="en-US" smtClean="0"/>
-              <a:t>10/20/2020</a:t>
+              <a:t>9/6/2022</a:t>
             </a:fld>
             <a:endParaRPr lang="en-US"/>
           </a:p>
@@ -12442,13 +12309,6 @@
   <p:transition>
     <p:fade/>
   </p:transition>
-  <p:timing>
-    <p:tnLst>
-      <p:par>
-        <p:cTn id="1" dur="indefinite" restart="never" nodeType="tmRoot"/>
-      </p:par>
-    </p:tnLst>
-  </p:timing>
 </p:sldLayout>
 </file>
 
@@ -12500,7 +12360,7 @@
           <a:p>
             <a:fld id="{5958763E-B898-436D-883D-03711491D54A}" type="datetimeFigureOut">
               <a:rPr lang="en-US" smtClean="0"/>
-              <a:t>10/20/2020</a:t>
+              <a:t>9/6/2022</a:t>
             </a:fld>
             <a:endParaRPr lang="en-US"/>
           </a:p>
@@ -12573,13 +12433,6 @@
   <p:transition>
     <p:fade/>
   </p:transition>
-  <p:timing>
-    <p:tnLst>
-      <p:par>
-        <p:cTn id="1" dur="indefinite" restart="never" nodeType="tmRoot"/>
-      </p:par>
-    </p:tnLst>
-  </p:timing>
 </p:sldLayout>
 </file>
 
@@ -12631,7 +12484,7 @@
           <a:p>
             <a:fld id="{5958763E-B898-436D-883D-03711491D54A}" type="datetimeFigureOut">
               <a:rPr lang="en-US" smtClean="0"/>
-              <a:t>10/20/2020</a:t>
+              <a:t>9/6/2022</a:t>
             </a:fld>
             <a:endParaRPr lang="en-US"/>
           </a:p>
@@ -12704,13 +12557,6 @@
   <p:transition>
     <p:fade/>
   </p:transition>
-  <p:timing>
-    <p:tnLst>
-      <p:par>
-        <p:cTn id="1" dur="indefinite" restart="never" nodeType="tmRoot"/>
-      </p:par>
-    </p:tnLst>
-  </p:timing>
 </p:sldLayout>
 </file>
 
@@ -12762,7 +12608,7 @@
           <a:p>
             <a:fld id="{5958763E-B898-436D-883D-03711491D54A}" type="datetimeFigureOut">
               <a:rPr lang="en-US" smtClean="0"/>
-              <a:t>10/20/2020</a:t>
+              <a:t>9/6/2022</a:t>
             </a:fld>
             <a:endParaRPr lang="en-US"/>
           </a:p>
@@ -12835,13 +12681,6 @@
   <p:transition>
     <p:fade/>
   </p:transition>
-  <p:timing>
-    <p:tnLst>
-      <p:par>
-        <p:cTn id="1" dur="indefinite" restart="never" nodeType="tmRoot"/>
-      </p:par>
-    </p:tnLst>
-  </p:timing>
 </p:sldLayout>
 </file>
 
@@ -12902,7 +12741,7 @@
           <a:p>
             <a:fld id="{5958763E-B898-436D-883D-03711491D54A}" type="datetimeFigureOut">
               <a:rPr lang="en-US" smtClean="0"/>
-              <a:t>10/20/2020</a:t>
+              <a:t>9/6/2022</a:t>
             </a:fld>
             <a:endParaRPr lang="en-US"/>
           </a:p>
@@ -12975,13 +12814,6 @@
   <p:transition>
     <p:fade/>
   </p:transition>
-  <p:timing>
-    <p:tnLst>
-      <p:par>
-        <p:cTn id="1" dur="indefinite" restart="never" nodeType="tmRoot"/>
-      </p:par>
-    </p:tnLst>
-  </p:timing>
 </p:sldLayout>
 </file>
 
@@ -15983,13 +15815,6 @@
   <p:transition>
     <p:fade/>
   </p:transition>
-  <p:timing>
-    <p:tnLst>
-      <p:par>
-        <p:cTn id="1" dur="indefinite" restart="never" nodeType="tmRoot"/>
-      </p:par>
-    </p:tnLst>
-  </p:timing>
 </p:sldLayout>
 </file>
 
@@ -16077,7 +15902,7 @@
                 <a:spcPct val="0"/>
               </a:spcAft>
             </a:pPr>
-            <a:endParaRPr lang="en-US" sz="2400" dirty="0" err="1" smtClean="0">
+            <a:endParaRPr lang="en-US" sz="2400" dirty="0" err="1">
               <a:gradFill>
                 <a:gsLst>
                   <a:gs pos="0">
@@ -16213,15 +16038,7 @@
           <a:p>
             <a:r>
               <a:rPr lang="en-US" dirty="0"/>
-              <a:t>Click to edit Master </a:t>
-            </a:r>
-            <a:r>
-              <a:rPr lang="en-US" dirty="0" smtClean="0"/>
-              <a:t>subtitle </a:t>
-            </a:r>
-            <a:r>
-              <a:rPr lang="en-US" dirty="0"/>
-              <a:t>style</a:t>
+              <a:t>Click to edit Master subtitle style</a:t>
             </a:r>
           </a:p>
         </p:txBody>
@@ -16263,7 +16080,7 @@
             <a:fld id="{1C2D31DE-C454-491C-B5C3-F097855E3DF7}" type="datetime4">
               <a:rPr lang="en-US" smtClean="0"/>
               <a:pPr/>
-              <a:t>October 20, 2020</a:t>
+              <a:t>September 6, 2022</a:t>
             </a:fld>
             <a:endParaRPr lang="en-US" dirty="0"/>
           </a:p>
@@ -19345,17 +19162,16 @@
           <a:p>
             <a:pPr lvl="0"/>
             <a:r>
-              <a:rPr lang="en-US" dirty="0" smtClean="0"/>
+              <a:rPr lang="en-US" dirty="0"/>
               <a:t>Presenter Name</a:t>
             </a:r>
             <a:br>
-              <a:rPr lang="en-US" dirty="0" smtClean="0"/>
+              <a:rPr lang="en-US" dirty="0"/>
             </a:br>
             <a:r>
-              <a:rPr lang="en-US" dirty="0" smtClean="0"/>
+              <a:rPr lang="en-US" dirty="0"/>
               <a:t>Presenter Title</a:t>
             </a:r>
-            <a:endParaRPr lang="en-US" dirty="0"/>
           </a:p>
         </p:txBody>
       </p:sp>
@@ -19372,13 +19188,6 @@
   <p:transition>
     <p:fade/>
   </p:transition>
-  <p:timing>
-    <p:tnLst>
-      <p:par>
-        <p:cTn id="1" dur="indefinite" restart="never" nodeType="tmRoot"/>
-      </p:par>
-    </p:tnLst>
-  </p:timing>
   <p:hf sldNum="0" hdr="0" ftr="0"/>
 </p:sldLayout>
 </file>
@@ -26888,10 +26697,9 @@
           <a:p>
             <a:pPr lvl="0"/>
             <a:r>
-              <a:rPr lang="en-US" dirty="0" smtClean="0"/>
+              <a:rPr lang="en-US" dirty="0"/>
               <a:t>&lt;Call to action&gt;</a:t>
             </a:r>
-            <a:endParaRPr lang="en-US" dirty="0"/>
           </a:p>
         </p:txBody>
       </p:sp>
@@ -28508,7 +28316,7 @@
           <a:p>
             <a:fld id="{5958763E-B898-436D-883D-03711491D54A}" type="datetimeFigureOut">
               <a:rPr lang="en-US" smtClean="0"/>
-              <a:t>10/20/2020</a:t>
+              <a:t>9/6/2022</a:t>
             </a:fld>
             <a:endParaRPr lang="en-US"/>
           </a:p>
@@ -28635,7 +28443,7 @@
                 <a:spcPct val="0"/>
               </a:spcAft>
             </a:pPr>
-            <a:endParaRPr lang="en-US" sz="2400" dirty="0" err="1" smtClean="0">
+            <a:endParaRPr lang="en-US" sz="2400" dirty="0" err="1">
               <a:gradFill>
                 <a:gsLst>
                   <a:gs pos="0">
@@ -28666,13 +28474,6 @@
   <p:transition>
     <p:fade/>
   </p:transition>
-  <p:timing>
-    <p:tnLst>
-      <p:par>
-        <p:cTn id="1" dur="indefinite" restart="never" nodeType="tmRoot"/>
-      </p:par>
-    </p:tnLst>
-  </p:timing>
 </p:sldLayout>
 </file>
 
@@ -28917,7 +28718,7 @@
           <a:p>
             <a:fld id="{5958763E-B898-436D-883D-03711491D54A}" type="datetimeFigureOut">
               <a:rPr lang="en-US" smtClean="0"/>
-              <a:t>10/20/2020</a:t>
+              <a:t>9/6/2022</a:t>
             </a:fld>
             <a:endParaRPr lang="en-US"/>
           </a:p>
@@ -28990,13 +28791,6 @@
   <p:transition>
     <p:fade/>
   </p:transition>
-  <p:timing>
-    <p:tnLst>
-      <p:par>
-        <p:cTn id="1" dur="indefinite" restart="never" nodeType="tmRoot"/>
-      </p:par>
-    </p:tnLst>
-  </p:timing>
 </p:sldLayout>
 </file>
 
@@ -29218,7 +29012,7 @@
           <a:p>
             <a:fld id="{5958763E-B898-436D-883D-03711491D54A}" type="datetimeFigureOut">
               <a:rPr lang="en-US" smtClean="0"/>
-              <a:t>10/20/2020</a:t>
+              <a:t>9/6/2022</a:t>
             </a:fld>
             <a:endParaRPr lang="en-US"/>
           </a:p>
@@ -29291,13 +29085,6 @@
   <p:transition>
     <p:fade/>
   </p:transition>
-  <p:timing>
-    <p:tnLst>
-      <p:par>
-        <p:cTn id="1" dur="indefinite" restart="never" nodeType="tmRoot"/>
-      </p:par>
-    </p:tnLst>
-  </p:timing>
 </p:sldLayout>
 </file>
 
@@ -29426,7 +29213,7 @@
           <a:p>
             <a:fld id="{5958763E-B898-436D-883D-03711491D54A}" type="datetimeFigureOut">
               <a:rPr lang="en-US" smtClean="0"/>
-              <a:t>10/20/2020</a:t>
+              <a:t>9/6/2022</a:t>
             </a:fld>
             <a:endParaRPr lang="en-US"/>
           </a:p>
@@ -29549,13 +29336,6 @@
   <p:transition>
     <p:fade/>
   </p:transition>
-  <p:timing>
-    <p:tnLst>
-      <p:par>
-        <p:cTn id="1" dur="indefinite" restart="never" nodeType="tmRoot"/>
-      </p:par>
-    </p:tnLst>
-  </p:timing>
 </p:sldLayout>
 </file>
 
@@ -29694,7 +29474,7 @@
           <a:p>
             <a:fld id="{5958763E-B898-436D-883D-03711491D54A}" type="datetimeFigureOut">
               <a:rPr lang="en-US" smtClean="0"/>
-              <a:t>10/20/2020</a:t>
+              <a:t>9/6/2022</a:t>
             </a:fld>
             <a:endParaRPr lang="en-US"/>
           </a:p>
@@ -29821,13 +29601,6 @@
   <p:transition>
     <p:fade/>
   </p:transition>
-  <p:timing>
-    <p:tnLst>
-      <p:par>
-        <p:cTn id="1" dur="indefinite" restart="never" nodeType="tmRoot"/>
-      </p:par>
-    </p:tnLst>
-  </p:timing>
 </p:sldLayout>
 </file>
 
@@ -29989,7 +29762,7 @@
                 <a:spcPct val="0"/>
               </a:spcAft>
             </a:pPr>
-            <a:endParaRPr lang="en-US" sz="2400" dirty="0" err="1" smtClean="0">
+            <a:endParaRPr lang="en-US" sz="2400" dirty="0" err="1">
               <a:gradFill>
                 <a:gsLst>
                   <a:gs pos="0">
@@ -30040,10 +29813,9 @@
           </a:lstStyle>
           <a:p>
             <a:r>
-              <a:rPr lang="en-US" dirty="0" smtClean="0"/>
+              <a:rPr lang="en-US" dirty="0"/>
               <a:t>Type “Agenda”</a:t>
             </a:r>
-            <a:endParaRPr lang="en-US" dirty="0"/>
           </a:p>
         </p:txBody>
       </p:sp>
@@ -30167,24 +29939,23 @@
           <a:p>
             <a:pPr lvl="0"/>
             <a:r>
-              <a:rPr lang="en-US" dirty="0" smtClean="0"/>
+              <a:rPr lang="en-US" dirty="0"/>
               <a:t>Item 1</a:t>
             </a:r>
           </a:p>
           <a:p>
             <a:pPr lvl="0"/>
             <a:r>
-              <a:rPr lang="en-US" dirty="0" smtClean="0"/>
+              <a:rPr lang="en-US" dirty="0"/>
               <a:t>Item 2</a:t>
             </a:r>
           </a:p>
           <a:p>
             <a:pPr lvl="0"/>
             <a:r>
-              <a:rPr lang="en-US" dirty="0" smtClean="0"/>
+              <a:rPr lang="en-US" dirty="0"/>
               <a:t>Item 3</a:t>
             </a:r>
-            <a:endParaRPr lang="en-US" dirty="0"/>
           </a:p>
         </p:txBody>
       </p:sp>
@@ -30211,7 +29982,7 @@
           <a:p>
             <a:fld id="{5958763E-B898-436D-883D-03711491D54A}" type="datetimeFigureOut">
               <a:rPr lang="en-US" smtClean="0"/>
-              <a:t>10/20/2020</a:t>
+              <a:t>9/6/2022</a:t>
             </a:fld>
             <a:endParaRPr lang="en-US"/>
           </a:p>
@@ -30318,13 +30089,6 @@
   <p:transition>
     <p:fade/>
   </p:transition>
-  <p:timing>
-    <p:tnLst>
-      <p:par>
-        <p:cTn id="1" dur="indefinite" restart="never" nodeType="tmRoot"/>
-      </p:par>
-    </p:tnLst>
-  </p:timing>
 </p:sldLayout>
 </file>
 
@@ -30486,7 +30250,7 @@
                 <a:spcPct val="0"/>
               </a:spcAft>
             </a:pPr>
-            <a:endParaRPr lang="en-US" sz="2400" dirty="0" err="1" smtClean="0">
+            <a:endParaRPr lang="en-US" sz="2400" dirty="0" err="1">
               <a:gradFill>
                 <a:gsLst>
                   <a:gs pos="0">
@@ -30539,10 +30303,9 @@
           </a:lstStyle>
           <a:p>
             <a:r>
-              <a:rPr lang="en-US" dirty="0" smtClean="0"/>
+              <a:rPr lang="en-US" dirty="0"/>
               <a:t>Notable Quote</a:t>
             </a:r>
-            <a:endParaRPr lang="en-US" dirty="0"/>
           </a:p>
         </p:txBody>
       </p:sp>
@@ -30669,10 +30432,9 @@
           <a:p>
             <a:pPr lvl="0"/>
             <a:r>
-              <a:rPr lang="en-US" dirty="0" smtClean="0"/>
+              <a:rPr lang="en-US" dirty="0"/>
               <a:t>– Attribution</a:t>
             </a:r>
-            <a:endParaRPr lang="en-US" dirty="0"/>
           </a:p>
         </p:txBody>
       </p:sp>
@@ -30699,7 +30461,7 @@
           <a:p>
             <a:fld id="{5958763E-B898-436D-883D-03711491D54A}" type="datetimeFigureOut">
               <a:rPr lang="en-US" smtClean="0"/>
-              <a:t>10/20/2020</a:t>
+              <a:t>9/6/2022</a:t>
             </a:fld>
             <a:endParaRPr lang="en-US"/>
           </a:p>
@@ -31447,13 +31209,6 @@
   <p:transition>
     <p:fade/>
   </p:transition>
-  <p:timing>
-    <p:tnLst>
-      <p:par>
-        <p:cTn id="1" dur="indefinite" restart="never" nodeType="tmRoot"/>
-      </p:par>
-    </p:tnLst>
-  </p:timing>
 </p:sldLayout>
 </file>
 
@@ -31525,7 +31280,7 @@
           <a:p>
             <a:fld id="{5958763E-B898-436D-883D-03711491D54A}" type="datetimeFigureOut">
               <a:rPr lang="en-US" smtClean="0"/>
-              <a:t>10/20/2020</a:t>
+              <a:t>9/6/2022</a:t>
             </a:fld>
             <a:endParaRPr lang="en-US"/>
           </a:p>
@@ -31598,13 +31353,6 @@
   <p:transition>
     <p:fade/>
   </p:transition>
-  <p:timing>
-    <p:tnLst>
-      <p:par>
-        <p:cTn id="1" dur="indefinite" restart="never" nodeType="tmRoot"/>
-      </p:par>
-    </p:tnLst>
-  </p:timing>
 </p:sldLayout>
 </file>
 
@@ -31733,7 +31481,7 @@
           <a:p>
             <a:fld id="{5958763E-B898-436D-883D-03711491D54A}" type="datetimeFigureOut">
               <a:rPr lang="en-US" smtClean="0"/>
-              <a:t>10/20/2020</a:t>
+              <a:t>9/6/2022</a:t>
             </a:fld>
             <a:endParaRPr lang="en-US"/>
           </a:p>
@@ -31856,13 +31604,6 @@
   <p:transition>
     <p:fade/>
   </p:transition>
-  <p:timing>
-    <p:tnLst>
-      <p:par>
-        <p:cTn id="1" dur="indefinite" restart="never" nodeType="tmRoot"/>
-      </p:par>
-    </p:tnLst>
-  </p:timing>
 </p:sldLayout>
 </file>
 
@@ -32075,7 +31816,7 @@
           <a:p>
             <a:fld id="{5958763E-B898-436D-883D-03711491D54A}" type="datetimeFigureOut">
               <a:rPr lang="en-US" smtClean="0"/>
-              <a:t>10/20/2020</a:t>
+              <a:t>9/6/2022</a:t>
             </a:fld>
             <a:endParaRPr lang="en-US"/>
           </a:p>
@@ -32148,13 +31889,6 @@
   <p:transition>
     <p:fade/>
   </p:transition>
-  <p:timing>
-    <p:tnLst>
-      <p:par>
-        <p:cTn id="1" dur="indefinite" restart="never" nodeType="tmRoot"/>
-      </p:par>
-    </p:tnLst>
-  </p:timing>
 </p:sldLayout>
 </file>
 
@@ -32312,7 +32046,7 @@
           <a:p>
             <a:fld id="{5958763E-B898-436D-883D-03711491D54A}" type="datetimeFigureOut">
               <a:rPr lang="en-US" smtClean="0"/>
-              <a:t>10/20/2020</a:t>
+              <a:t>9/6/2022</a:t>
             </a:fld>
             <a:endParaRPr lang="en-US"/>
           </a:p>
@@ -32385,13 +32119,6 @@
   <p:transition>
     <p:fade/>
   </p:transition>
-  <p:timing>
-    <p:tnLst>
-      <p:par>
-        <p:cTn id="1" dur="indefinite" restart="never" nodeType="tmRoot"/>
-      </p:par>
-    </p:tnLst>
-  </p:timing>
 </p:sldLayout>
 </file>
 
@@ -32563,7 +32290,7 @@
           <a:p>
             <a:fld id="{5958763E-B898-436D-883D-03711491D54A}" type="datetimeFigureOut">
               <a:rPr lang="en-US" smtClean="0"/>
-              <a:t>10/20/2020</a:t>
+              <a:t>9/6/2022</a:t>
             </a:fld>
             <a:endParaRPr lang="en-US"/>
           </a:p>
@@ -32709,13 +32436,6 @@
   <p:transition>
     <p:fade/>
   </p:transition>
-  <p:timing>
-    <p:tnLst>
-      <p:par>
-        <p:cTn id="1" dur="indefinite" restart="never" nodeType="tmRoot"/>
-      </p:par>
-    </p:tnLst>
-  </p:timing>
   <p:txStyles>
     <p:titleStyle>
       <a:lvl1pPr algn="l" defTabSz="914400" rtl="0" eaLnBrk="1" latinLnBrk="0" hangingPunct="1">
@@ -33020,7 +32740,7 @@
       </a:lvl9pPr>
     </p:otherStyle>
   </p:txStyles>
-  <p:extLst mod="1">
+  <p:extLst>
     <p:ext uri="{27BBF7A9-308A-43DC-89C8-2F10F3537804}">
       <p15:sldGuideLst xmlns:p15="http://schemas.microsoft.com/office/powerpoint/2012/main">
         <p15:guide id="1" orient="horz" pos="2160" userDrawn="1">
@@ -33099,10 +32819,9 @@
           <a:lstStyle/>
           <a:p>
             <a:r>
-              <a:rPr lang="en-US" sz="6600" dirty="0" smtClean="0"/>
-              <a:t>JS Files &amp; Buttons Review</a:t>
+              <a:rPr lang="en-US" sz="6600" dirty="0"/>
+              <a:t>Functions &amp; Buttons Review</a:t>
             </a:r>
-            <a:endParaRPr lang="en-US" sz="6600" dirty="0"/>
           </a:p>
         </p:txBody>
       </p:sp>
@@ -33127,11 +32846,11 @@
           <a:lstStyle/>
           <a:p>
             <a:r>
-              <a:rPr lang="en-US" dirty="0" smtClean="0"/>
+              <a:rPr lang="en-US" dirty="0"/>
               <a:t>Hy-Tech Club: </a:t>
             </a:r>
             <a:r>
-              <a:rPr lang="en-US" smtClean="0"/>
+              <a:rPr lang="en-US"/>
               <a:t>Web 102</a:t>
             </a:r>
             <a:endParaRPr lang="en-US" dirty="0"/>
@@ -36119,13 +35838,6 @@
   <p:transition>
     <p:fade/>
   </p:transition>
-  <p:timing>
-    <p:tnLst>
-      <p:par>
-        <p:cTn id="1" dur="indefinite" restart="never" nodeType="tmRoot"/>
-      </p:par>
-    </p:tnLst>
-  </p:timing>
 </p:sld>
 </file>
 
@@ -36168,18 +35880,10 @@
           <a:p>
             <a:r>
               <a:rPr lang="en-US" dirty="0"/>
-              <a:t>5</a:t>
+              <a:t>5. Define a function named </a:t>
             </a:r>
             <a:r>
-              <a:rPr lang="en-US" dirty="0" smtClean="0"/>
-              <a:t>. Define </a:t>
-            </a:r>
-            <a:r>
-              <a:rPr lang="en-US" dirty="0" smtClean="0"/>
-              <a:t>a function named </a:t>
-            </a:r>
-            <a:r>
-              <a:rPr lang="en-US" sz="4000" cap="none" dirty="0" err="1" smtClean="0">
+              <a:rPr lang="en-US" sz="4000" cap="none" dirty="0" err="1">
                 <a:solidFill>
                   <a:schemeClr val="accent1">
                     <a:lumMod val="20000"/>
@@ -36191,10 +35895,9 @@
               <a:t>SendMessage</a:t>
             </a:r>
             <a:r>
-              <a:rPr lang="en-US" dirty="0" smtClean="0"/>
+              <a:rPr lang="en-US" dirty="0"/>
               <a:t> that displays a message to the user</a:t>
             </a:r>
-            <a:endParaRPr lang="en-US" dirty="0"/>
           </a:p>
         </p:txBody>
       </p:sp>
@@ -36389,7 +36092,7 @@
                 <a:spcPct val="0"/>
               </a:spcAft>
             </a:pPr>
-            <a:endParaRPr lang="en-US" sz="2400" dirty="0" err="1" smtClean="0">
+            <a:endParaRPr lang="en-US" sz="2400" dirty="0" err="1">
               <a:gradFill>
                 <a:gsLst>
                   <a:gs pos="0">
@@ -36438,7 +36141,7 @@
               </a:spcAft>
             </a:pPr>
             <a:r>
-              <a:rPr lang="en-US" sz="2400" dirty="0" smtClean="0">
+              <a:rPr lang="en-US" sz="2400" dirty="0">
                 <a:solidFill>
                   <a:schemeClr val="accent1"/>
                 </a:solidFill>
@@ -36461,13 +36164,6 @@
   <p:transition>
     <p:fade/>
   </p:transition>
-  <p:timing>
-    <p:tnLst>
-      <p:par>
-        <p:cTn id="1" dur="indefinite" restart="never" nodeType="tmRoot"/>
-      </p:par>
-    </p:tnLst>
-  </p:timing>
 </p:sld>
 </file>
 
@@ -36504,10 +36200,9 @@
           <a:lstStyle/>
           <a:p>
             <a:r>
-              <a:rPr lang="en-US" dirty="0" smtClean="0"/>
+              <a:rPr lang="en-US" dirty="0"/>
               <a:t>Answer</a:t>
             </a:r>
-            <a:endParaRPr lang="en-US" dirty="0"/>
           </a:p>
         </p:txBody>
       </p:sp>
@@ -36633,13 +36328,6 @@
   <p:transition>
     <p:fade/>
   </p:transition>
-  <p:timing>
-    <p:tnLst>
-      <p:par>
-        <p:cTn id="1" dur="indefinite" restart="never" nodeType="tmRoot"/>
-      </p:par>
-    </p:tnLst>
-  </p:timing>
 </p:sld>
 </file>
 
@@ -36696,26 +36384,10 @@
                   <a:schemeClr val="bg1"/>
                 </a:solidFill>
               </a:rPr>
-              <a:t>6</a:t>
+              <a:t>6. Create a </a:t>
             </a:r>
             <a:r>
-              <a:rPr lang="en-US" sz="6000" dirty="0" smtClean="0">
-                <a:solidFill>
-                  <a:schemeClr val="bg1"/>
-                </a:solidFill>
-              </a:rPr>
-              <a:t>. Create </a:t>
-            </a:r>
-            <a:r>
-              <a:rPr lang="en-US" sz="6000" dirty="0" smtClean="0">
-                <a:solidFill>
-                  <a:schemeClr val="bg1"/>
-                </a:solidFill>
-              </a:rPr>
-              <a:t>a </a:t>
-            </a:r>
-            <a:r>
-              <a:rPr lang="en-US" sz="6000" i="1" dirty="0" smtClean="0">
+              <a:rPr lang="en-US" sz="6000" i="1" dirty="0">
                 <a:solidFill>
                   <a:schemeClr val="bg1"/>
                 </a:solidFill>
@@ -36723,7 +36395,7 @@
               <a:t>button</a:t>
             </a:r>
             <a:r>
-              <a:rPr lang="en-US" sz="6000" dirty="0" smtClean="0">
+              <a:rPr lang="en-US" sz="6000" dirty="0">
                 <a:solidFill>
                   <a:schemeClr val="bg1"/>
                 </a:solidFill>
@@ -36740,7 +36412,7 @@
                 <a:spcPts val="600"/>
               </a:spcAft>
             </a:pPr>
-            <a:endParaRPr lang="en-US" sz="6000" dirty="0" smtClean="0">
+            <a:endParaRPr lang="en-US" sz="6000" dirty="0">
               <a:solidFill>
                 <a:schemeClr val="bg1"/>
               </a:solidFill>
@@ -36758,7 +36430,7 @@
               <a:buChar char="•"/>
             </a:pPr>
             <a:r>
-              <a:rPr lang="en-US" sz="6000" dirty="0" smtClean="0">
+              <a:rPr lang="en-US" sz="6000" dirty="0">
                 <a:solidFill>
                   <a:schemeClr val="bg1"/>
                 </a:solidFill>
@@ -36766,7 +36438,7 @@
               <a:t>Has text “</a:t>
             </a:r>
             <a:r>
-              <a:rPr lang="en-US" sz="6000" b="1" dirty="0" smtClean="0">
+              <a:rPr lang="en-US" sz="6000" b="1" dirty="0">
                 <a:solidFill>
                   <a:schemeClr val="bg1"/>
                 </a:solidFill>
@@ -36774,7 +36446,7 @@
               <a:t>Fun</a:t>
             </a:r>
             <a:r>
-              <a:rPr lang="en-US" sz="6000" dirty="0" smtClean="0">
+              <a:rPr lang="en-US" sz="6000" dirty="0">
                 <a:solidFill>
                   <a:schemeClr val="bg1"/>
                 </a:solidFill>
@@ -36794,7 +36466,7 @@
               <a:buChar char="•"/>
             </a:pPr>
             <a:r>
-              <a:rPr lang="en-US" sz="6000" dirty="0" smtClean="0">
+              <a:rPr lang="en-US" sz="6000" dirty="0">
                 <a:solidFill>
                   <a:schemeClr val="bg1"/>
                 </a:solidFill>
@@ -36802,7 +36474,7 @@
               <a:t>Calls a </a:t>
             </a:r>
             <a:r>
-              <a:rPr lang="en-US" sz="6000" i="1" dirty="0" smtClean="0">
+              <a:rPr lang="en-US" sz="6000" i="1" dirty="0">
                 <a:solidFill>
                   <a:schemeClr val="bg1"/>
                 </a:solidFill>
@@ -36810,7 +36482,7 @@
               <a:t>function</a:t>
             </a:r>
             <a:r>
-              <a:rPr lang="en-US" sz="6000" dirty="0" smtClean="0">
+              <a:rPr lang="en-US" sz="6000" dirty="0">
                 <a:solidFill>
                   <a:schemeClr val="bg1"/>
                 </a:solidFill>
@@ -36818,7 +36490,7 @@
               <a:t> named </a:t>
             </a:r>
             <a:r>
-              <a:rPr lang="en-US" sz="6000" b="1" dirty="0" smtClean="0">
+              <a:rPr lang="en-US" sz="6000" b="1" dirty="0">
                 <a:solidFill>
                   <a:schemeClr val="bg1"/>
                 </a:solidFill>
@@ -36842,13 +36514,6 @@
   <p:transition>
     <p:fade/>
   </p:transition>
-  <p:timing>
-    <p:tnLst>
-      <p:par>
-        <p:cTn id="1" dur="indefinite" restart="never" nodeType="tmRoot"/>
-      </p:par>
-    </p:tnLst>
-  </p:timing>
 </p:sld>
 </file>
 
@@ -36885,10 +36550,9 @@
           <a:lstStyle/>
           <a:p>
             <a:r>
-              <a:rPr lang="en-US" dirty="0" smtClean="0"/>
+              <a:rPr lang="en-US" dirty="0"/>
               <a:t>Answer</a:t>
             </a:r>
-            <a:endParaRPr lang="en-US" dirty="0"/>
           </a:p>
         </p:txBody>
       </p:sp>
@@ -36938,7 +36602,7 @@
               <a:t>onclick</a:t>
             </a:r>
             <a:r>
-              <a:rPr lang="en-US" sz="4400" dirty="0" smtClean="0">
+              <a:rPr lang="en-US" sz="4400" dirty="0">
                 <a:solidFill>
                   <a:srgbClr val="000000"/>
                 </a:solidFill>
@@ -36947,7 +36611,7 @@
               <a:t>=</a:t>
             </a:r>
             <a:r>
-              <a:rPr lang="en-US" sz="4400" dirty="0" smtClean="0">
+              <a:rPr lang="en-US" sz="4400" dirty="0">
                 <a:solidFill>
                   <a:srgbClr val="0000FF"/>
                 </a:solidFill>
@@ -36956,7 +36620,7 @@
               <a:t>"fun()"</a:t>
             </a:r>
             <a:r>
-              <a:rPr lang="en-US" sz="4400" dirty="0" smtClean="0">
+              <a:rPr lang="en-US" sz="4400" dirty="0">
                 <a:solidFill>
                   <a:srgbClr val="800000"/>
                 </a:solidFill>
@@ -36965,7 +36629,7 @@
               <a:t>&gt;</a:t>
             </a:r>
             <a:r>
-              <a:rPr lang="en-US" sz="4400" dirty="0" smtClean="0">
+              <a:rPr lang="en-US" sz="4400" dirty="0">
                 <a:solidFill>
                   <a:srgbClr val="000000"/>
                 </a:solidFill>
@@ -36974,22 +36638,13 @@
               <a:t>Fun</a:t>
             </a:r>
             <a:r>
-              <a:rPr lang="en-US" sz="4400" dirty="0" smtClean="0">
-                <a:solidFill>
-                  <a:srgbClr val="800000"/>
-                </a:solidFill>
-                <a:latin typeface="Consolas" panose="020B0609020204030204" pitchFamily="49" charset="0"/>
-              </a:rPr>
-              <a:t>&lt;/</a:t>
-            </a:r>
-            <a:r>
               <a:rPr lang="en-US" sz="4400" dirty="0">
                 <a:solidFill>
                   <a:srgbClr val="800000"/>
                 </a:solidFill>
                 <a:latin typeface="Consolas" panose="020B0609020204030204" pitchFamily="49" charset="0"/>
               </a:rPr>
-              <a:t>button&gt;</a:t>
+              <a:t>&lt;/button&gt;</a:t>
             </a:r>
           </a:p>
           <a:p>
@@ -37013,13 +36668,6 @@
   <p:transition>
     <p:fade/>
   </p:transition>
-  <p:timing>
-    <p:tnLst>
-      <p:par>
-        <p:cTn id="1" dur="indefinite" restart="never" nodeType="tmRoot"/>
-      </p:par>
-    </p:tnLst>
-  </p:timing>
 </p:sld>
 </file>
 
@@ -37061,10 +36709,9 @@
           <a:lstStyle/>
           <a:p>
             <a:r>
-              <a:rPr lang="en-US" dirty="0" smtClean="0"/>
+              <a:rPr lang="en-US" dirty="0"/>
               <a:t>7. Tie-breaker</a:t>
             </a:r>
-            <a:endParaRPr lang="en-US" dirty="0"/>
           </a:p>
         </p:txBody>
       </p:sp>
@@ -37081,13 +36728,6 @@
   <p:transition>
     <p:fade/>
   </p:transition>
-  <p:timing>
-    <p:tnLst>
-      <p:par>
-        <p:cTn id="1" dur="indefinite" restart="never" nodeType="tmRoot"/>
-      </p:par>
-    </p:tnLst>
-  </p:timing>
 </p:sld>
 </file>
 
@@ -37124,10 +36764,9 @@
           <a:lstStyle/>
           <a:p>
             <a:r>
-              <a:rPr lang="en-US" dirty="0" smtClean="0"/>
+              <a:rPr lang="en-US" dirty="0"/>
               <a:t>What will the user see if they click?</a:t>
             </a:r>
-            <a:endParaRPr lang="en-US" dirty="0"/>
           </a:p>
         </p:txBody>
       </p:sp>
@@ -37170,22 +36809,13 @@
               <a:buNone/>
             </a:pPr>
             <a:r>
-              <a:rPr lang="en-US" sz="2400" dirty="0" smtClean="0">
-                <a:solidFill>
-                  <a:srgbClr val="008000"/>
-                </a:solidFill>
-                <a:latin typeface="Consolas" panose="020B0609020204030204" pitchFamily="49" charset="0"/>
-              </a:rPr>
-              <a:t>&lt;!--</a:t>
-            </a:r>
-            <a:r>
               <a:rPr lang="en-US" sz="2400" dirty="0">
                 <a:solidFill>
                   <a:srgbClr val="008000"/>
                 </a:solidFill>
                 <a:latin typeface="Consolas" panose="020B0609020204030204" pitchFamily="49" charset="0"/>
               </a:rPr>
-              <a:t> index.html file --&gt;</a:t>
+              <a:t>&lt;!-- index.html file --&gt;</a:t>
             </a:r>
             <a:endParaRPr lang="en-US" sz="2400" dirty="0">
               <a:solidFill>
@@ -37234,18 +36864,9 @@
                 </a:solidFill>
                 <a:latin typeface="Consolas" panose="020B0609020204030204" pitchFamily="49" charset="0"/>
               </a:rPr>
-              <a:t>&lt;head&gt;&lt;/head</a:t>
+              <a:t>&lt;head&gt;&lt;/head&gt;</a:t>
             </a:r>
-            <a:r>
-              <a:rPr lang="en-US" sz="2400" dirty="0" smtClean="0">
-                <a:solidFill>
-                  <a:srgbClr val="800000"/>
-                </a:solidFill>
-                <a:latin typeface="Consolas" panose="020B0609020204030204" pitchFamily="49" charset="0"/>
-              </a:rPr>
-              <a:t>&gt;</a:t>
-            </a:r>
-            <a:endParaRPr lang="en-US" sz="2400" dirty="0" smtClean="0">
+            <a:endParaRPr lang="en-US" sz="2400" dirty="0">
               <a:solidFill>
                 <a:srgbClr val="000000"/>
               </a:solidFill>
@@ -37257,7 +36878,7 @@
               <a:buNone/>
             </a:pPr>
             <a:r>
-              <a:rPr lang="en-US" sz="2400" dirty="0" smtClean="0">
+              <a:rPr lang="en-US" sz="2400" dirty="0">
                 <a:solidFill>
                   <a:srgbClr val="000000"/>
                 </a:solidFill>
@@ -37266,7 +36887,7 @@
               <a:t>    </a:t>
             </a:r>
             <a:r>
-              <a:rPr lang="en-US" sz="2400" dirty="0" smtClean="0">
+              <a:rPr lang="en-US" sz="2400" dirty="0">
                 <a:solidFill>
                   <a:srgbClr val="800000"/>
                 </a:solidFill>
@@ -37274,7 +36895,7 @@
               </a:rPr>
               <a:t>&lt;body&gt;</a:t>
             </a:r>
-            <a:endParaRPr lang="en-US" sz="2400" dirty="0" smtClean="0">
+            <a:endParaRPr lang="en-US" sz="2400" dirty="0">
               <a:solidFill>
                 <a:srgbClr val="000000"/>
               </a:solidFill>
@@ -37322,7 +36943,7 @@
               <a:t>onclick</a:t>
             </a:r>
             <a:r>
-              <a:rPr lang="en-US" sz="2400" dirty="0" smtClean="0">
+              <a:rPr lang="en-US" sz="2400" dirty="0">
                 <a:solidFill>
                   <a:srgbClr val="000000"/>
                 </a:solidFill>
@@ -37331,7 +36952,7 @@
               <a:t>=</a:t>
             </a:r>
             <a:r>
-              <a:rPr lang="en-US" sz="2400" dirty="0" smtClean="0">
+              <a:rPr lang="en-US" sz="2400" dirty="0">
                 <a:solidFill>
                   <a:srgbClr val="0000FF"/>
                 </a:solidFill>
@@ -37340,7 +36961,7 @@
               <a:t>"go()"</a:t>
             </a:r>
             <a:r>
-              <a:rPr lang="en-US" sz="2400" dirty="0" smtClean="0">
+              <a:rPr lang="en-US" sz="2400" dirty="0">
                 <a:solidFill>
                   <a:srgbClr val="800000"/>
                 </a:solidFill>
@@ -37349,7 +36970,7 @@
               <a:t>&gt;</a:t>
             </a:r>
             <a:r>
-              <a:rPr lang="en-US" sz="2400" dirty="0" smtClean="0">
+              <a:rPr lang="en-US" sz="2400" dirty="0">
                 <a:solidFill>
                   <a:srgbClr val="000000"/>
                 </a:solidFill>
@@ -37358,22 +36979,13 @@
               <a:t>Go!</a:t>
             </a:r>
             <a:r>
-              <a:rPr lang="en-US" sz="2400" dirty="0" smtClean="0">
-                <a:solidFill>
-                  <a:srgbClr val="800000"/>
-                </a:solidFill>
-                <a:latin typeface="Consolas" panose="020B0609020204030204" pitchFamily="49" charset="0"/>
-              </a:rPr>
-              <a:t>&lt;/</a:t>
-            </a:r>
-            <a:r>
               <a:rPr lang="en-US" sz="2400" dirty="0">
                 <a:solidFill>
                   <a:srgbClr val="800000"/>
                 </a:solidFill>
                 <a:latin typeface="Consolas" panose="020B0609020204030204" pitchFamily="49" charset="0"/>
               </a:rPr>
-              <a:t>button&gt;</a:t>
+              <a:t>&lt;/button&gt;</a:t>
             </a:r>
             <a:endParaRPr lang="en-US" sz="2400" dirty="0">
               <a:solidFill>
@@ -37422,18 +37034,9 @@
                 </a:solidFill>
                 <a:latin typeface="Consolas" panose="020B0609020204030204" pitchFamily="49" charset="0"/>
               </a:rPr>
-              <a:t>&lt;/html</a:t>
+              <a:t>&lt;/html&gt;</a:t>
             </a:r>
-            <a:r>
-              <a:rPr lang="en-US" sz="2400" dirty="0" smtClean="0">
-                <a:solidFill>
-                  <a:srgbClr val="800000"/>
-                </a:solidFill>
-                <a:latin typeface="Consolas" panose="020B0609020204030204" pitchFamily="49" charset="0"/>
-              </a:rPr>
-              <a:t>&gt;</a:t>
-            </a:r>
-            <a:endParaRPr lang="en-US" sz="3600" dirty="0" smtClean="0"/>
+            <a:endParaRPr lang="en-US" sz="3600" dirty="0"/>
           </a:p>
         </p:txBody>
       </p:sp>
@@ -37547,7 +37150,7 @@
               <a:buNone/>
             </a:pPr>
             <a:r>
-              <a:rPr lang="en-US" sz="2400" dirty="0" smtClean="0">
+              <a:rPr lang="en-US" sz="2400" dirty="0">
                 <a:solidFill>
                   <a:srgbClr val="000000"/>
                 </a:solidFill>
@@ -37555,12 +37158,6 @@
               </a:rPr>
               <a:t>}</a:t>
             </a:r>
-            <a:endParaRPr lang="en-US" sz="2400" dirty="0">
-              <a:solidFill>
-                <a:srgbClr val="000000"/>
-              </a:solidFill>
-              <a:latin typeface="Consolas" panose="020B0609020204030204" pitchFamily="49" charset="0"/>
-            </a:endParaRPr>
           </a:p>
         </p:txBody>
       </p:sp>
@@ -37577,13 +37174,6 @@
   <p:transition>
     <p:fade/>
   </p:transition>
-  <p:timing>
-    <p:tnLst>
-      <p:par>
-        <p:cTn id="1" dur="indefinite" restart="never" nodeType="tmRoot"/>
-      </p:par>
-    </p:tnLst>
-  </p:timing>
 </p:sld>
 </file>
 
@@ -37620,10 +37210,9 @@
           <a:lstStyle/>
           <a:p>
             <a:r>
-              <a:rPr lang="en-US" dirty="0" smtClean="0"/>
+              <a:rPr lang="en-US" dirty="0"/>
               <a:t>Answer</a:t>
             </a:r>
-            <a:endParaRPr lang="en-US" dirty="0"/>
           </a:p>
         </p:txBody>
       </p:sp>
@@ -37647,21 +37236,8 @@
             </a:pPr>
             <a:r>
               <a:rPr lang="en-US" sz="4400" dirty="0"/>
-              <a:t>Nothing! Always remember to include </a:t>
+              <a:t>Nothing! Always remember to include the script file in the HTML 🙂</a:t>
             </a:r>
-            <a:r>
-              <a:rPr lang="en-US" sz="4400" dirty="0" smtClean="0"/>
-              <a:t>the </a:t>
-            </a:r>
-            <a:r>
-              <a:rPr lang="en-US" sz="4400" dirty="0"/>
-              <a:t>script file in the </a:t>
-            </a:r>
-            <a:r>
-              <a:rPr lang="en-US" sz="4400" dirty="0" smtClean="0"/>
-              <a:t>HTML 🙂</a:t>
-            </a:r>
-            <a:endParaRPr lang="en-US" sz="4400" dirty="0"/>
           </a:p>
           <a:p>
             <a:pPr marL="57150" indent="0">
@@ -37684,13 +37260,6 @@
   <p:transition>
     <p:fade/>
   </p:transition>
-  <p:timing>
-    <p:tnLst>
-      <p:par>
-        <p:cTn id="1" dur="indefinite" restart="never" nodeType="tmRoot"/>
-      </p:par>
-    </p:tnLst>
-  </p:timing>
 </p:sld>
 </file>
 
@@ -37732,15 +37301,11 @@
           <a:lstStyle/>
           <a:p>
             <a:r>
-              <a:rPr lang="en-US" dirty="0" smtClean="0"/>
-              <a:t>1. Write </a:t>
+              <a:rPr lang="en-US" dirty="0"/>
+              <a:t>1. Write the correct </a:t>
             </a:r>
             <a:r>
-              <a:rPr lang="en-US" dirty="0" smtClean="0"/>
-              <a:t>the correct </a:t>
-            </a:r>
-            <a:r>
-              <a:rPr lang="en-US" sz="4000" cap="none" dirty="0" smtClean="0">
+              <a:rPr lang="en-US" sz="4000" cap="none" dirty="0">
                 <a:solidFill>
                   <a:schemeClr val="accent1">
                     <a:lumMod val="20000"/>
@@ -37752,19 +37317,19 @@
               <a:t>script</a:t>
             </a:r>
             <a:r>
-              <a:rPr lang="en-US" dirty="0" smtClean="0"/>
+              <a:rPr lang="en-US" dirty="0"/>
               <a:t> tag to include a </a:t>
             </a:r>
             <a:r>
-              <a:rPr lang="en-US" dirty="0" err="1" smtClean="0"/>
+              <a:rPr lang="en-US" dirty="0" err="1"/>
               <a:t>javascript</a:t>
             </a:r>
             <a:r>
-              <a:rPr lang="en-US" dirty="0" smtClean="0"/>
+              <a:rPr lang="en-US" dirty="0"/>
               <a:t> file named </a:t>
             </a:r>
             <a:r>
-              <a:rPr lang="en-US" cap="none" dirty="0" smtClean="0">
+              <a:rPr lang="en-US" cap="none" dirty="0">
                 <a:solidFill>
                   <a:schemeClr val="accent1">
                     <a:lumMod val="20000"/>
@@ -37774,14 +37339,6 @@
               </a:rPr>
               <a:t>script.js</a:t>
             </a:r>
-            <a:endParaRPr lang="en-US" cap="none" dirty="0">
-              <a:solidFill>
-                <a:schemeClr val="accent1">
-                  <a:lumMod val="20000"/>
-                  <a:lumOff val="80000"/>
-                </a:schemeClr>
-              </a:solidFill>
-            </a:endParaRPr>
           </a:p>
         </p:txBody>
       </p:sp>
@@ -37803,7 +37360,7 @@
             <a:pPr marL="0" indent="0">
               <a:buNone/>
             </a:pPr>
-            <a:endParaRPr lang="en-US" dirty="0" smtClean="0">
+            <a:endParaRPr lang="en-US" dirty="0">
               <a:solidFill>
                 <a:srgbClr val="808080"/>
               </a:solidFill>
@@ -37826,7 +37383,7 @@
               <a:buNone/>
             </a:pPr>
             <a:r>
-              <a:rPr lang="en-US" sz="4400" dirty="0" smtClean="0">
+              <a:rPr lang="en-US" sz="4400" dirty="0">
                 <a:solidFill>
                   <a:srgbClr val="808080"/>
                 </a:solidFill>
@@ -37938,13 +37495,6 @@
   <p:transition>
     <p:fade/>
   </p:transition>
-  <p:timing>
-    <p:tnLst>
-      <p:par>
-        <p:cTn id="1" dur="indefinite" restart="never" nodeType="tmRoot"/>
-      </p:par>
-    </p:tnLst>
-  </p:timing>
 </p:sld>
 </file>
 
@@ -37981,10 +37531,9 @@
           <a:lstStyle/>
           <a:p>
             <a:r>
-              <a:rPr lang="en-US" dirty="0" smtClean="0"/>
+              <a:rPr lang="en-US" dirty="0"/>
               <a:t>Answer</a:t>
             </a:r>
-            <a:endParaRPr lang="en-US" dirty="0"/>
           </a:p>
         </p:txBody>
       </p:sp>
@@ -38088,13 +37637,6 @@
   <p:transition>
     <p:fade/>
   </p:transition>
-  <p:timing>
-    <p:tnLst>
-      <p:par>
-        <p:cTn id="1" dur="indefinite" restart="never" nodeType="tmRoot"/>
-      </p:par>
-    </p:tnLst>
-  </p:timing>
 </p:sld>
 </file>
 
@@ -38136,22 +37678,17 @@
           <a:lstStyle/>
           <a:p>
             <a:r>
-              <a:rPr lang="en-US" dirty="0" smtClean="0"/>
-              <a:t>2. What </a:t>
+              <a:rPr lang="en-US" dirty="0"/>
+              <a:t>2. What do buttons </a:t>
             </a:r>
             <a:r>
-              <a:rPr lang="en-US" dirty="0" smtClean="0"/>
-              <a:t>do buttons </a:t>
-            </a:r>
-            <a:r>
-              <a:rPr lang="en-US" i="1" dirty="0" smtClean="0"/>
+              <a:rPr lang="en-US" i="1" dirty="0"/>
               <a:t>call</a:t>
             </a:r>
             <a:r>
-              <a:rPr lang="en-US" dirty="0" smtClean="0"/>
+              <a:rPr lang="en-US" dirty="0"/>
               <a:t> when they are clicked?</a:t>
             </a:r>
-            <a:endParaRPr lang="en-US" dirty="0"/>
           </a:p>
         </p:txBody>
       </p:sp>
@@ -38168,13 +37705,6 @@
   <p:transition>
     <p:fade/>
   </p:transition>
-  <p:timing>
-    <p:tnLst>
-      <p:par>
-        <p:cTn id="1" dur="indefinite" restart="never" nodeType="tmRoot"/>
-      </p:par>
-    </p:tnLst>
-  </p:timing>
 </p:sld>
 </file>
 
@@ -38211,10 +37741,9 @@
           <a:lstStyle/>
           <a:p>
             <a:r>
-              <a:rPr lang="en-US" dirty="0" smtClean="0"/>
+              <a:rPr lang="en-US" dirty="0"/>
               <a:t>Answer</a:t>
             </a:r>
-            <a:endParaRPr lang="en-US" dirty="0"/>
           </a:p>
         </p:txBody>
       </p:sp>
@@ -38237,7 +37766,7 @@
               <a:buNone/>
             </a:pPr>
             <a:r>
-              <a:rPr lang="en-US" sz="6600" dirty="0" smtClean="0"/>
+              <a:rPr lang="en-US" sz="6600" dirty="0"/>
               <a:t>Functions</a:t>
             </a:r>
             <a:endParaRPr lang="en-US" sz="4400" dirty="0"/>
@@ -38257,13 +37786,6 @@
   <p:transition>
     <p:fade/>
   </p:transition>
-  <p:timing>
-    <p:tnLst>
-      <p:par>
-        <p:cTn id="1" dur="indefinite" restart="never" nodeType="tmRoot"/>
-      </p:par>
-    </p:tnLst>
-  </p:timing>
 </p:sld>
 </file>
 
@@ -38300,18 +37822,9 @@
           <a:lstStyle/>
           <a:p>
             <a:r>
-              <a:rPr lang="en-US" sz="2800" dirty="0" smtClean="0"/>
-              <a:t>3. What </a:t>
+              <a:rPr lang="en-US" sz="2800" dirty="0"/>
+              <a:t>3. What keyword is needed to define  a function?</a:t>
             </a:r>
-            <a:r>
-              <a:rPr lang="en-US" sz="2800" dirty="0" smtClean="0"/>
-              <a:t>keyword is needed to define  a </a:t>
-            </a:r>
-            <a:r>
-              <a:rPr lang="en-US" sz="2800" dirty="0" smtClean="0"/>
-              <a:t>function?</a:t>
-            </a:r>
-            <a:endParaRPr lang="en-US" sz="2800" dirty="0"/>
           </a:p>
         </p:txBody>
       </p:sp>
@@ -38336,204 +37849,7 @@
               <a:buNone/>
             </a:pPr>
             <a:r>
-              <a:rPr lang="en-US" sz="4800" dirty="0" smtClean="0">
-                <a:solidFill>
-                  <a:srgbClr val="0000FF"/>
-                </a:solidFill>
-              </a:rPr>
-              <a:t>???</a:t>
-            </a:r>
-            <a:r>
               <a:rPr lang="en-US" sz="4800" dirty="0">
-                <a:solidFill>
-                  <a:srgbClr val="000000"/>
-                </a:solidFill>
-                <a:latin typeface="Consolas" panose="020B0609020204030204" pitchFamily="49" charset="0"/>
-              </a:rPr>
-              <a:t> </a:t>
-            </a:r>
-            <a:r>
-              <a:rPr lang="en-US" sz="4800" dirty="0" err="1" smtClean="0">
-                <a:solidFill>
-                  <a:srgbClr val="000000"/>
-                </a:solidFill>
-                <a:latin typeface="Consolas" panose="020B0609020204030204" pitchFamily="49" charset="0"/>
-              </a:rPr>
-              <a:t>doSomething</a:t>
-            </a:r>
-            <a:r>
-              <a:rPr lang="en-US" sz="4800" dirty="0" smtClean="0">
-                <a:solidFill>
-                  <a:srgbClr val="000000"/>
-                </a:solidFill>
-                <a:latin typeface="Consolas" panose="020B0609020204030204" pitchFamily="49" charset="0"/>
-              </a:rPr>
-              <a:t>()</a:t>
-            </a:r>
-            <a:r>
-              <a:rPr lang="en-US" sz="4800" dirty="0">
-                <a:solidFill>
-                  <a:srgbClr val="000000"/>
-                </a:solidFill>
-                <a:latin typeface="Consolas" panose="020B0609020204030204" pitchFamily="49" charset="0"/>
-              </a:rPr>
-              <a:t> {</a:t>
-            </a:r>
-          </a:p>
-          <a:p>
-            <a:pPr marL="57150" indent="0">
-              <a:buNone/>
-            </a:pPr>
-            <a:r>
-              <a:rPr lang="en-US" sz="4800" dirty="0">
-                <a:solidFill>
-                  <a:srgbClr val="000000"/>
-                </a:solidFill>
-                <a:latin typeface="Consolas" panose="020B0609020204030204" pitchFamily="49" charset="0"/>
-              </a:rPr>
-              <a:t>    alert</a:t>
-            </a:r>
-            <a:r>
-              <a:rPr lang="en-US" sz="4800" dirty="0" smtClean="0">
-                <a:solidFill>
-                  <a:srgbClr val="000000"/>
-                </a:solidFill>
-                <a:latin typeface="Consolas" panose="020B0609020204030204" pitchFamily="49" charset="0"/>
-              </a:rPr>
-              <a:t>(</a:t>
-            </a:r>
-            <a:r>
-              <a:rPr lang="en-US" sz="4800" dirty="0" smtClean="0">
-                <a:solidFill>
-                  <a:srgbClr val="A31515"/>
-                </a:solidFill>
-                <a:latin typeface="Consolas" panose="020B0609020204030204" pitchFamily="49" charset="0"/>
-              </a:rPr>
-              <a:t>"JS Code"</a:t>
-            </a:r>
-            <a:r>
-              <a:rPr lang="en-US" sz="4800" dirty="0" smtClean="0">
-                <a:solidFill>
-                  <a:srgbClr val="000000"/>
-                </a:solidFill>
-                <a:latin typeface="Consolas" panose="020B0609020204030204" pitchFamily="49" charset="0"/>
-              </a:rPr>
-              <a:t>);</a:t>
-            </a:r>
-            <a:endParaRPr lang="en-US" sz="4800" dirty="0">
-              <a:solidFill>
-                <a:srgbClr val="000000"/>
-              </a:solidFill>
-              <a:latin typeface="Consolas" panose="020B0609020204030204" pitchFamily="49" charset="0"/>
-            </a:endParaRPr>
-          </a:p>
-          <a:p>
-            <a:pPr marL="57150" indent="0">
-              <a:buNone/>
-            </a:pPr>
-            <a:r>
-              <a:rPr lang="en-US" sz="4800" dirty="0" smtClean="0">
-                <a:solidFill>
-                  <a:srgbClr val="000000"/>
-                </a:solidFill>
-                <a:latin typeface="Consolas" panose="020B0609020204030204" pitchFamily="49" charset="0"/>
-              </a:rPr>
-              <a:t>}</a:t>
-            </a:r>
-            <a:endParaRPr lang="en-US" sz="4800" dirty="0">
-              <a:solidFill>
-                <a:srgbClr val="000000"/>
-              </a:solidFill>
-              <a:latin typeface="Consolas" panose="020B0609020204030204" pitchFamily="49" charset="0"/>
-            </a:endParaRPr>
-          </a:p>
-        </p:txBody>
-      </p:sp>
-    </p:spTree>
-    <p:extLst>
-      <p:ext uri="{BB962C8B-B14F-4D97-AF65-F5344CB8AC3E}">
-        <p14:creationId xmlns:p14="http://schemas.microsoft.com/office/powerpoint/2010/main" val="205074615"/>
-      </p:ext>
-    </p:extLst>
-  </p:cSld>
-  <p:clrMapOvr>
-    <a:masterClrMapping/>
-  </p:clrMapOvr>
-  <p:transition>
-    <p:fade/>
-  </p:transition>
-  <p:timing>
-    <p:tnLst>
-      <p:par>
-        <p:cTn id="1" dur="indefinite" restart="never" nodeType="tmRoot"/>
-      </p:par>
-    </p:tnLst>
-  </p:timing>
-</p:sld>
-</file>
-
-<file path=ppt/slides/slide7.xml><?xml version="1.0" encoding="utf-8"?>
-<p:sld xmlns:a="http://schemas.openxmlformats.org/drawingml/2006/main" xmlns:r="http://schemas.openxmlformats.org/officeDocument/2006/relationships" xmlns:p="http://schemas.openxmlformats.org/presentationml/2006/main">
-  <p:cSld>
-    <p:spTree>
-      <p:nvGrpSpPr>
-        <p:cNvPr id="1" name=""/>
-        <p:cNvGrpSpPr/>
-        <p:nvPr/>
-      </p:nvGrpSpPr>
-      <p:grpSpPr>
-        <a:xfrm>
-          <a:off x="0" y="0"/>
-          <a:ext cx="0" cy="0"/>
-          <a:chOff x="0" y="0"/>
-          <a:chExt cx="0" cy="0"/>
-        </a:xfrm>
-      </p:grpSpPr>
-      <p:sp>
-        <p:nvSpPr>
-          <p:cNvPr id="2" name="Title 1"/>
-          <p:cNvSpPr>
-            <a:spLocks noGrp="1"/>
-          </p:cNvSpPr>
-          <p:nvPr>
-            <p:ph type="title"/>
-          </p:nvPr>
-        </p:nvSpPr>
-        <p:spPr/>
-        <p:txBody>
-          <a:bodyPr/>
-          <a:lstStyle/>
-          <a:p>
-            <a:r>
-              <a:rPr lang="en-US" dirty="0" smtClean="0"/>
-              <a:t>Answer</a:t>
-            </a:r>
-            <a:endParaRPr lang="en-US" dirty="0"/>
-          </a:p>
-        </p:txBody>
-      </p:sp>
-      <p:sp>
-        <p:nvSpPr>
-          <p:cNvPr id="3" name="Content Placeholder 2"/>
-          <p:cNvSpPr>
-            <a:spLocks noGrp="1"/>
-          </p:cNvSpPr>
-          <p:nvPr>
-            <p:ph idx="1"/>
-          </p:nvPr>
-        </p:nvSpPr>
-        <p:spPr/>
-        <p:txBody>
-          <a:bodyPr anchor="ctr">
-            <a:normAutofit/>
-          </a:bodyPr>
-          <a:lstStyle/>
-          <a:p>
-            <a:pPr marL="57150" indent="0">
-              <a:buNone/>
-            </a:pPr>
-            <a:r>
-              <a:rPr lang="en-US" sz="4800" dirty="0" smtClean="0">
                 <a:solidFill>
                   <a:srgbClr val="0000FF"/>
                 </a:solidFill>
@@ -38551,7 +37867,7 @@
               <a:t> </a:t>
             </a:r>
             <a:r>
-              <a:rPr lang="en-US" sz="4800" dirty="0" err="1" smtClean="0">
+              <a:rPr lang="en-US" sz="4800" dirty="0" err="1">
                 <a:solidFill>
                   <a:srgbClr val="000000"/>
                 </a:solidFill>
@@ -38560,22 +37876,13 @@
               <a:t>doSomething</a:t>
             </a:r>
             <a:r>
-              <a:rPr lang="en-US" sz="4800" dirty="0" smtClean="0">
-                <a:solidFill>
-                  <a:srgbClr val="000000"/>
-                </a:solidFill>
-                <a:latin typeface="Consolas" panose="020B0609020204030204" pitchFamily="49" charset="0"/>
-              </a:rPr>
-              <a:t>()</a:t>
-            </a:r>
-            <a:r>
               <a:rPr lang="en-US" sz="4800" dirty="0">
                 <a:solidFill>
                   <a:srgbClr val="000000"/>
                 </a:solidFill>
                 <a:latin typeface="Consolas" panose="020B0609020204030204" pitchFamily="49" charset="0"/>
               </a:rPr>
-              <a:t> {</a:t>
+              <a:t>() {</a:t>
             </a:r>
           </a:p>
           <a:p>
@@ -38615,7 +37922,7 @@
               <a:buNone/>
             </a:pPr>
             <a:r>
-              <a:rPr lang="en-US" sz="4800" dirty="0" smtClean="0">
+              <a:rPr lang="en-US" sz="4800" dirty="0">
                 <a:solidFill>
                   <a:srgbClr val="000000"/>
                 </a:solidFill>
@@ -38623,12 +37930,246 @@
               </a:rPr>
               <a:t>}</a:t>
             </a:r>
-            <a:endParaRPr lang="en-US" sz="4800" dirty="0">
-              <a:solidFill>
-                <a:srgbClr val="000000"/>
-              </a:solidFill>
-              <a:latin typeface="Consolas" panose="020B0609020204030204" pitchFamily="49" charset="0"/>
-            </a:endParaRPr>
+          </a:p>
+        </p:txBody>
+      </p:sp>
+      <p:sp>
+        <p:nvSpPr>
+          <p:cNvPr id="4" name="Rectangle 3">
+            <a:extLst>
+              <a:ext uri="{FF2B5EF4-FFF2-40B4-BE49-F238E27FC236}">
+                <a16:creationId xmlns:a16="http://schemas.microsoft.com/office/drawing/2014/main" id="{731B3A8D-2836-4E61-A3DF-D5696FA1E1E8}"/>
+              </a:ext>
+            </a:extLst>
+          </p:cNvPr>
+          <p:cNvSpPr/>
+          <p:nvPr/>
+        </p:nvSpPr>
+        <p:spPr bwMode="auto">
+          <a:xfrm>
+            <a:off x="381000" y="2514600"/>
+            <a:ext cx="2857500" cy="800100"/>
+          </a:xfrm>
+          <a:prstGeom prst="rect">
+            <a:avLst/>
+          </a:prstGeom>
+          <a:solidFill>
+            <a:srgbClr val="7030A0"/>
+          </a:solidFill>
+          <a:ln w="12700">
+            <a:solidFill>
+              <a:schemeClr val="tx2"/>
+            </a:solidFill>
+            <a:miter lim="800000"/>
+            <a:headEnd type="none" w="med" len="med"/>
+            <a:tailEnd type="none" w="med" len="med"/>
+          </a:ln>
+          <a:effectLst/>
+        </p:spPr>
+        <p:style>
+          <a:lnRef idx="1">
+            <a:schemeClr val="accent2"/>
+          </a:lnRef>
+          <a:fillRef idx="3">
+            <a:schemeClr val="accent2"/>
+          </a:fillRef>
+          <a:effectRef idx="2">
+            <a:schemeClr val="accent2"/>
+          </a:effectRef>
+          <a:fontRef idx="minor">
+            <a:schemeClr val="lt1"/>
+          </a:fontRef>
+        </p:style>
+        <p:txBody>
+          <a:bodyPr rot="0" spcFirstLastPara="0" vertOverflow="overflow" horzOverflow="overflow" vert="horz" wrap="square" lIns="182880" tIns="146304" rIns="182880" bIns="146304" numCol="1" spcCol="0" rtlCol="0" fromWordArt="0" anchor="ctr" anchorCtr="0" forceAA="0" compatLnSpc="1">
+            <a:prstTxWarp prst="textNoShape">
+              <a:avLst/>
+            </a:prstTxWarp>
+            <a:noAutofit/>
+          </a:bodyPr>
+          <a:lstStyle/>
+          <a:p>
+            <a:pPr algn="ctr" defTabSz="932472" fontAlgn="base">
+              <a:lnSpc>
+                <a:spcPct val="90000"/>
+              </a:lnSpc>
+              <a:spcBef>
+                <a:spcPct val="0"/>
+              </a:spcBef>
+              <a:spcAft>
+                <a:spcPct val="0"/>
+              </a:spcAft>
+            </a:pPr>
+            <a:r>
+              <a:rPr lang="en-US" sz="2400" dirty="0">
+                <a:solidFill>
+                  <a:srgbClr val="E95EBE"/>
+                </a:solidFill>
+                <a:ea typeface="Segoe UI" pitchFamily="34" charset="0"/>
+                <a:cs typeface="Segoe UI" pitchFamily="34" charset="0"/>
+              </a:rPr>
+              <a:t>????????????????????????????</a:t>
+            </a:r>
+          </a:p>
+        </p:txBody>
+      </p:sp>
+    </p:spTree>
+    <p:extLst>
+      <p:ext uri="{BB962C8B-B14F-4D97-AF65-F5344CB8AC3E}">
+        <p14:creationId xmlns:p14="http://schemas.microsoft.com/office/powerpoint/2010/main" val="205074615"/>
+      </p:ext>
+    </p:extLst>
+  </p:cSld>
+  <p:clrMapOvr>
+    <a:masterClrMapping/>
+  </p:clrMapOvr>
+  <p:transition>
+    <p:fade/>
+  </p:transition>
+</p:sld>
+</file>
+
+<file path=ppt/slides/slide7.xml><?xml version="1.0" encoding="utf-8"?>
+<p:sld xmlns:a="http://schemas.openxmlformats.org/drawingml/2006/main" xmlns:r="http://schemas.openxmlformats.org/officeDocument/2006/relationships" xmlns:p="http://schemas.openxmlformats.org/presentationml/2006/main">
+  <p:cSld>
+    <p:spTree>
+      <p:nvGrpSpPr>
+        <p:cNvPr id="1" name=""/>
+        <p:cNvGrpSpPr/>
+        <p:nvPr/>
+      </p:nvGrpSpPr>
+      <p:grpSpPr>
+        <a:xfrm>
+          <a:off x="0" y="0"/>
+          <a:ext cx="0" cy="0"/>
+          <a:chOff x="0" y="0"/>
+          <a:chExt cx="0" cy="0"/>
+        </a:xfrm>
+      </p:grpSpPr>
+      <p:sp>
+        <p:nvSpPr>
+          <p:cNvPr id="2" name="Title 1"/>
+          <p:cNvSpPr>
+            <a:spLocks noGrp="1"/>
+          </p:cNvSpPr>
+          <p:nvPr>
+            <p:ph type="title"/>
+          </p:nvPr>
+        </p:nvSpPr>
+        <p:spPr/>
+        <p:txBody>
+          <a:bodyPr/>
+          <a:lstStyle/>
+          <a:p>
+            <a:r>
+              <a:rPr lang="en-US" dirty="0"/>
+              <a:t>Answer</a:t>
+            </a:r>
+          </a:p>
+        </p:txBody>
+      </p:sp>
+      <p:sp>
+        <p:nvSpPr>
+          <p:cNvPr id="3" name="Content Placeholder 2"/>
+          <p:cNvSpPr>
+            <a:spLocks noGrp="1"/>
+          </p:cNvSpPr>
+          <p:nvPr>
+            <p:ph idx="1"/>
+          </p:nvPr>
+        </p:nvSpPr>
+        <p:spPr/>
+        <p:txBody>
+          <a:bodyPr anchor="ctr">
+            <a:normAutofit/>
+          </a:bodyPr>
+          <a:lstStyle/>
+          <a:p>
+            <a:pPr marL="57150" indent="0">
+              <a:buNone/>
+            </a:pPr>
+            <a:r>
+              <a:rPr lang="en-US" sz="4800" dirty="0">
+                <a:solidFill>
+                  <a:srgbClr val="0000FF"/>
+                </a:solidFill>
+                <a:latin typeface="Consolas" panose="020B0609020204030204" pitchFamily="49" charset="0"/>
+              </a:rPr>
+              <a:t>function</a:t>
+            </a:r>
+            <a:r>
+              <a:rPr lang="en-US" sz="4800" dirty="0">
+                <a:solidFill>
+                  <a:srgbClr val="000000"/>
+                </a:solidFill>
+                <a:latin typeface="Consolas" panose="020B0609020204030204" pitchFamily="49" charset="0"/>
+              </a:rPr>
+              <a:t> </a:t>
+            </a:r>
+            <a:r>
+              <a:rPr lang="en-US" sz="4800" dirty="0" err="1">
+                <a:solidFill>
+                  <a:srgbClr val="000000"/>
+                </a:solidFill>
+                <a:latin typeface="Consolas" panose="020B0609020204030204" pitchFamily="49" charset="0"/>
+              </a:rPr>
+              <a:t>doSomething</a:t>
+            </a:r>
+            <a:r>
+              <a:rPr lang="en-US" sz="4800" dirty="0">
+                <a:solidFill>
+                  <a:srgbClr val="000000"/>
+                </a:solidFill>
+                <a:latin typeface="Consolas" panose="020B0609020204030204" pitchFamily="49" charset="0"/>
+              </a:rPr>
+              <a:t>() {</a:t>
+            </a:r>
+          </a:p>
+          <a:p>
+            <a:pPr marL="57150" indent="0">
+              <a:buNone/>
+            </a:pPr>
+            <a:r>
+              <a:rPr lang="en-US" sz="4800" dirty="0">
+                <a:solidFill>
+                  <a:srgbClr val="000000"/>
+                </a:solidFill>
+                <a:latin typeface="Consolas" panose="020B0609020204030204" pitchFamily="49" charset="0"/>
+              </a:rPr>
+              <a:t>    alert(</a:t>
+            </a:r>
+            <a:r>
+              <a:rPr lang="en-US" sz="4800" dirty="0">
+                <a:solidFill>
+                  <a:srgbClr val="A31515"/>
+                </a:solidFill>
+                <a:latin typeface="Consolas" panose="020B0609020204030204" pitchFamily="49" charset="0"/>
+              </a:rPr>
+              <a:t>"JS Code"</a:t>
+            </a:r>
+            <a:r>
+              <a:rPr lang="en-US" sz="4800" dirty="0">
+                <a:solidFill>
+                  <a:srgbClr val="000000"/>
+                </a:solidFill>
+                <a:latin typeface="Consolas" panose="020B0609020204030204" pitchFamily="49" charset="0"/>
+              </a:rPr>
+              <a:t>);</a:t>
+            </a:r>
+          </a:p>
+          <a:p>
+            <a:pPr marL="57150" indent="0">
+              <a:buNone/>
+            </a:pPr>
+            <a:r>
+              <a:rPr lang="en-US" sz="4800" dirty="0">
+                <a:solidFill>
+                  <a:srgbClr val="000000"/>
+                </a:solidFill>
+                <a:latin typeface="Consolas" panose="020B0609020204030204" pitchFamily="49" charset="0"/>
+              </a:rPr>
+              <a:t>}</a:t>
+            </a:r>
           </a:p>
         </p:txBody>
       </p:sp>
@@ -38645,13 +38186,6 @@
   <p:transition>
     <p:fade/>
   </p:transition>
-  <p:timing>
-    <p:tnLst>
-      <p:par>
-        <p:cTn id="1" dur="indefinite" restart="never" nodeType="tmRoot"/>
-      </p:par>
-    </p:tnLst>
-  </p:timing>
 </p:sld>
 </file>
 
@@ -38694,18 +38228,10 @@
           <a:p>
             <a:r>
               <a:rPr lang="en-US" dirty="0"/>
-              <a:t>4</a:t>
+              <a:t>4. Write the proper attribute to call a function named </a:t>
             </a:r>
             <a:r>
-              <a:rPr lang="en-US" dirty="0" smtClean="0"/>
-              <a:t>. Write </a:t>
-            </a:r>
-            <a:r>
-              <a:rPr lang="en-US" dirty="0" smtClean="0"/>
-              <a:t>the proper attribute to call a function named </a:t>
-            </a:r>
-            <a:r>
-              <a:rPr lang="en-US" sz="4000" cap="none" dirty="0" err="1" smtClean="0">
+              <a:rPr lang="en-US" sz="4000" cap="none" dirty="0" err="1">
                 <a:solidFill>
                   <a:schemeClr val="accent1">
                     <a:lumMod val="20000"/>
@@ -38717,10 +38243,9 @@
               <a:t>SendMessage</a:t>
             </a:r>
             <a:r>
-              <a:rPr lang="en-US" dirty="0" smtClean="0"/>
+              <a:rPr lang="en-US" dirty="0"/>
               <a:t> when a button is clicked</a:t>
             </a:r>
-            <a:endParaRPr lang="en-US" dirty="0"/>
           </a:p>
         </p:txBody>
       </p:sp>
@@ -38766,7 +38291,7 @@
               <a:t> </a:t>
             </a:r>
             <a:r>
-              <a:rPr lang="en-US" sz="4800" dirty="0" smtClean="0">
+              <a:rPr lang="en-US" sz="4800" dirty="0">
                 <a:solidFill>
                   <a:srgbClr val="CD3131"/>
                 </a:solidFill>
@@ -38775,7 +38300,7 @@
               <a:t>… </a:t>
             </a:r>
             <a:r>
-              <a:rPr lang="en-US" sz="4800" dirty="0" smtClean="0">
+              <a:rPr lang="en-US" sz="4800" dirty="0">
                 <a:solidFill>
                   <a:srgbClr val="800000"/>
                 </a:solidFill>
@@ -38876,7 +38401,7 @@
                 <a:spcPct val="0"/>
               </a:spcAft>
             </a:pPr>
-            <a:endParaRPr lang="en-US" sz="2400" dirty="0" err="1" smtClean="0">
+            <a:endParaRPr lang="en-US" sz="2400" dirty="0" err="1">
               <a:gradFill>
                 <a:gsLst>
                   <a:gs pos="0">
@@ -38925,7 +38450,7 @@
               </a:spcAft>
             </a:pPr>
             <a:r>
-              <a:rPr lang="en-US" sz="2400" dirty="0" smtClean="0">
+              <a:rPr lang="en-US" sz="2400" dirty="0">
                 <a:solidFill>
                   <a:schemeClr val="accent1"/>
                 </a:solidFill>
@@ -38948,13 +38473,6 @@
   <p:transition>
     <p:fade/>
   </p:transition>
-  <p:timing>
-    <p:tnLst>
-      <p:par>
-        <p:cTn id="1" dur="indefinite" restart="never" nodeType="tmRoot"/>
-      </p:par>
-    </p:tnLst>
-  </p:timing>
 </p:sld>
 </file>
 
@@ -38991,10 +38509,9 @@
           <a:lstStyle/>
           <a:p>
             <a:r>
-              <a:rPr lang="en-US" dirty="0" smtClean="0"/>
+              <a:rPr lang="en-US" dirty="0"/>
               <a:t>Answer</a:t>
             </a:r>
-            <a:endParaRPr lang="en-US" dirty="0"/>
           </a:p>
         </p:txBody>
       </p:sp>
@@ -39046,7 +38563,7 @@
               <a:t>onclick</a:t>
             </a:r>
             <a:r>
-              <a:rPr lang="en-US" sz="3200" dirty="0" smtClean="0">
+              <a:rPr lang="en-US" sz="3200" dirty="0">
                 <a:solidFill>
                   <a:srgbClr val="000000"/>
                 </a:solidFill>
@@ -39055,7 +38572,7 @@
               <a:t>=</a:t>
             </a:r>
             <a:r>
-              <a:rPr lang="en-US" sz="3200" dirty="0" smtClean="0">
+              <a:rPr lang="en-US" sz="3200" dirty="0">
                 <a:solidFill>
                   <a:srgbClr val="0000FF"/>
                 </a:solidFill>
@@ -39064,7 +38581,7 @@
               <a:t>"</a:t>
             </a:r>
             <a:r>
-              <a:rPr lang="en-US" sz="3200" dirty="0" err="1" smtClean="0">
+              <a:rPr lang="en-US" sz="3200" dirty="0" err="1">
                 <a:solidFill>
                   <a:srgbClr val="0000FF"/>
                 </a:solidFill>
@@ -39106,16 +38623,7 @@
                 </a:solidFill>
                 <a:latin typeface="Consolas" panose="020B0609020204030204" pitchFamily="49" charset="0"/>
               </a:rPr>
-              <a:t>&lt;/button</a:t>
-            </a:r>
-            <a:r>
-              <a:rPr lang="en-US" sz="3200" dirty="0" smtClean="0">
-                <a:solidFill>
-                  <a:srgbClr val="800000"/>
-                </a:solidFill>
-                <a:latin typeface="Consolas" panose="020B0609020204030204" pitchFamily="49" charset="0"/>
-              </a:rPr>
-              <a:t>&gt;</a:t>
+              <a:t>&lt;/button&gt;</a:t>
             </a:r>
           </a:p>
           <a:p>
@@ -39194,7 +38702,7 @@
                 <a:spcPct val="0"/>
               </a:spcAft>
             </a:pPr>
-            <a:endParaRPr lang="en-US" sz="2400" dirty="0" err="1" smtClean="0">
+            <a:endParaRPr lang="en-US" sz="2400" dirty="0" err="1">
               <a:gradFill>
                 <a:gsLst>
                   <a:gs pos="0">
@@ -39225,13 +38733,6 @@
   <p:transition>
     <p:fade/>
   </p:transition>
-  <p:timing>
-    <p:tnLst>
-      <p:par>
-        <p:cTn id="1" dur="indefinite" restart="never" nodeType="tmRoot"/>
-      </p:par>
-    </p:tnLst>
-  </p:timing>
 </p:sld>
 </file>
 

</xml_diff>

<commit_message>
Update gitbook 2022-09-06 20:00:31
</commit_message>
<xml_diff>
--- a/Week04/Review.pptx
+++ b/Week04/Review.pptx
@@ -223,7 +223,7 @@
           <a:p>
             <a:fld id="{19104133-B5B0-4351-8158-4F0E5EB1E2BF}" type="datetimeFigureOut">
               <a:rPr lang="en-US" smtClean="0"/>
-              <a:t>10/20/2020</a:t>
+              <a:t>9/6/2022</a:t>
             </a:fld>
             <a:endParaRPr lang="en-US"/>
           </a:p>
@@ -287,38 +287,37 @@
           <a:p>
             <a:pPr lvl="0"/>
             <a:r>
-              <a:rPr lang="en-US" smtClean="0"/>
+              <a:rPr lang="en-US"/>
               <a:t>Edit Master text styles</a:t>
             </a:r>
           </a:p>
           <a:p>
             <a:pPr lvl="1"/>
             <a:r>
-              <a:rPr lang="en-US" smtClean="0"/>
+              <a:rPr lang="en-US"/>
               <a:t>Second level</a:t>
             </a:r>
           </a:p>
           <a:p>
             <a:pPr lvl="2"/>
             <a:r>
-              <a:rPr lang="en-US" smtClean="0"/>
+              <a:rPr lang="en-US"/>
               <a:t>Third level</a:t>
             </a:r>
           </a:p>
           <a:p>
             <a:pPr lvl="3"/>
             <a:r>
-              <a:rPr lang="en-US" smtClean="0"/>
+              <a:rPr lang="en-US"/>
               <a:t>Fourth level</a:t>
             </a:r>
           </a:p>
           <a:p>
             <a:pPr lvl="4"/>
             <a:r>
-              <a:rPr lang="en-US" smtClean="0"/>
+              <a:rPr lang="en-US"/>
               <a:t>Fifth level</a:t>
             </a:r>
-            <a:endParaRPr lang="en-US"/>
           </a:p>
         </p:txBody>
       </p:sp>
@@ -536,18 +535,17 @@
           <a:lstStyle/>
           <a:p>
             <a:r>
-              <a:rPr lang="en-US" dirty="0" smtClean="0"/>
+              <a:rPr lang="en-US" dirty="0"/>
               <a:t>&lt;script </a:t>
             </a:r>
             <a:r>
-              <a:rPr lang="en-US" dirty="0" err="1" smtClean="0"/>
+              <a:rPr lang="en-US" dirty="0" err="1"/>
               <a:t>src</a:t>
             </a:r>
             <a:r>
-              <a:rPr lang="en-US" dirty="0" smtClean="0"/>
+              <a:rPr lang="en-US" dirty="0"/>
               <a:t>=“script.js”&gt;&lt;/script&gt;</a:t>
             </a:r>
-            <a:endParaRPr lang="en-US" dirty="0"/>
           </a:p>
         </p:txBody>
       </p:sp>
@@ -632,7 +630,7 @@
           <a:lstStyle/>
           <a:p>
             <a:r>
-              <a:rPr lang="en-US" dirty="0" smtClean="0"/>
+              <a:rPr lang="en-US" dirty="0"/>
               <a:t>Need:</a:t>
             </a:r>
           </a:p>
@@ -642,11 +640,11 @@
               <a:buChar char="-"/>
             </a:pPr>
             <a:r>
-              <a:rPr lang="en-US" b="1" baseline="0" dirty="0" err="1" smtClean="0"/>
+              <a:rPr lang="en-US" b="1" baseline="0" dirty="0" err="1"/>
               <a:t>onclick</a:t>
             </a:r>
             <a:r>
-              <a:rPr lang="en-US" b="0" baseline="0" dirty="0" smtClean="0"/>
+              <a:rPr lang="en-US" b="0" baseline="0" dirty="0"/>
               <a:t> attribute name</a:t>
             </a:r>
           </a:p>
@@ -656,7 +654,7 @@
               <a:buChar char="-"/>
             </a:pPr>
             <a:r>
-              <a:rPr lang="en-US" b="0" baseline="0" dirty="0" smtClean="0"/>
+              <a:rPr lang="en-US" b="0" baseline="0" dirty="0"/>
               <a:t>Equals sign</a:t>
             </a:r>
           </a:p>
@@ -666,7 +664,7 @@
               <a:buChar char="-"/>
             </a:pPr>
             <a:r>
-              <a:rPr lang="en-US" b="0" baseline="0" dirty="0" smtClean="0"/>
+              <a:rPr lang="en-US" b="0" baseline="0" dirty="0"/>
               <a:t>Double quotes</a:t>
             </a:r>
           </a:p>
@@ -676,11 +674,11 @@
               <a:buChar char="-"/>
             </a:pPr>
             <a:r>
-              <a:rPr lang="en-US" b="1" baseline="0" dirty="0" err="1" smtClean="0"/>
+              <a:rPr lang="en-US" b="1" baseline="0" dirty="0" err="1"/>
               <a:t>SendMessage</a:t>
             </a:r>
             <a:r>
-              <a:rPr lang="en-US" b="0" baseline="0" dirty="0" smtClean="0"/>
+              <a:rPr lang="en-US" b="0" baseline="0" dirty="0"/>
               <a:t> function name</a:t>
             </a:r>
           </a:p>
@@ -690,7 +688,7 @@
               <a:buChar char="-"/>
             </a:pPr>
             <a:r>
-              <a:rPr lang="en-US" b="0" baseline="0" dirty="0" smtClean="0"/>
+              <a:rPr lang="en-US" b="0" baseline="0" dirty="0"/>
               <a:t>Parentheses</a:t>
             </a:r>
           </a:p>
@@ -700,7 +698,7 @@
               <a:buChar char="-"/>
             </a:pPr>
             <a:r>
-              <a:rPr lang="en-US" b="0" baseline="0" dirty="0" smtClean="0"/>
+              <a:rPr lang="en-US" b="0" baseline="0" dirty="0"/>
               <a:t>End double quotes</a:t>
             </a:r>
           </a:p>
@@ -709,7 +707,7 @@
               <a:buFontTx/>
               <a:buChar char="-"/>
             </a:pPr>
-            <a:endParaRPr lang="en-US" b="0" baseline="0" dirty="0" smtClean="0"/>
+            <a:endParaRPr lang="en-US" b="0" baseline="0" dirty="0"/>
           </a:p>
           <a:p>
             <a:pPr marL="0" indent="0">
@@ -717,7 +715,7 @@
               <a:buNone/>
             </a:pPr>
             <a:r>
-              <a:rPr lang="en-US" b="0" baseline="0" dirty="0" smtClean="0"/>
+              <a:rPr lang="en-US" b="0" baseline="0" dirty="0"/>
               <a:t>Also note the other parts of the button:</a:t>
             </a:r>
           </a:p>
@@ -727,11 +725,11 @@
               <a:buChar char="-"/>
             </a:pPr>
             <a:r>
-              <a:rPr lang="en-US" b="1" baseline="0" dirty="0" smtClean="0"/>
+              <a:rPr lang="en-US" b="1" baseline="0" dirty="0"/>
               <a:t>button</a:t>
             </a:r>
             <a:r>
-              <a:rPr lang="en-US" b="0" baseline="0" dirty="0" smtClean="0"/>
+              <a:rPr lang="en-US" b="0" baseline="0" dirty="0"/>
               <a:t> tag (opening and closing)</a:t>
             </a:r>
           </a:p>
@@ -741,10 +739,10 @@
               <a:buChar char="-"/>
             </a:pPr>
             <a:r>
-              <a:rPr lang="en-US" b="0" baseline="0" dirty="0" smtClean="0"/>
+              <a:rPr lang="en-US" b="0" baseline="0" dirty="0"/>
               <a:t>Button text (“Click me!”)</a:t>
             </a:r>
-            <a:endParaRPr lang="en-US" b="1" baseline="0" dirty="0" smtClean="0"/>
+            <a:endParaRPr lang="en-US" b="1" baseline="0" dirty="0"/>
           </a:p>
         </p:txBody>
       </p:sp>
@@ -997,11 +995,11 @@
           <a:lstStyle/>
           <a:p>
             <a:r>
-              <a:rPr lang="en-US" dirty="0" smtClean="0"/>
+              <a:rPr lang="en-US" dirty="0"/>
               <a:t>If necessary, the first to</a:t>
             </a:r>
             <a:r>
-              <a:rPr lang="en-US" baseline="0" dirty="0" smtClean="0"/>
+              <a:rPr lang="en-US" baseline="0" dirty="0"/>
               <a:t> answer the tie-breaker question wins.</a:t>
             </a:r>
             <a:endParaRPr lang="en-US" dirty="0"/>
@@ -1184,15 +1182,7 @@
           <a:p>
             <a:r>
               <a:rPr lang="en-US" dirty="0"/>
-              <a:t>Click to edit Master </a:t>
-            </a:r>
-            <a:r>
-              <a:rPr lang="en-US" dirty="0" smtClean="0"/>
-              <a:t>subtitle </a:t>
-            </a:r>
-            <a:r>
-              <a:rPr lang="en-US" dirty="0"/>
-              <a:t>style</a:t>
+              <a:t>Click to edit Master subtitle style</a:t>
             </a:r>
           </a:p>
         </p:txBody>
@@ -1234,7 +1224,7 @@
             <a:fld id="{1C2D31DE-C454-491C-B5C3-F097855E3DF7}" type="datetime4">
               <a:rPr lang="en-US" smtClean="0"/>
               <a:pPr/>
-              <a:t>October 20, 2020</a:t>
+              <a:t>September 6, 2022</a:t>
             </a:fld>
             <a:endParaRPr lang="en-US" dirty="0"/>
           </a:p>
@@ -4308,17 +4298,16 @@
           <a:p>
             <a:pPr lvl="0"/>
             <a:r>
-              <a:rPr lang="en-US" dirty="0" smtClean="0"/>
+              <a:rPr lang="en-US" dirty="0"/>
               <a:t>Presenter Name</a:t>
             </a:r>
             <a:br>
-              <a:rPr lang="en-US" dirty="0" smtClean="0"/>
+              <a:rPr lang="en-US" dirty="0"/>
             </a:br>
             <a:r>
-              <a:rPr lang="en-US" dirty="0" smtClean="0"/>
+              <a:rPr lang="en-US" dirty="0"/>
               <a:t>Presenter Title</a:t>
             </a:r>
-            <a:endParaRPr lang="en-US" dirty="0"/>
           </a:p>
         </p:txBody>
       </p:sp>
@@ -4335,13 +4324,6 @@
   <p:transition>
     <p:fade/>
   </p:transition>
-  <p:timing>
-    <p:tnLst>
-      <p:par>
-        <p:cTn id="1" dur="indefinite" restart="never" nodeType="tmRoot"/>
-      </p:par>
-    </p:tnLst>
-  </p:timing>
   <p:hf sldNum="0" hdr="0" ftr="0"/>
 </p:sldLayout>
 </file>
@@ -4634,7 +4616,7 @@
           <a:p>
             <a:fld id="{5958763E-B898-436D-883D-03711491D54A}" type="datetimeFigureOut">
               <a:rPr lang="en-US" smtClean="0"/>
-              <a:t>10/20/2020</a:t>
+              <a:t>9/6/2022</a:t>
             </a:fld>
             <a:endParaRPr lang="en-US"/>
           </a:p>
@@ -4707,13 +4689,6 @@
   <p:transition>
     <p:fade/>
   </p:transition>
-  <p:timing>
-    <p:tnLst>
-      <p:par>
-        <p:cTn id="1" dur="indefinite" restart="never" nodeType="tmRoot"/>
-      </p:par>
-    </p:tnLst>
-  </p:timing>
 </p:sldLayout>
 </file>
 
@@ -4762,10 +4737,9 @@
           </a:lstStyle>
           <a:p>
             <a:r>
-              <a:rPr lang="en-US" dirty="0" smtClean="0"/>
+              <a:rPr lang="en-US" dirty="0"/>
               <a:t>Click icon to add picture</a:t>
             </a:r>
-            <a:endParaRPr lang="en-US" dirty="0"/>
           </a:p>
         </p:txBody>
       </p:sp>
@@ -4835,7 +4809,7 @@
           <a:p>
             <a:fld id="{5958763E-B898-436D-883D-03711491D54A}" type="datetimeFigureOut">
               <a:rPr lang="en-US" smtClean="0"/>
-              <a:t>10/20/2020</a:t>
+              <a:t>9/6/2022</a:t>
             </a:fld>
             <a:endParaRPr lang="en-US"/>
           </a:p>
@@ -4908,13 +4882,6 @@
   <p:transition>
     <p:fade/>
   </p:transition>
-  <p:timing>
-    <p:tnLst>
-      <p:par>
-        <p:cTn id="1" dur="indefinite" restart="never" nodeType="tmRoot"/>
-      </p:par>
-    </p:tnLst>
-  </p:timing>
 </p:sldLayout>
 </file>
 
@@ -5092,7 +5059,7 @@
           <a:p>
             <a:fld id="{5958763E-B898-436D-883D-03711491D54A}" type="datetimeFigureOut">
               <a:rPr lang="en-US" smtClean="0"/>
-              <a:t>10/20/2020</a:t>
+              <a:t>9/6/2022</a:t>
             </a:fld>
             <a:endParaRPr lang="en-US"/>
           </a:p>
@@ -5165,13 +5132,6 @@
   <p:transition>
     <p:fade/>
   </p:transition>
-  <p:timing>
-    <p:tnLst>
-      <p:par>
-        <p:cTn id="1" dur="indefinite" restart="never" nodeType="tmRoot"/>
-      </p:par>
-    </p:tnLst>
-  </p:timing>
 </p:sldLayout>
 </file>
 
@@ -5447,7 +5407,7 @@
           <a:p>
             <a:fld id="{5958763E-B898-436D-883D-03711491D54A}" type="datetimeFigureOut">
               <a:rPr lang="en-US" smtClean="0"/>
-              <a:t>10/20/2020</a:t>
+              <a:t>9/6/2022</a:t>
             </a:fld>
             <a:endParaRPr lang="en-US"/>
           </a:p>
@@ -5508,13 +5468,6 @@
   <p:transition>
     <p:fade/>
   </p:transition>
-  <p:timing>
-    <p:tnLst>
-      <p:par>
-        <p:cTn id="1" dur="indefinite" restart="never" nodeType="tmRoot"/>
-      </p:par>
-    </p:tnLst>
-  </p:timing>
 </p:sldLayout>
 </file>
 
@@ -5870,7 +5823,7 @@
           <a:p>
             <a:fld id="{5958763E-B898-436D-883D-03711491D54A}" type="datetimeFigureOut">
               <a:rPr lang="en-US" smtClean="0"/>
-              <a:t>10/20/2020</a:t>
+              <a:t>9/6/2022</a:t>
             </a:fld>
             <a:endParaRPr lang="en-US"/>
           </a:p>
@@ -5931,13 +5884,6 @@
   <p:transition>
     <p:fade/>
   </p:transition>
-  <p:timing>
-    <p:tnLst>
-      <p:par>
-        <p:cTn id="1" dur="indefinite" restart="never" nodeType="tmRoot"/>
-      </p:par>
-    </p:tnLst>
-  </p:timing>
 </p:sldLayout>
 </file>
 
@@ -6378,7 +6324,7 @@
           <a:p>
             <a:fld id="{5958763E-B898-436D-883D-03711491D54A}" type="datetimeFigureOut">
               <a:rPr lang="en-US" smtClean="0"/>
-              <a:t>10/20/2020</a:t>
+              <a:t>9/6/2022</a:t>
             </a:fld>
             <a:endParaRPr lang="en-US"/>
           </a:p>
@@ -6439,13 +6385,6 @@
   <p:transition>
     <p:fade/>
   </p:transition>
-  <p:timing>
-    <p:tnLst>
-      <p:par>
-        <p:cTn id="1" dur="indefinite" restart="never" nodeType="tmRoot"/>
-      </p:par>
-    </p:tnLst>
-  </p:timing>
 </p:sldLayout>
 </file>
 
@@ -6836,7 +6775,7 @@
           <a:p>
             <a:fld id="{5958763E-B898-436D-883D-03711491D54A}" type="datetimeFigureOut">
               <a:rPr lang="en-US" smtClean="0"/>
-              <a:t>10/20/2020</a:t>
+              <a:t>9/6/2022</a:t>
             </a:fld>
             <a:endParaRPr lang="en-US"/>
           </a:p>
@@ -6897,13 +6836,6 @@
   <p:transition>
     <p:fade/>
   </p:transition>
-  <p:timing>
-    <p:tnLst>
-      <p:par>
-        <p:cTn id="1" dur="indefinite" restart="never" nodeType="tmRoot"/>
-      </p:par>
-    </p:tnLst>
-  </p:timing>
 </p:sldLayout>
 </file>
 
@@ -7454,7 +7386,7 @@
           <a:p>
             <a:fld id="{5958763E-B898-436D-883D-03711491D54A}" type="datetimeFigureOut">
               <a:rPr lang="en-US" smtClean="0"/>
-              <a:t>10/20/2020</a:t>
+              <a:t>9/6/2022</a:t>
             </a:fld>
             <a:endParaRPr lang="en-US"/>
           </a:p>
@@ -7515,13 +7447,6 @@
   <p:transition>
     <p:fade/>
   </p:transition>
-  <p:timing>
-    <p:tnLst>
-      <p:par>
-        <p:cTn id="1" dur="indefinite" restart="never" nodeType="tmRoot"/>
-      </p:par>
-    </p:tnLst>
-  </p:timing>
 </p:sldLayout>
 </file>
 
@@ -8232,7 +8157,7 @@
           <a:p>
             <a:fld id="{5958763E-B898-436D-883D-03711491D54A}" type="datetimeFigureOut">
               <a:rPr lang="en-US" smtClean="0"/>
-              <a:t>10/20/2020</a:t>
+              <a:t>9/6/2022</a:t>
             </a:fld>
             <a:endParaRPr lang="en-US"/>
           </a:p>
@@ -8293,13 +8218,6 @@
   <p:transition>
     <p:fade/>
   </p:transition>
-  <p:timing>
-    <p:tnLst>
-      <p:par>
-        <p:cTn id="1" dur="indefinite" restart="never" nodeType="tmRoot"/>
-      </p:par>
-    </p:tnLst>
-  </p:timing>
 </p:sldLayout>
 </file>
 
@@ -8343,7 +8261,7 @@
           <a:p>
             <a:fld id="{5958763E-B898-436D-883D-03711491D54A}" type="datetimeFigureOut">
               <a:rPr lang="en-US" smtClean="0"/>
-              <a:t>10/20/2020</a:t>
+              <a:t>9/6/2022</a:t>
             </a:fld>
             <a:endParaRPr lang="en-US"/>
           </a:p>
@@ -8416,13 +8334,6 @@
   <p:transition>
     <p:fade/>
   </p:transition>
-  <p:timing>
-    <p:tnLst>
-      <p:par>
-        <p:cTn id="1" dur="indefinite" restart="never" nodeType="tmRoot"/>
-      </p:par>
-    </p:tnLst>
-  </p:timing>
 </p:sldLayout>
 </file>
 
@@ -8502,7 +8413,7 @@
                 <a:spcPct val="0"/>
               </a:spcAft>
             </a:pPr>
-            <a:endParaRPr lang="en-US" sz="2400" dirty="0" err="1" smtClean="0">
+            <a:endParaRPr lang="en-US" sz="2400" dirty="0" err="1">
               <a:gradFill>
                 <a:gsLst>
                   <a:gs pos="0">
@@ -8635,15 +8546,7 @@
           <a:p>
             <a:r>
               <a:rPr lang="en-US" dirty="0"/>
-              <a:t>Click to edit Master </a:t>
-            </a:r>
-            <a:r>
-              <a:rPr lang="en-US" dirty="0" smtClean="0"/>
-              <a:t>subtitle </a:t>
-            </a:r>
-            <a:r>
-              <a:rPr lang="en-US" dirty="0"/>
-              <a:t>style</a:t>
+              <a:t>Click to edit Master subtitle style</a:t>
             </a:r>
           </a:p>
         </p:txBody>
@@ -8685,7 +8588,7 @@
             <a:fld id="{1C2D31DE-C454-491C-B5C3-F097855E3DF7}" type="datetime4">
               <a:rPr lang="en-US" smtClean="0"/>
               <a:pPr/>
-              <a:t>October 20, 2020</a:t>
+              <a:t>September 6, 2022</a:t>
             </a:fld>
             <a:endParaRPr lang="en-US" dirty="0"/>
           </a:p>
@@ -11759,17 +11662,16 @@
           <a:p>
             <a:pPr lvl="0"/>
             <a:r>
-              <a:rPr lang="en-US" dirty="0" smtClean="0"/>
+              <a:rPr lang="en-US" dirty="0"/>
               <a:t>Presenter Name</a:t>
             </a:r>
             <a:br>
-              <a:rPr lang="en-US" dirty="0" smtClean="0"/>
+              <a:rPr lang="en-US" dirty="0"/>
             </a:br>
             <a:r>
-              <a:rPr lang="en-US" dirty="0" smtClean="0"/>
+              <a:rPr lang="en-US" dirty="0"/>
               <a:t>Presenter Title</a:t>
             </a:r>
-            <a:endParaRPr lang="en-US" dirty="0"/>
           </a:p>
         </p:txBody>
       </p:sp>
@@ -11786,13 +11688,6 @@
   <p:transition>
     <p:fade/>
   </p:transition>
-  <p:timing>
-    <p:tnLst>
-      <p:par>
-        <p:cTn id="1" dur="indefinite" restart="never" nodeType="tmRoot"/>
-      </p:par>
-    </p:tnLst>
-  </p:timing>
   <p:hf sldNum="0" hdr="0" ftr="0"/>
 </p:sldLayout>
 </file>
@@ -11845,7 +11740,7 @@
           <a:p>
             <a:fld id="{5958763E-B898-436D-883D-03711491D54A}" type="datetimeFigureOut">
               <a:rPr lang="en-US" smtClean="0"/>
-              <a:t>10/20/2020</a:t>
+              <a:t>9/6/2022</a:t>
             </a:fld>
             <a:endParaRPr lang="en-US"/>
           </a:p>
@@ -11918,13 +11813,6 @@
   <p:transition>
     <p:fade/>
   </p:transition>
-  <p:timing>
-    <p:tnLst>
-      <p:par>
-        <p:cTn id="1" dur="indefinite" restart="never" nodeType="tmRoot"/>
-      </p:par>
-    </p:tnLst>
-  </p:timing>
 </p:sldLayout>
 </file>
 
@@ -11976,7 +11864,7 @@
           <a:p>
             <a:fld id="{5958763E-B898-436D-883D-03711491D54A}" type="datetimeFigureOut">
               <a:rPr lang="en-US" smtClean="0"/>
-              <a:t>10/20/2020</a:t>
+              <a:t>9/6/2022</a:t>
             </a:fld>
             <a:endParaRPr lang="en-US"/>
           </a:p>
@@ -12049,13 +11937,6 @@
   <p:transition>
     <p:fade/>
   </p:transition>
-  <p:timing>
-    <p:tnLst>
-      <p:par>
-        <p:cTn id="1" dur="indefinite" restart="never" nodeType="tmRoot"/>
-      </p:par>
-    </p:tnLst>
-  </p:timing>
 </p:sldLayout>
 </file>
 
@@ -12107,7 +11988,7 @@
           <a:p>
             <a:fld id="{5958763E-B898-436D-883D-03711491D54A}" type="datetimeFigureOut">
               <a:rPr lang="en-US" smtClean="0"/>
-              <a:t>10/20/2020</a:t>
+              <a:t>9/6/2022</a:t>
             </a:fld>
             <a:endParaRPr lang="en-US"/>
           </a:p>
@@ -12180,13 +12061,6 @@
   <p:transition>
     <p:fade/>
   </p:transition>
-  <p:timing>
-    <p:tnLst>
-      <p:par>
-        <p:cTn id="1" dur="indefinite" restart="never" nodeType="tmRoot"/>
-      </p:par>
-    </p:tnLst>
-  </p:timing>
 </p:sldLayout>
 </file>
 
@@ -12238,7 +12112,7 @@
           <a:p>
             <a:fld id="{5958763E-B898-436D-883D-03711491D54A}" type="datetimeFigureOut">
               <a:rPr lang="en-US" smtClean="0"/>
-              <a:t>10/20/2020</a:t>
+              <a:t>9/6/2022</a:t>
             </a:fld>
             <a:endParaRPr lang="en-US"/>
           </a:p>
@@ -12311,13 +12185,6 @@
   <p:transition>
     <p:fade/>
   </p:transition>
-  <p:timing>
-    <p:tnLst>
-      <p:par>
-        <p:cTn id="1" dur="indefinite" restart="never" nodeType="tmRoot"/>
-      </p:par>
-    </p:tnLst>
-  </p:timing>
 </p:sldLayout>
 </file>
 
@@ -12369,7 +12236,7 @@
           <a:p>
             <a:fld id="{5958763E-B898-436D-883D-03711491D54A}" type="datetimeFigureOut">
               <a:rPr lang="en-US" smtClean="0"/>
-              <a:t>10/20/2020</a:t>
+              <a:t>9/6/2022</a:t>
             </a:fld>
             <a:endParaRPr lang="en-US"/>
           </a:p>
@@ -12442,13 +12309,6 @@
   <p:transition>
     <p:fade/>
   </p:transition>
-  <p:timing>
-    <p:tnLst>
-      <p:par>
-        <p:cTn id="1" dur="indefinite" restart="never" nodeType="tmRoot"/>
-      </p:par>
-    </p:tnLst>
-  </p:timing>
 </p:sldLayout>
 </file>
 
@@ -12500,7 +12360,7 @@
           <a:p>
             <a:fld id="{5958763E-B898-436D-883D-03711491D54A}" type="datetimeFigureOut">
               <a:rPr lang="en-US" smtClean="0"/>
-              <a:t>10/20/2020</a:t>
+              <a:t>9/6/2022</a:t>
             </a:fld>
             <a:endParaRPr lang="en-US"/>
           </a:p>
@@ -12573,13 +12433,6 @@
   <p:transition>
     <p:fade/>
   </p:transition>
-  <p:timing>
-    <p:tnLst>
-      <p:par>
-        <p:cTn id="1" dur="indefinite" restart="never" nodeType="tmRoot"/>
-      </p:par>
-    </p:tnLst>
-  </p:timing>
 </p:sldLayout>
 </file>
 
@@ -12631,7 +12484,7 @@
           <a:p>
             <a:fld id="{5958763E-B898-436D-883D-03711491D54A}" type="datetimeFigureOut">
               <a:rPr lang="en-US" smtClean="0"/>
-              <a:t>10/20/2020</a:t>
+              <a:t>9/6/2022</a:t>
             </a:fld>
             <a:endParaRPr lang="en-US"/>
           </a:p>
@@ -12704,13 +12557,6 @@
   <p:transition>
     <p:fade/>
   </p:transition>
-  <p:timing>
-    <p:tnLst>
-      <p:par>
-        <p:cTn id="1" dur="indefinite" restart="never" nodeType="tmRoot"/>
-      </p:par>
-    </p:tnLst>
-  </p:timing>
 </p:sldLayout>
 </file>
 
@@ -12762,7 +12608,7 @@
           <a:p>
             <a:fld id="{5958763E-B898-436D-883D-03711491D54A}" type="datetimeFigureOut">
               <a:rPr lang="en-US" smtClean="0"/>
-              <a:t>10/20/2020</a:t>
+              <a:t>9/6/2022</a:t>
             </a:fld>
             <a:endParaRPr lang="en-US"/>
           </a:p>
@@ -12835,13 +12681,6 @@
   <p:transition>
     <p:fade/>
   </p:transition>
-  <p:timing>
-    <p:tnLst>
-      <p:par>
-        <p:cTn id="1" dur="indefinite" restart="never" nodeType="tmRoot"/>
-      </p:par>
-    </p:tnLst>
-  </p:timing>
 </p:sldLayout>
 </file>
 
@@ -12902,7 +12741,7 @@
           <a:p>
             <a:fld id="{5958763E-B898-436D-883D-03711491D54A}" type="datetimeFigureOut">
               <a:rPr lang="en-US" smtClean="0"/>
-              <a:t>10/20/2020</a:t>
+              <a:t>9/6/2022</a:t>
             </a:fld>
             <a:endParaRPr lang="en-US"/>
           </a:p>
@@ -12975,13 +12814,6 @@
   <p:transition>
     <p:fade/>
   </p:transition>
-  <p:timing>
-    <p:tnLst>
-      <p:par>
-        <p:cTn id="1" dur="indefinite" restart="never" nodeType="tmRoot"/>
-      </p:par>
-    </p:tnLst>
-  </p:timing>
 </p:sldLayout>
 </file>
 
@@ -15983,13 +15815,6 @@
   <p:transition>
     <p:fade/>
   </p:transition>
-  <p:timing>
-    <p:tnLst>
-      <p:par>
-        <p:cTn id="1" dur="indefinite" restart="never" nodeType="tmRoot"/>
-      </p:par>
-    </p:tnLst>
-  </p:timing>
 </p:sldLayout>
 </file>
 
@@ -16077,7 +15902,7 @@
                 <a:spcPct val="0"/>
               </a:spcAft>
             </a:pPr>
-            <a:endParaRPr lang="en-US" sz="2400" dirty="0" err="1" smtClean="0">
+            <a:endParaRPr lang="en-US" sz="2400" dirty="0" err="1">
               <a:gradFill>
                 <a:gsLst>
                   <a:gs pos="0">
@@ -16213,15 +16038,7 @@
           <a:p>
             <a:r>
               <a:rPr lang="en-US" dirty="0"/>
-              <a:t>Click to edit Master </a:t>
-            </a:r>
-            <a:r>
-              <a:rPr lang="en-US" dirty="0" smtClean="0"/>
-              <a:t>subtitle </a:t>
-            </a:r>
-            <a:r>
-              <a:rPr lang="en-US" dirty="0"/>
-              <a:t>style</a:t>
+              <a:t>Click to edit Master subtitle style</a:t>
             </a:r>
           </a:p>
         </p:txBody>
@@ -16263,7 +16080,7 @@
             <a:fld id="{1C2D31DE-C454-491C-B5C3-F097855E3DF7}" type="datetime4">
               <a:rPr lang="en-US" smtClean="0"/>
               <a:pPr/>
-              <a:t>October 20, 2020</a:t>
+              <a:t>September 6, 2022</a:t>
             </a:fld>
             <a:endParaRPr lang="en-US" dirty="0"/>
           </a:p>
@@ -19345,17 +19162,16 @@
           <a:p>
             <a:pPr lvl="0"/>
             <a:r>
-              <a:rPr lang="en-US" dirty="0" smtClean="0"/>
+              <a:rPr lang="en-US" dirty="0"/>
               <a:t>Presenter Name</a:t>
             </a:r>
             <a:br>
-              <a:rPr lang="en-US" dirty="0" smtClean="0"/>
+              <a:rPr lang="en-US" dirty="0"/>
             </a:br>
             <a:r>
-              <a:rPr lang="en-US" dirty="0" smtClean="0"/>
+              <a:rPr lang="en-US" dirty="0"/>
               <a:t>Presenter Title</a:t>
             </a:r>
-            <a:endParaRPr lang="en-US" dirty="0"/>
           </a:p>
         </p:txBody>
       </p:sp>
@@ -19372,13 +19188,6 @@
   <p:transition>
     <p:fade/>
   </p:transition>
-  <p:timing>
-    <p:tnLst>
-      <p:par>
-        <p:cTn id="1" dur="indefinite" restart="never" nodeType="tmRoot"/>
-      </p:par>
-    </p:tnLst>
-  </p:timing>
   <p:hf sldNum="0" hdr="0" ftr="0"/>
 </p:sldLayout>
 </file>
@@ -26888,10 +26697,9 @@
           <a:p>
             <a:pPr lvl="0"/>
             <a:r>
-              <a:rPr lang="en-US" dirty="0" smtClean="0"/>
+              <a:rPr lang="en-US" dirty="0"/>
               <a:t>&lt;Call to action&gt;</a:t>
             </a:r>
-            <a:endParaRPr lang="en-US" dirty="0"/>
           </a:p>
         </p:txBody>
       </p:sp>
@@ -28508,7 +28316,7 @@
           <a:p>
             <a:fld id="{5958763E-B898-436D-883D-03711491D54A}" type="datetimeFigureOut">
               <a:rPr lang="en-US" smtClean="0"/>
-              <a:t>10/20/2020</a:t>
+              <a:t>9/6/2022</a:t>
             </a:fld>
             <a:endParaRPr lang="en-US"/>
           </a:p>
@@ -28635,7 +28443,7 @@
                 <a:spcPct val="0"/>
               </a:spcAft>
             </a:pPr>
-            <a:endParaRPr lang="en-US" sz="2400" dirty="0" err="1" smtClean="0">
+            <a:endParaRPr lang="en-US" sz="2400" dirty="0" err="1">
               <a:gradFill>
                 <a:gsLst>
                   <a:gs pos="0">
@@ -28666,13 +28474,6 @@
   <p:transition>
     <p:fade/>
   </p:transition>
-  <p:timing>
-    <p:tnLst>
-      <p:par>
-        <p:cTn id="1" dur="indefinite" restart="never" nodeType="tmRoot"/>
-      </p:par>
-    </p:tnLst>
-  </p:timing>
 </p:sldLayout>
 </file>
 
@@ -28917,7 +28718,7 @@
           <a:p>
             <a:fld id="{5958763E-B898-436D-883D-03711491D54A}" type="datetimeFigureOut">
               <a:rPr lang="en-US" smtClean="0"/>
-              <a:t>10/20/2020</a:t>
+              <a:t>9/6/2022</a:t>
             </a:fld>
             <a:endParaRPr lang="en-US"/>
           </a:p>
@@ -28990,13 +28791,6 @@
   <p:transition>
     <p:fade/>
   </p:transition>
-  <p:timing>
-    <p:tnLst>
-      <p:par>
-        <p:cTn id="1" dur="indefinite" restart="never" nodeType="tmRoot"/>
-      </p:par>
-    </p:tnLst>
-  </p:timing>
 </p:sldLayout>
 </file>
 
@@ -29218,7 +29012,7 @@
           <a:p>
             <a:fld id="{5958763E-B898-436D-883D-03711491D54A}" type="datetimeFigureOut">
               <a:rPr lang="en-US" smtClean="0"/>
-              <a:t>10/20/2020</a:t>
+              <a:t>9/6/2022</a:t>
             </a:fld>
             <a:endParaRPr lang="en-US"/>
           </a:p>
@@ -29291,13 +29085,6 @@
   <p:transition>
     <p:fade/>
   </p:transition>
-  <p:timing>
-    <p:tnLst>
-      <p:par>
-        <p:cTn id="1" dur="indefinite" restart="never" nodeType="tmRoot"/>
-      </p:par>
-    </p:tnLst>
-  </p:timing>
 </p:sldLayout>
 </file>
 
@@ -29426,7 +29213,7 @@
           <a:p>
             <a:fld id="{5958763E-B898-436D-883D-03711491D54A}" type="datetimeFigureOut">
               <a:rPr lang="en-US" smtClean="0"/>
-              <a:t>10/20/2020</a:t>
+              <a:t>9/6/2022</a:t>
             </a:fld>
             <a:endParaRPr lang="en-US"/>
           </a:p>
@@ -29549,13 +29336,6 @@
   <p:transition>
     <p:fade/>
   </p:transition>
-  <p:timing>
-    <p:tnLst>
-      <p:par>
-        <p:cTn id="1" dur="indefinite" restart="never" nodeType="tmRoot"/>
-      </p:par>
-    </p:tnLst>
-  </p:timing>
 </p:sldLayout>
 </file>
 
@@ -29694,7 +29474,7 @@
           <a:p>
             <a:fld id="{5958763E-B898-436D-883D-03711491D54A}" type="datetimeFigureOut">
               <a:rPr lang="en-US" smtClean="0"/>
-              <a:t>10/20/2020</a:t>
+              <a:t>9/6/2022</a:t>
             </a:fld>
             <a:endParaRPr lang="en-US"/>
           </a:p>
@@ -29821,13 +29601,6 @@
   <p:transition>
     <p:fade/>
   </p:transition>
-  <p:timing>
-    <p:tnLst>
-      <p:par>
-        <p:cTn id="1" dur="indefinite" restart="never" nodeType="tmRoot"/>
-      </p:par>
-    </p:tnLst>
-  </p:timing>
 </p:sldLayout>
 </file>
 
@@ -29989,7 +29762,7 @@
                 <a:spcPct val="0"/>
               </a:spcAft>
             </a:pPr>
-            <a:endParaRPr lang="en-US" sz="2400" dirty="0" err="1" smtClean="0">
+            <a:endParaRPr lang="en-US" sz="2400" dirty="0" err="1">
               <a:gradFill>
                 <a:gsLst>
                   <a:gs pos="0">
@@ -30040,10 +29813,9 @@
           </a:lstStyle>
           <a:p>
             <a:r>
-              <a:rPr lang="en-US" dirty="0" smtClean="0"/>
+              <a:rPr lang="en-US" dirty="0"/>
               <a:t>Type “Agenda”</a:t>
             </a:r>
-            <a:endParaRPr lang="en-US" dirty="0"/>
           </a:p>
         </p:txBody>
       </p:sp>
@@ -30167,24 +29939,23 @@
           <a:p>
             <a:pPr lvl="0"/>
             <a:r>
-              <a:rPr lang="en-US" dirty="0" smtClean="0"/>
+              <a:rPr lang="en-US" dirty="0"/>
               <a:t>Item 1</a:t>
             </a:r>
           </a:p>
           <a:p>
             <a:pPr lvl="0"/>
             <a:r>
-              <a:rPr lang="en-US" dirty="0" smtClean="0"/>
+              <a:rPr lang="en-US" dirty="0"/>
               <a:t>Item 2</a:t>
             </a:r>
           </a:p>
           <a:p>
             <a:pPr lvl="0"/>
             <a:r>
-              <a:rPr lang="en-US" dirty="0" smtClean="0"/>
+              <a:rPr lang="en-US" dirty="0"/>
               <a:t>Item 3</a:t>
             </a:r>
-            <a:endParaRPr lang="en-US" dirty="0"/>
           </a:p>
         </p:txBody>
       </p:sp>
@@ -30211,7 +29982,7 @@
           <a:p>
             <a:fld id="{5958763E-B898-436D-883D-03711491D54A}" type="datetimeFigureOut">
               <a:rPr lang="en-US" smtClean="0"/>
-              <a:t>10/20/2020</a:t>
+              <a:t>9/6/2022</a:t>
             </a:fld>
             <a:endParaRPr lang="en-US"/>
           </a:p>
@@ -30318,13 +30089,6 @@
   <p:transition>
     <p:fade/>
   </p:transition>
-  <p:timing>
-    <p:tnLst>
-      <p:par>
-        <p:cTn id="1" dur="indefinite" restart="never" nodeType="tmRoot"/>
-      </p:par>
-    </p:tnLst>
-  </p:timing>
 </p:sldLayout>
 </file>
 
@@ -30486,7 +30250,7 @@
                 <a:spcPct val="0"/>
               </a:spcAft>
             </a:pPr>
-            <a:endParaRPr lang="en-US" sz="2400" dirty="0" err="1" smtClean="0">
+            <a:endParaRPr lang="en-US" sz="2400" dirty="0" err="1">
               <a:gradFill>
                 <a:gsLst>
                   <a:gs pos="0">
@@ -30539,10 +30303,9 @@
           </a:lstStyle>
           <a:p>
             <a:r>
-              <a:rPr lang="en-US" dirty="0" smtClean="0"/>
+              <a:rPr lang="en-US" dirty="0"/>
               <a:t>Notable Quote</a:t>
             </a:r>
-            <a:endParaRPr lang="en-US" dirty="0"/>
           </a:p>
         </p:txBody>
       </p:sp>
@@ -30669,10 +30432,9 @@
           <a:p>
             <a:pPr lvl="0"/>
             <a:r>
-              <a:rPr lang="en-US" dirty="0" smtClean="0"/>
+              <a:rPr lang="en-US" dirty="0"/>
               <a:t>– Attribution</a:t>
             </a:r>
-            <a:endParaRPr lang="en-US" dirty="0"/>
           </a:p>
         </p:txBody>
       </p:sp>
@@ -30699,7 +30461,7 @@
           <a:p>
             <a:fld id="{5958763E-B898-436D-883D-03711491D54A}" type="datetimeFigureOut">
               <a:rPr lang="en-US" smtClean="0"/>
-              <a:t>10/20/2020</a:t>
+              <a:t>9/6/2022</a:t>
             </a:fld>
             <a:endParaRPr lang="en-US"/>
           </a:p>
@@ -31447,13 +31209,6 @@
   <p:transition>
     <p:fade/>
   </p:transition>
-  <p:timing>
-    <p:tnLst>
-      <p:par>
-        <p:cTn id="1" dur="indefinite" restart="never" nodeType="tmRoot"/>
-      </p:par>
-    </p:tnLst>
-  </p:timing>
 </p:sldLayout>
 </file>
 
@@ -31525,7 +31280,7 @@
           <a:p>
             <a:fld id="{5958763E-B898-436D-883D-03711491D54A}" type="datetimeFigureOut">
               <a:rPr lang="en-US" smtClean="0"/>
-              <a:t>10/20/2020</a:t>
+              <a:t>9/6/2022</a:t>
             </a:fld>
             <a:endParaRPr lang="en-US"/>
           </a:p>
@@ -31598,13 +31353,6 @@
   <p:transition>
     <p:fade/>
   </p:transition>
-  <p:timing>
-    <p:tnLst>
-      <p:par>
-        <p:cTn id="1" dur="indefinite" restart="never" nodeType="tmRoot"/>
-      </p:par>
-    </p:tnLst>
-  </p:timing>
 </p:sldLayout>
 </file>
 
@@ -31733,7 +31481,7 @@
           <a:p>
             <a:fld id="{5958763E-B898-436D-883D-03711491D54A}" type="datetimeFigureOut">
               <a:rPr lang="en-US" smtClean="0"/>
-              <a:t>10/20/2020</a:t>
+              <a:t>9/6/2022</a:t>
             </a:fld>
             <a:endParaRPr lang="en-US"/>
           </a:p>
@@ -31856,13 +31604,6 @@
   <p:transition>
     <p:fade/>
   </p:transition>
-  <p:timing>
-    <p:tnLst>
-      <p:par>
-        <p:cTn id="1" dur="indefinite" restart="never" nodeType="tmRoot"/>
-      </p:par>
-    </p:tnLst>
-  </p:timing>
 </p:sldLayout>
 </file>
 
@@ -32075,7 +31816,7 @@
           <a:p>
             <a:fld id="{5958763E-B898-436D-883D-03711491D54A}" type="datetimeFigureOut">
               <a:rPr lang="en-US" smtClean="0"/>
-              <a:t>10/20/2020</a:t>
+              <a:t>9/6/2022</a:t>
             </a:fld>
             <a:endParaRPr lang="en-US"/>
           </a:p>
@@ -32148,13 +31889,6 @@
   <p:transition>
     <p:fade/>
   </p:transition>
-  <p:timing>
-    <p:tnLst>
-      <p:par>
-        <p:cTn id="1" dur="indefinite" restart="never" nodeType="tmRoot"/>
-      </p:par>
-    </p:tnLst>
-  </p:timing>
 </p:sldLayout>
 </file>
 
@@ -32312,7 +32046,7 @@
           <a:p>
             <a:fld id="{5958763E-B898-436D-883D-03711491D54A}" type="datetimeFigureOut">
               <a:rPr lang="en-US" smtClean="0"/>
-              <a:t>10/20/2020</a:t>
+              <a:t>9/6/2022</a:t>
             </a:fld>
             <a:endParaRPr lang="en-US"/>
           </a:p>
@@ -32385,13 +32119,6 @@
   <p:transition>
     <p:fade/>
   </p:transition>
-  <p:timing>
-    <p:tnLst>
-      <p:par>
-        <p:cTn id="1" dur="indefinite" restart="never" nodeType="tmRoot"/>
-      </p:par>
-    </p:tnLst>
-  </p:timing>
 </p:sldLayout>
 </file>
 
@@ -32563,7 +32290,7 @@
           <a:p>
             <a:fld id="{5958763E-B898-436D-883D-03711491D54A}" type="datetimeFigureOut">
               <a:rPr lang="en-US" smtClean="0"/>
-              <a:t>10/20/2020</a:t>
+              <a:t>9/6/2022</a:t>
             </a:fld>
             <a:endParaRPr lang="en-US"/>
           </a:p>
@@ -32709,13 +32436,6 @@
   <p:transition>
     <p:fade/>
   </p:transition>
-  <p:timing>
-    <p:tnLst>
-      <p:par>
-        <p:cTn id="1" dur="indefinite" restart="never" nodeType="tmRoot"/>
-      </p:par>
-    </p:tnLst>
-  </p:timing>
   <p:txStyles>
     <p:titleStyle>
       <a:lvl1pPr algn="l" defTabSz="914400" rtl="0" eaLnBrk="1" latinLnBrk="0" hangingPunct="1">
@@ -33020,7 +32740,7 @@
       </a:lvl9pPr>
     </p:otherStyle>
   </p:txStyles>
-  <p:extLst mod="1">
+  <p:extLst>
     <p:ext uri="{27BBF7A9-308A-43DC-89C8-2F10F3537804}">
       <p15:sldGuideLst xmlns:p15="http://schemas.microsoft.com/office/powerpoint/2012/main">
         <p15:guide id="1" orient="horz" pos="2160" userDrawn="1">
@@ -33099,10 +32819,9 @@
           <a:lstStyle/>
           <a:p>
             <a:r>
-              <a:rPr lang="en-US" sz="6600" dirty="0" smtClean="0"/>
-              <a:t>JS Files &amp; Buttons Review</a:t>
+              <a:rPr lang="en-US" sz="6600" dirty="0"/>
+              <a:t>Functions &amp; Buttons Review</a:t>
             </a:r>
-            <a:endParaRPr lang="en-US" sz="6600" dirty="0"/>
           </a:p>
         </p:txBody>
       </p:sp>
@@ -33127,11 +32846,11 @@
           <a:lstStyle/>
           <a:p>
             <a:r>
-              <a:rPr lang="en-US" dirty="0" smtClean="0"/>
+              <a:rPr lang="en-US" dirty="0"/>
               <a:t>Hy-Tech Club: </a:t>
             </a:r>
             <a:r>
-              <a:rPr lang="en-US" smtClean="0"/>
+              <a:rPr lang="en-US"/>
               <a:t>Web 102</a:t>
             </a:r>
             <a:endParaRPr lang="en-US" dirty="0"/>
@@ -36119,13 +35838,6 @@
   <p:transition>
     <p:fade/>
   </p:transition>
-  <p:timing>
-    <p:tnLst>
-      <p:par>
-        <p:cTn id="1" dur="indefinite" restart="never" nodeType="tmRoot"/>
-      </p:par>
-    </p:tnLst>
-  </p:timing>
 </p:sld>
 </file>
 
@@ -36168,18 +35880,10 @@
           <a:p>
             <a:r>
               <a:rPr lang="en-US" dirty="0"/>
-              <a:t>5</a:t>
+              <a:t>5. Define a function named </a:t>
             </a:r>
             <a:r>
-              <a:rPr lang="en-US" dirty="0" smtClean="0"/>
-              <a:t>. Define </a:t>
-            </a:r>
-            <a:r>
-              <a:rPr lang="en-US" dirty="0" smtClean="0"/>
-              <a:t>a function named </a:t>
-            </a:r>
-            <a:r>
-              <a:rPr lang="en-US" sz="4000" cap="none" dirty="0" err="1" smtClean="0">
+              <a:rPr lang="en-US" sz="4000" cap="none" dirty="0" err="1">
                 <a:solidFill>
                   <a:schemeClr val="accent1">
                     <a:lumMod val="20000"/>
@@ -36191,10 +35895,9 @@
               <a:t>SendMessage</a:t>
             </a:r>
             <a:r>
-              <a:rPr lang="en-US" dirty="0" smtClean="0"/>
+              <a:rPr lang="en-US" dirty="0"/>
               <a:t> that displays a message to the user</a:t>
             </a:r>
-            <a:endParaRPr lang="en-US" dirty="0"/>
           </a:p>
         </p:txBody>
       </p:sp>
@@ -36389,7 +36092,7 @@
                 <a:spcPct val="0"/>
               </a:spcAft>
             </a:pPr>
-            <a:endParaRPr lang="en-US" sz="2400" dirty="0" err="1" smtClean="0">
+            <a:endParaRPr lang="en-US" sz="2400" dirty="0" err="1">
               <a:gradFill>
                 <a:gsLst>
                   <a:gs pos="0">
@@ -36438,7 +36141,7 @@
               </a:spcAft>
             </a:pPr>
             <a:r>
-              <a:rPr lang="en-US" sz="2400" dirty="0" smtClean="0">
+              <a:rPr lang="en-US" sz="2400" dirty="0">
                 <a:solidFill>
                   <a:schemeClr val="accent1"/>
                 </a:solidFill>
@@ -36461,13 +36164,6 @@
   <p:transition>
     <p:fade/>
   </p:transition>
-  <p:timing>
-    <p:tnLst>
-      <p:par>
-        <p:cTn id="1" dur="indefinite" restart="never" nodeType="tmRoot"/>
-      </p:par>
-    </p:tnLst>
-  </p:timing>
 </p:sld>
 </file>
 
@@ -36504,10 +36200,9 @@
           <a:lstStyle/>
           <a:p>
             <a:r>
-              <a:rPr lang="en-US" dirty="0" smtClean="0"/>
+              <a:rPr lang="en-US" dirty="0"/>
               <a:t>Answer</a:t>
             </a:r>
-            <a:endParaRPr lang="en-US" dirty="0"/>
           </a:p>
         </p:txBody>
       </p:sp>
@@ -36633,13 +36328,6 @@
   <p:transition>
     <p:fade/>
   </p:transition>
-  <p:timing>
-    <p:tnLst>
-      <p:par>
-        <p:cTn id="1" dur="indefinite" restart="never" nodeType="tmRoot"/>
-      </p:par>
-    </p:tnLst>
-  </p:timing>
 </p:sld>
 </file>
 
@@ -36696,26 +36384,10 @@
                   <a:schemeClr val="bg1"/>
                 </a:solidFill>
               </a:rPr>
-              <a:t>6</a:t>
+              <a:t>6. Create a </a:t>
             </a:r>
             <a:r>
-              <a:rPr lang="en-US" sz="6000" dirty="0" smtClean="0">
-                <a:solidFill>
-                  <a:schemeClr val="bg1"/>
-                </a:solidFill>
-              </a:rPr>
-              <a:t>. Create </a:t>
-            </a:r>
-            <a:r>
-              <a:rPr lang="en-US" sz="6000" dirty="0" smtClean="0">
-                <a:solidFill>
-                  <a:schemeClr val="bg1"/>
-                </a:solidFill>
-              </a:rPr>
-              <a:t>a </a:t>
-            </a:r>
-            <a:r>
-              <a:rPr lang="en-US" sz="6000" i="1" dirty="0" smtClean="0">
+              <a:rPr lang="en-US" sz="6000" i="1" dirty="0">
                 <a:solidFill>
                   <a:schemeClr val="bg1"/>
                 </a:solidFill>
@@ -36723,7 +36395,7 @@
               <a:t>button</a:t>
             </a:r>
             <a:r>
-              <a:rPr lang="en-US" sz="6000" dirty="0" smtClean="0">
+              <a:rPr lang="en-US" sz="6000" dirty="0">
                 <a:solidFill>
                   <a:schemeClr val="bg1"/>
                 </a:solidFill>
@@ -36740,7 +36412,7 @@
                 <a:spcPts val="600"/>
               </a:spcAft>
             </a:pPr>
-            <a:endParaRPr lang="en-US" sz="6000" dirty="0" smtClean="0">
+            <a:endParaRPr lang="en-US" sz="6000" dirty="0">
               <a:solidFill>
                 <a:schemeClr val="bg1"/>
               </a:solidFill>
@@ -36758,7 +36430,7 @@
               <a:buChar char="•"/>
             </a:pPr>
             <a:r>
-              <a:rPr lang="en-US" sz="6000" dirty="0" smtClean="0">
+              <a:rPr lang="en-US" sz="6000" dirty="0">
                 <a:solidFill>
                   <a:schemeClr val="bg1"/>
                 </a:solidFill>
@@ -36766,7 +36438,7 @@
               <a:t>Has text “</a:t>
             </a:r>
             <a:r>
-              <a:rPr lang="en-US" sz="6000" b="1" dirty="0" smtClean="0">
+              <a:rPr lang="en-US" sz="6000" b="1" dirty="0">
                 <a:solidFill>
                   <a:schemeClr val="bg1"/>
                 </a:solidFill>
@@ -36774,7 +36446,7 @@
               <a:t>Fun</a:t>
             </a:r>
             <a:r>
-              <a:rPr lang="en-US" sz="6000" dirty="0" smtClean="0">
+              <a:rPr lang="en-US" sz="6000" dirty="0">
                 <a:solidFill>
                   <a:schemeClr val="bg1"/>
                 </a:solidFill>
@@ -36794,7 +36466,7 @@
               <a:buChar char="•"/>
             </a:pPr>
             <a:r>
-              <a:rPr lang="en-US" sz="6000" dirty="0" smtClean="0">
+              <a:rPr lang="en-US" sz="6000" dirty="0">
                 <a:solidFill>
                   <a:schemeClr val="bg1"/>
                 </a:solidFill>
@@ -36802,7 +36474,7 @@
               <a:t>Calls a </a:t>
             </a:r>
             <a:r>
-              <a:rPr lang="en-US" sz="6000" i="1" dirty="0" smtClean="0">
+              <a:rPr lang="en-US" sz="6000" i="1" dirty="0">
                 <a:solidFill>
                   <a:schemeClr val="bg1"/>
                 </a:solidFill>
@@ -36810,7 +36482,7 @@
               <a:t>function</a:t>
             </a:r>
             <a:r>
-              <a:rPr lang="en-US" sz="6000" dirty="0" smtClean="0">
+              <a:rPr lang="en-US" sz="6000" dirty="0">
                 <a:solidFill>
                   <a:schemeClr val="bg1"/>
                 </a:solidFill>
@@ -36818,7 +36490,7 @@
               <a:t> named </a:t>
             </a:r>
             <a:r>
-              <a:rPr lang="en-US" sz="6000" b="1" dirty="0" smtClean="0">
+              <a:rPr lang="en-US" sz="6000" b="1" dirty="0">
                 <a:solidFill>
                   <a:schemeClr val="bg1"/>
                 </a:solidFill>
@@ -36842,13 +36514,6 @@
   <p:transition>
     <p:fade/>
   </p:transition>
-  <p:timing>
-    <p:tnLst>
-      <p:par>
-        <p:cTn id="1" dur="indefinite" restart="never" nodeType="tmRoot"/>
-      </p:par>
-    </p:tnLst>
-  </p:timing>
 </p:sld>
 </file>
 
@@ -36885,10 +36550,9 @@
           <a:lstStyle/>
           <a:p>
             <a:r>
-              <a:rPr lang="en-US" dirty="0" smtClean="0"/>
+              <a:rPr lang="en-US" dirty="0"/>
               <a:t>Answer</a:t>
             </a:r>
-            <a:endParaRPr lang="en-US" dirty="0"/>
           </a:p>
         </p:txBody>
       </p:sp>
@@ -36938,7 +36602,7 @@
               <a:t>onclick</a:t>
             </a:r>
             <a:r>
-              <a:rPr lang="en-US" sz="4400" dirty="0" smtClean="0">
+              <a:rPr lang="en-US" sz="4400" dirty="0">
                 <a:solidFill>
                   <a:srgbClr val="000000"/>
                 </a:solidFill>
@@ -36947,7 +36611,7 @@
               <a:t>=</a:t>
             </a:r>
             <a:r>
-              <a:rPr lang="en-US" sz="4400" dirty="0" smtClean="0">
+              <a:rPr lang="en-US" sz="4400" dirty="0">
                 <a:solidFill>
                   <a:srgbClr val="0000FF"/>
                 </a:solidFill>
@@ -36956,7 +36620,7 @@
               <a:t>"fun()"</a:t>
             </a:r>
             <a:r>
-              <a:rPr lang="en-US" sz="4400" dirty="0" smtClean="0">
+              <a:rPr lang="en-US" sz="4400" dirty="0">
                 <a:solidFill>
                   <a:srgbClr val="800000"/>
                 </a:solidFill>
@@ -36965,7 +36629,7 @@
               <a:t>&gt;</a:t>
             </a:r>
             <a:r>
-              <a:rPr lang="en-US" sz="4400" dirty="0" smtClean="0">
+              <a:rPr lang="en-US" sz="4400" dirty="0">
                 <a:solidFill>
                   <a:srgbClr val="000000"/>
                 </a:solidFill>
@@ -36974,22 +36638,13 @@
               <a:t>Fun</a:t>
             </a:r>
             <a:r>
-              <a:rPr lang="en-US" sz="4400" dirty="0" smtClean="0">
-                <a:solidFill>
-                  <a:srgbClr val="800000"/>
-                </a:solidFill>
-                <a:latin typeface="Consolas" panose="020B0609020204030204" pitchFamily="49" charset="0"/>
-              </a:rPr>
-              <a:t>&lt;/</a:t>
-            </a:r>
-            <a:r>
               <a:rPr lang="en-US" sz="4400" dirty="0">
                 <a:solidFill>
                   <a:srgbClr val="800000"/>
                 </a:solidFill>
                 <a:latin typeface="Consolas" panose="020B0609020204030204" pitchFamily="49" charset="0"/>
               </a:rPr>
-              <a:t>button&gt;</a:t>
+              <a:t>&lt;/button&gt;</a:t>
             </a:r>
           </a:p>
           <a:p>
@@ -37013,13 +36668,6 @@
   <p:transition>
     <p:fade/>
   </p:transition>
-  <p:timing>
-    <p:tnLst>
-      <p:par>
-        <p:cTn id="1" dur="indefinite" restart="never" nodeType="tmRoot"/>
-      </p:par>
-    </p:tnLst>
-  </p:timing>
 </p:sld>
 </file>
 
@@ -37061,10 +36709,9 @@
           <a:lstStyle/>
           <a:p>
             <a:r>
-              <a:rPr lang="en-US" dirty="0" smtClean="0"/>
+              <a:rPr lang="en-US" dirty="0"/>
               <a:t>7. Tie-breaker</a:t>
             </a:r>
-            <a:endParaRPr lang="en-US" dirty="0"/>
           </a:p>
         </p:txBody>
       </p:sp>
@@ -37081,13 +36728,6 @@
   <p:transition>
     <p:fade/>
   </p:transition>
-  <p:timing>
-    <p:tnLst>
-      <p:par>
-        <p:cTn id="1" dur="indefinite" restart="never" nodeType="tmRoot"/>
-      </p:par>
-    </p:tnLst>
-  </p:timing>
 </p:sld>
 </file>
 
@@ -37124,10 +36764,9 @@
           <a:lstStyle/>
           <a:p>
             <a:r>
-              <a:rPr lang="en-US" dirty="0" smtClean="0"/>
+              <a:rPr lang="en-US" dirty="0"/>
               <a:t>What will the user see if they click?</a:t>
             </a:r>
-            <a:endParaRPr lang="en-US" dirty="0"/>
           </a:p>
         </p:txBody>
       </p:sp>
@@ -37170,22 +36809,13 @@
               <a:buNone/>
             </a:pPr>
             <a:r>
-              <a:rPr lang="en-US" sz="2400" dirty="0" smtClean="0">
-                <a:solidFill>
-                  <a:srgbClr val="008000"/>
-                </a:solidFill>
-                <a:latin typeface="Consolas" panose="020B0609020204030204" pitchFamily="49" charset="0"/>
-              </a:rPr>
-              <a:t>&lt;!--</a:t>
-            </a:r>
-            <a:r>
               <a:rPr lang="en-US" sz="2400" dirty="0">
                 <a:solidFill>
                   <a:srgbClr val="008000"/>
                 </a:solidFill>
                 <a:latin typeface="Consolas" panose="020B0609020204030204" pitchFamily="49" charset="0"/>
               </a:rPr>
-              <a:t> index.html file --&gt;</a:t>
+              <a:t>&lt;!-- index.html file --&gt;</a:t>
             </a:r>
             <a:endParaRPr lang="en-US" sz="2400" dirty="0">
               <a:solidFill>
@@ -37234,18 +36864,9 @@
                 </a:solidFill>
                 <a:latin typeface="Consolas" panose="020B0609020204030204" pitchFamily="49" charset="0"/>
               </a:rPr>
-              <a:t>&lt;head&gt;&lt;/head</a:t>
+              <a:t>&lt;head&gt;&lt;/head&gt;</a:t>
             </a:r>
-            <a:r>
-              <a:rPr lang="en-US" sz="2400" dirty="0" smtClean="0">
-                <a:solidFill>
-                  <a:srgbClr val="800000"/>
-                </a:solidFill>
-                <a:latin typeface="Consolas" panose="020B0609020204030204" pitchFamily="49" charset="0"/>
-              </a:rPr>
-              <a:t>&gt;</a:t>
-            </a:r>
-            <a:endParaRPr lang="en-US" sz="2400" dirty="0" smtClean="0">
+            <a:endParaRPr lang="en-US" sz="2400" dirty="0">
               <a:solidFill>
                 <a:srgbClr val="000000"/>
               </a:solidFill>
@@ -37257,7 +36878,7 @@
               <a:buNone/>
             </a:pPr>
             <a:r>
-              <a:rPr lang="en-US" sz="2400" dirty="0" smtClean="0">
+              <a:rPr lang="en-US" sz="2400" dirty="0">
                 <a:solidFill>
                   <a:srgbClr val="000000"/>
                 </a:solidFill>
@@ -37266,7 +36887,7 @@
               <a:t>    </a:t>
             </a:r>
             <a:r>
-              <a:rPr lang="en-US" sz="2400" dirty="0" smtClean="0">
+              <a:rPr lang="en-US" sz="2400" dirty="0">
                 <a:solidFill>
                   <a:srgbClr val="800000"/>
                 </a:solidFill>
@@ -37274,7 +36895,7 @@
               </a:rPr>
               <a:t>&lt;body&gt;</a:t>
             </a:r>
-            <a:endParaRPr lang="en-US" sz="2400" dirty="0" smtClean="0">
+            <a:endParaRPr lang="en-US" sz="2400" dirty="0">
               <a:solidFill>
                 <a:srgbClr val="000000"/>
               </a:solidFill>
@@ -37322,7 +36943,7 @@
               <a:t>onclick</a:t>
             </a:r>
             <a:r>
-              <a:rPr lang="en-US" sz="2400" dirty="0" smtClean="0">
+              <a:rPr lang="en-US" sz="2400" dirty="0">
                 <a:solidFill>
                   <a:srgbClr val="000000"/>
                 </a:solidFill>
@@ -37331,7 +36952,7 @@
               <a:t>=</a:t>
             </a:r>
             <a:r>
-              <a:rPr lang="en-US" sz="2400" dirty="0" smtClean="0">
+              <a:rPr lang="en-US" sz="2400" dirty="0">
                 <a:solidFill>
                   <a:srgbClr val="0000FF"/>
                 </a:solidFill>
@@ -37340,7 +36961,7 @@
               <a:t>"go()"</a:t>
             </a:r>
             <a:r>
-              <a:rPr lang="en-US" sz="2400" dirty="0" smtClean="0">
+              <a:rPr lang="en-US" sz="2400" dirty="0">
                 <a:solidFill>
                   <a:srgbClr val="800000"/>
                 </a:solidFill>
@@ -37349,7 +36970,7 @@
               <a:t>&gt;</a:t>
             </a:r>
             <a:r>
-              <a:rPr lang="en-US" sz="2400" dirty="0" smtClean="0">
+              <a:rPr lang="en-US" sz="2400" dirty="0">
                 <a:solidFill>
                   <a:srgbClr val="000000"/>
                 </a:solidFill>
@@ -37358,22 +36979,13 @@
               <a:t>Go!</a:t>
             </a:r>
             <a:r>
-              <a:rPr lang="en-US" sz="2400" dirty="0" smtClean="0">
-                <a:solidFill>
-                  <a:srgbClr val="800000"/>
-                </a:solidFill>
-                <a:latin typeface="Consolas" panose="020B0609020204030204" pitchFamily="49" charset="0"/>
-              </a:rPr>
-              <a:t>&lt;/</a:t>
-            </a:r>
-            <a:r>
               <a:rPr lang="en-US" sz="2400" dirty="0">
                 <a:solidFill>
                   <a:srgbClr val="800000"/>
                 </a:solidFill>
                 <a:latin typeface="Consolas" panose="020B0609020204030204" pitchFamily="49" charset="0"/>
               </a:rPr>
-              <a:t>button&gt;</a:t>
+              <a:t>&lt;/button&gt;</a:t>
             </a:r>
             <a:endParaRPr lang="en-US" sz="2400" dirty="0">
               <a:solidFill>
@@ -37422,18 +37034,9 @@
                 </a:solidFill>
                 <a:latin typeface="Consolas" panose="020B0609020204030204" pitchFamily="49" charset="0"/>
               </a:rPr>
-              <a:t>&lt;/html</a:t>
+              <a:t>&lt;/html&gt;</a:t>
             </a:r>
-            <a:r>
-              <a:rPr lang="en-US" sz="2400" dirty="0" smtClean="0">
-                <a:solidFill>
-                  <a:srgbClr val="800000"/>
-                </a:solidFill>
-                <a:latin typeface="Consolas" panose="020B0609020204030204" pitchFamily="49" charset="0"/>
-              </a:rPr>
-              <a:t>&gt;</a:t>
-            </a:r>
-            <a:endParaRPr lang="en-US" sz="3600" dirty="0" smtClean="0"/>
+            <a:endParaRPr lang="en-US" sz="3600" dirty="0"/>
           </a:p>
         </p:txBody>
       </p:sp>
@@ -37547,7 +37150,7 @@
               <a:buNone/>
             </a:pPr>
             <a:r>
-              <a:rPr lang="en-US" sz="2400" dirty="0" smtClean="0">
+              <a:rPr lang="en-US" sz="2400" dirty="0">
                 <a:solidFill>
                   <a:srgbClr val="000000"/>
                 </a:solidFill>
@@ -37555,12 +37158,6 @@
               </a:rPr>
               <a:t>}</a:t>
             </a:r>
-            <a:endParaRPr lang="en-US" sz="2400" dirty="0">
-              <a:solidFill>
-                <a:srgbClr val="000000"/>
-              </a:solidFill>
-              <a:latin typeface="Consolas" panose="020B0609020204030204" pitchFamily="49" charset="0"/>
-            </a:endParaRPr>
           </a:p>
         </p:txBody>
       </p:sp>
@@ -37577,13 +37174,6 @@
   <p:transition>
     <p:fade/>
   </p:transition>
-  <p:timing>
-    <p:tnLst>
-      <p:par>
-        <p:cTn id="1" dur="indefinite" restart="never" nodeType="tmRoot"/>
-      </p:par>
-    </p:tnLst>
-  </p:timing>
 </p:sld>
 </file>
 
@@ -37620,10 +37210,9 @@
           <a:lstStyle/>
           <a:p>
             <a:r>
-              <a:rPr lang="en-US" dirty="0" smtClean="0"/>
+              <a:rPr lang="en-US" dirty="0"/>
               <a:t>Answer</a:t>
             </a:r>
-            <a:endParaRPr lang="en-US" dirty="0"/>
           </a:p>
         </p:txBody>
       </p:sp>
@@ -37647,21 +37236,8 @@
             </a:pPr>
             <a:r>
               <a:rPr lang="en-US" sz="4400" dirty="0"/>
-              <a:t>Nothing! Always remember to include </a:t>
+              <a:t>Nothing! Always remember to include the script file in the HTML 🙂</a:t>
             </a:r>
-            <a:r>
-              <a:rPr lang="en-US" sz="4400" dirty="0" smtClean="0"/>
-              <a:t>the </a:t>
-            </a:r>
-            <a:r>
-              <a:rPr lang="en-US" sz="4400" dirty="0"/>
-              <a:t>script file in the </a:t>
-            </a:r>
-            <a:r>
-              <a:rPr lang="en-US" sz="4400" dirty="0" smtClean="0"/>
-              <a:t>HTML 🙂</a:t>
-            </a:r>
-            <a:endParaRPr lang="en-US" sz="4400" dirty="0"/>
           </a:p>
           <a:p>
             <a:pPr marL="57150" indent="0">
@@ -37684,13 +37260,6 @@
   <p:transition>
     <p:fade/>
   </p:transition>
-  <p:timing>
-    <p:tnLst>
-      <p:par>
-        <p:cTn id="1" dur="indefinite" restart="never" nodeType="tmRoot"/>
-      </p:par>
-    </p:tnLst>
-  </p:timing>
 </p:sld>
 </file>
 
@@ -37732,15 +37301,11 @@
           <a:lstStyle/>
           <a:p>
             <a:r>
-              <a:rPr lang="en-US" dirty="0" smtClean="0"/>
-              <a:t>1. Write </a:t>
+              <a:rPr lang="en-US" dirty="0"/>
+              <a:t>1. Write the correct </a:t>
             </a:r>
             <a:r>
-              <a:rPr lang="en-US" dirty="0" smtClean="0"/>
-              <a:t>the correct </a:t>
-            </a:r>
-            <a:r>
-              <a:rPr lang="en-US" sz="4000" cap="none" dirty="0" smtClean="0">
+              <a:rPr lang="en-US" sz="4000" cap="none" dirty="0">
                 <a:solidFill>
                   <a:schemeClr val="accent1">
                     <a:lumMod val="20000"/>
@@ -37752,19 +37317,19 @@
               <a:t>script</a:t>
             </a:r>
             <a:r>
-              <a:rPr lang="en-US" dirty="0" smtClean="0"/>
+              <a:rPr lang="en-US" dirty="0"/>
               <a:t> tag to include a </a:t>
             </a:r>
             <a:r>
-              <a:rPr lang="en-US" dirty="0" err="1" smtClean="0"/>
+              <a:rPr lang="en-US" dirty="0" err="1"/>
               <a:t>javascript</a:t>
             </a:r>
             <a:r>
-              <a:rPr lang="en-US" dirty="0" smtClean="0"/>
+              <a:rPr lang="en-US" dirty="0"/>
               <a:t> file named </a:t>
             </a:r>
             <a:r>
-              <a:rPr lang="en-US" cap="none" dirty="0" smtClean="0">
+              <a:rPr lang="en-US" cap="none" dirty="0">
                 <a:solidFill>
                   <a:schemeClr val="accent1">
                     <a:lumMod val="20000"/>
@@ -37774,14 +37339,6 @@
               </a:rPr>
               <a:t>script.js</a:t>
             </a:r>
-            <a:endParaRPr lang="en-US" cap="none" dirty="0">
-              <a:solidFill>
-                <a:schemeClr val="accent1">
-                  <a:lumMod val="20000"/>
-                  <a:lumOff val="80000"/>
-                </a:schemeClr>
-              </a:solidFill>
-            </a:endParaRPr>
           </a:p>
         </p:txBody>
       </p:sp>
@@ -37803,7 +37360,7 @@
             <a:pPr marL="0" indent="0">
               <a:buNone/>
             </a:pPr>
-            <a:endParaRPr lang="en-US" dirty="0" smtClean="0">
+            <a:endParaRPr lang="en-US" dirty="0">
               <a:solidFill>
                 <a:srgbClr val="808080"/>
               </a:solidFill>
@@ -37826,7 +37383,7 @@
               <a:buNone/>
             </a:pPr>
             <a:r>
-              <a:rPr lang="en-US" sz="4400" dirty="0" smtClean="0">
+              <a:rPr lang="en-US" sz="4400" dirty="0">
                 <a:solidFill>
                   <a:srgbClr val="808080"/>
                 </a:solidFill>
@@ -37938,13 +37495,6 @@
   <p:transition>
     <p:fade/>
   </p:transition>
-  <p:timing>
-    <p:tnLst>
-      <p:par>
-        <p:cTn id="1" dur="indefinite" restart="never" nodeType="tmRoot"/>
-      </p:par>
-    </p:tnLst>
-  </p:timing>
 </p:sld>
 </file>
 
@@ -37981,10 +37531,9 @@
           <a:lstStyle/>
           <a:p>
             <a:r>
-              <a:rPr lang="en-US" dirty="0" smtClean="0"/>
+              <a:rPr lang="en-US" dirty="0"/>
               <a:t>Answer</a:t>
             </a:r>
-            <a:endParaRPr lang="en-US" dirty="0"/>
           </a:p>
         </p:txBody>
       </p:sp>
@@ -38088,13 +37637,6 @@
   <p:transition>
     <p:fade/>
   </p:transition>
-  <p:timing>
-    <p:tnLst>
-      <p:par>
-        <p:cTn id="1" dur="indefinite" restart="never" nodeType="tmRoot"/>
-      </p:par>
-    </p:tnLst>
-  </p:timing>
 </p:sld>
 </file>
 
@@ -38136,22 +37678,17 @@
           <a:lstStyle/>
           <a:p>
             <a:r>
-              <a:rPr lang="en-US" dirty="0" smtClean="0"/>
-              <a:t>2. What </a:t>
+              <a:rPr lang="en-US" dirty="0"/>
+              <a:t>2. What do buttons </a:t>
             </a:r>
             <a:r>
-              <a:rPr lang="en-US" dirty="0" smtClean="0"/>
-              <a:t>do buttons </a:t>
-            </a:r>
-            <a:r>
-              <a:rPr lang="en-US" i="1" dirty="0" smtClean="0"/>
+              <a:rPr lang="en-US" i="1" dirty="0"/>
               <a:t>call</a:t>
             </a:r>
             <a:r>
-              <a:rPr lang="en-US" dirty="0" smtClean="0"/>
+              <a:rPr lang="en-US" dirty="0"/>
               <a:t> when they are clicked?</a:t>
             </a:r>
-            <a:endParaRPr lang="en-US" dirty="0"/>
           </a:p>
         </p:txBody>
       </p:sp>
@@ -38168,13 +37705,6 @@
   <p:transition>
     <p:fade/>
   </p:transition>
-  <p:timing>
-    <p:tnLst>
-      <p:par>
-        <p:cTn id="1" dur="indefinite" restart="never" nodeType="tmRoot"/>
-      </p:par>
-    </p:tnLst>
-  </p:timing>
 </p:sld>
 </file>
 
@@ -38211,10 +37741,9 @@
           <a:lstStyle/>
           <a:p>
             <a:r>
-              <a:rPr lang="en-US" dirty="0" smtClean="0"/>
+              <a:rPr lang="en-US" dirty="0"/>
               <a:t>Answer</a:t>
             </a:r>
-            <a:endParaRPr lang="en-US" dirty="0"/>
           </a:p>
         </p:txBody>
       </p:sp>
@@ -38237,7 +37766,7 @@
               <a:buNone/>
             </a:pPr>
             <a:r>
-              <a:rPr lang="en-US" sz="6600" dirty="0" smtClean="0"/>
+              <a:rPr lang="en-US" sz="6600" dirty="0"/>
               <a:t>Functions</a:t>
             </a:r>
             <a:endParaRPr lang="en-US" sz="4400" dirty="0"/>
@@ -38257,13 +37786,6 @@
   <p:transition>
     <p:fade/>
   </p:transition>
-  <p:timing>
-    <p:tnLst>
-      <p:par>
-        <p:cTn id="1" dur="indefinite" restart="never" nodeType="tmRoot"/>
-      </p:par>
-    </p:tnLst>
-  </p:timing>
 </p:sld>
 </file>
 
@@ -38300,18 +37822,9 @@
           <a:lstStyle/>
           <a:p>
             <a:r>
-              <a:rPr lang="en-US" sz="2800" dirty="0" smtClean="0"/>
-              <a:t>3. What </a:t>
+              <a:rPr lang="en-US" sz="2800" dirty="0"/>
+              <a:t>3. What keyword is needed to define  a function?</a:t>
             </a:r>
-            <a:r>
-              <a:rPr lang="en-US" sz="2800" dirty="0" smtClean="0"/>
-              <a:t>keyword is needed to define  a </a:t>
-            </a:r>
-            <a:r>
-              <a:rPr lang="en-US" sz="2800" dirty="0" smtClean="0"/>
-              <a:t>function?</a:t>
-            </a:r>
-            <a:endParaRPr lang="en-US" sz="2800" dirty="0"/>
           </a:p>
         </p:txBody>
       </p:sp>
@@ -38336,204 +37849,7 @@
               <a:buNone/>
             </a:pPr>
             <a:r>
-              <a:rPr lang="en-US" sz="4800" dirty="0" smtClean="0">
-                <a:solidFill>
-                  <a:srgbClr val="0000FF"/>
-                </a:solidFill>
-              </a:rPr>
-              <a:t>???</a:t>
-            </a:r>
-            <a:r>
               <a:rPr lang="en-US" sz="4800" dirty="0">
-                <a:solidFill>
-                  <a:srgbClr val="000000"/>
-                </a:solidFill>
-                <a:latin typeface="Consolas" panose="020B0609020204030204" pitchFamily="49" charset="0"/>
-              </a:rPr>
-              <a:t> </a:t>
-            </a:r>
-            <a:r>
-              <a:rPr lang="en-US" sz="4800" dirty="0" err="1" smtClean="0">
-                <a:solidFill>
-                  <a:srgbClr val="000000"/>
-                </a:solidFill>
-                <a:latin typeface="Consolas" panose="020B0609020204030204" pitchFamily="49" charset="0"/>
-              </a:rPr>
-              <a:t>doSomething</a:t>
-            </a:r>
-            <a:r>
-              <a:rPr lang="en-US" sz="4800" dirty="0" smtClean="0">
-                <a:solidFill>
-                  <a:srgbClr val="000000"/>
-                </a:solidFill>
-                <a:latin typeface="Consolas" panose="020B0609020204030204" pitchFamily="49" charset="0"/>
-              </a:rPr>
-              <a:t>()</a:t>
-            </a:r>
-            <a:r>
-              <a:rPr lang="en-US" sz="4800" dirty="0">
-                <a:solidFill>
-                  <a:srgbClr val="000000"/>
-                </a:solidFill>
-                <a:latin typeface="Consolas" panose="020B0609020204030204" pitchFamily="49" charset="0"/>
-              </a:rPr>
-              <a:t> {</a:t>
-            </a:r>
-          </a:p>
-          <a:p>
-            <a:pPr marL="57150" indent="0">
-              <a:buNone/>
-            </a:pPr>
-            <a:r>
-              <a:rPr lang="en-US" sz="4800" dirty="0">
-                <a:solidFill>
-                  <a:srgbClr val="000000"/>
-                </a:solidFill>
-                <a:latin typeface="Consolas" panose="020B0609020204030204" pitchFamily="49" charset="0"/>
-              </a:rPr>
-              <a:t>    alert</a:t>
-            </a:r>
-            <a:r>
-              <a:rPr lang="en-US" sz="4800" dirty="0" smtClean="0">
-                <a:solidFill>
-                  <a:srgbClr val="000000"/>
-                </a:solidFill>
-                <a:latin typeface="Consolas" panose="020B0609020204030204" pitchFamily="49" charset="0"/>
-              </a:rPr>
-              <a:t>(</a:t>
-            </a:r>
-            <a:r>
-              <a:rPr lang="en-US" sz="4800" dirty="0" smtClean="0">
-                <a:solidFill>
-                  <a:srgbClr val="A31515"/>
-                </a:solidFill>
-                <a:latin typeface="Consolas" panose="020B0609020204030204" pitchFamily="49" charset="0"/>
-              </a:rPr>
-              <a:t>"JS Code"</a:t>
-            </a:r>
-            <a:r>
-              <a:rPr lang="en-US" sz="4800" dirty="0" smtClean="0">
-                <a:solidFill>
-                  <a:srgbClr val="000000"/>
-                </a:solidFill>
-                <a:latin typeface="Consolas" panose="020B0609020204030204" pitchFamily="49" charset="0"/>
-              </a:rPr>
-              <a:t>);</a:t>
-            </a:r>
-            <a:endParaRPr lang="en-US" sz="4800" dirty="0">
-              <a:solidFill>
-                <a:srgbClr val="000000"/>
-              </a:solidFill>
-              <a:latin typeface="Consolas" panose="020B0609020204030204" pitchFamily="49" charset="0"/>
-            </a:endParaRPr>
-          </a:p>
-          <a:p>
-            <a:pPr marL="57150" indent="0">
-              <a:buNone/>
-            </a:pPr>
-            <a:r>
-              <a:rPr lang="en-US" sz="4800" dirty="0" smtClean="0">
-                <a:solidFill>
-                  <a:srgbClr val="000000"/>
-                </a:solidFill>
-                <a:latin typeface="Consolas" panose="020B0609020204030204" pitchFamily="49" charset="0"/>
-              </a:rPr>
-              <a:t>}</a:t>
-            </a:r>
-            <a:endParaRPr lang="en-US" sz="4800" dirty="0">
-              <a:solidFill>
-                <a:srgbClr val="000000"/>
-              </a:solidFill>
-              <a:latin typeface="Consolas" panose="020B0609020204030204" pitchFamily="49" charset="0"/>
-            </a:endParaRPr>
-          </a:p>
-        </p:txBody>
-      </p:sp>
-    </p:spTree>
-    <p:extLst>
-      <p:ext uri="{BB962C8B-B14F-4D97-AF65-F5344CB8AC3E}">
-        <p14:creationId xmlns:p14="http://schemas.microsoft.com/office/powerpoint/2010/main" val="205074615"/>
-      </p:ext>
-    </p:extLst>
-  </p:cSld>
-  <p:clrMapOvr>
-    <a:masterClrMapping/>
-  </p:clrMapOvr>
-  <p:transition>
-    <p:fade/>
-  </p:transition>
-  <p:timing>
-    <p:tnLst>
-      <p:par>
-        <p:cTn id="1" dur="indefinite" restart="never" nodeType="tmRoot"/>
-      </p:par>
-    </p:tnLst>
-  </p:timing>
-</p:sld>
-</file>
-
-<file path=ppt/slides/slide7.xml><?xml version="1.0" encoding="utf-8"?>
-<p:sld xmlns:a="http://schemas.openxmlformats.org/drawingml/2006/main" xmlns:r="http://schemas.openxmlformats.org/officeDocument/2006/relationships" xmlns:p="http://schemas.openxmlformats.org/presentationml/2006/main">
-  <p:cSld>
-    <p:spTree>
-      <p:nvGrpSpPr>
-        <p:cNvPr id="1" name=""/>
-        <p:cNvGrpSpPr/>
-        <p:nvPr/>
-      </p:nvGrpSpPr>
-      <p:grpSpPr>
-        <a:xfrm>
-          <a:off x="0" y="0"/>
-          <a:ext cx="0" cy="0"/>
-          <a:chOff x="0" y="0"/>
-          <a:chExt cx="0" cy="0"/>
-        </a:xfrm>
-      </p:grpSpPr>
-      <p:sp>
-        <p:nvSpPr>
-          <p:cNvPr id="2" name="Title 1"/>
-          <p:cNvSpPr>
-            <a:spLocks noGrp="1"/>
-          </p:cNvSpPr>
-          <p:nvPr>
-            <p:ph type="title"/>
-          </p:nvPr>
-        </p:nvSpPr>
-        <p:spPr/>
-        <p:txBody>
-          <a:bodyPr/>
-          <a:lstStyle/>
-          <a:p>
-            <a:r>
-              <a:rPr lang="en-US" dirty="0" smtClean="0"/>
-              <a:t>Answer</a:t>
-            </a:r>
-            <a:endParaRPr lang="en-US" dirty="0"/>
-          </a:p>
-        </p:txBody>
-      </p:sp>
-      <p:sp>
-        <p:nvSpPr>
-          <p:cNvPr id="3" name="Content Placeholder 2"/>
-          <p:cNvSpPr>
-            <a:spLocks noGrp="1"/>
-          </p:cNvSpPr>
-          <p:nvPr>
-            <p:ph idx="1"/>
-          </p:nvPr>
-        </p:nvSpPr>
-        <p:spPr/>
-        <p:txBody>
-          <a:bodyPr anchor="ctr">
-            <a:normAutofit/>
-          </a:bodyPr>
-          <a:lstStyle/>
-          <a:p>
-            <a:pPr marL="57150" indent="0">
-              <a:buNone/>
-            </a:pPr>
-            <a:r>
-              <a:rPr lang="en-US" sz="4800" dirty="0" smtClean="0">
                 <a:solidFill>
                   <a:srgbClr val="0000FF"/>
                 </a:solidFill>
@@ -38551,7 +37867,7 @@
               <a:t> </a:t>
             </a:r>
             <a:r>
-              <a:rPr lang="en-US" sz="4800" dirty="0" err="1" smtClean="0">
+              <a:rPr lang="en-US" sz="4800" dirty="0" err="1">
                 <a:solidFill>
                   <a:srgbClr val="000000"/>
                 </a:solidFill>
@@ -38560,22 +37876,13 @@
               <a:t>doSomething</a:t>
             </a:r>
             <a:r>
-              <a:rPr lang="en-US" sz="4800" dirty="0" smtClean="0">
-                <a:solidFill>
-                  <a:srgbClr val="000000"/>
-                </a:solidFill>
-                <a:latin typeface="Consolas" panose="020B0609020204030204" pitchFamily="49" charset="0"/>
-              </a:rPr>
-              <a:t>()</a:t>
-            </a:r>
-            <a:r>
               <a:rPr lang="en-US" sz="4800" dirty="0">
                 <a:solidFill>
                   <a:srgbClr val="000000"/>
                 </a:solidFill>
                 <a:latin typeface="Consolas" panose="020B0609020204030204" pitchFamily="49" charset="0"/>
               </a:rPr>
-              <a:t> {</a:t>
+              <a:t>() {</a:t>
             </a:r>
           </a:p>
           <a:p>
@@ -38615,7 +37922,7 @@
               <a:buNone/>
             </a:pPr>
             <a:r>
-              <a:rPr lang="en-US" sz="4800" dirty="0" smtClean="0">
+              <a:rPr lang="en-US" sz="4800" dirty="0">
                 <a:solidFill>
                   <a:srgbClr val="000000"/>
                 </a:solidFill>
@@ -38623,12 +37930,246 @@
               </a:rPr>
               <a:t>}</a:t>
             </a:r>
-            <a:endParaRPr lang="en-US" sz="4800" dirty="0">
-              <a:solidFill>
-                <a:srgbClr val="000000"/>
-              </a:solidFill>
-              <a:latin typeface="Consolas" panose="020B0609020204030204" pitchFamily="49" charset="0"/>
-            </a:endParaRPr>
+          </a:p>
+        </p:txBody>
+      </p:sp>
+      <p:sp>
+        <p:nvSpPr>
+          <p:cNvPr id="4" name="Rectangle 3">
+            <a:extLst>
+              <a:ext uri="{FF2B5EF4-FFF2-40B4-BE49-F238E27FC236}">
+                <a16:creationId xmlns:a16="http://schemas.microsoft.com/office/drawing/2014/main" id="{731B3A8D-2836-4E61-A3DF-D5696FA1E1E8}"/>
+              </a:ext>
+            </a:extLst>
+          </p:cNvPr>
+          <p:cNvSpPr/>
+          <p:nvPr/>
+        </p:nvSpPr>
+        <p:spPr bwMode="auto">
+          <a:xfrm>
+            <a:off x="381000" y="2514600"/>
+            <a:ext cx="2857500" cy="800100"/>
+          </a:xfrm>
+          <a:prstGeom prst="rect">
+            <a:avLst/>
+          </a:prstGeom>
+          <a:solidFill>
+            <a:srgbClr val="7030A0"/>
+          </a:solidFill>
+          <a:ln w="12700">
+            <a:solidFill>
+              <a:schemeClr val="tx2"/>
+            </a:solidFill>
+            <a:miter lim="800000"/>
+            <a:headEnd type="none" w="med" len="med"/>
+            <a:tailEnd type="none" w="med" len="med"/>
+          </a:ln>
+          <a:effectLst/>
+        </p:spPr>
+        <p:style>
+          <a:lnRef idx="1">
+            <a:schemeClr val="accent2"/>
+          </a:lnRef>
+          <a:fillRef idx="3">
+            <a:schemeClr val="accent2"/>
+          </a:fillRef>
+          <a:effectRef idx="2">
+            <a:schemeClr val="accent2"/>
+          </a:effectRef>
+          <a:fontRef idx="minor">
+            <a:schemeClr val="lt1"/>
+          </a:fontRef>
+        </p:style>
+        <p:txBody>
+          <a:bodyPr rot="0" spcFirstLastPara="0" vertOverflow="overflow" horzOverflow="overflow" vert="horz" wrap="square" lIns="182880" tIns="146304" rIns="182880" bIns="146304" numCol="1" spcCol="0" rtlCol="0" fromWordArt="0" anchor="ctr" anchorCtr="0" forceAA="0" compatLnSpc="1">
+            <a:prstTxWarp prst="textNoShape">
+              <a:avLst/>
+            </a:prstTxWarp>
+            <a:noAutofit/>
+          </a:bodyPr>
+          <a:lstStyle/>
+          <a:p>
+            <a:pPr algn="ctr" defTabSz="932472" fontAlgn="base">
+              <a:lnSpc>
+                <a:spcPct val="90000"/>
+              </a:lnSpc>
+              <a:spcBef>
+                <a:spcPct val="0"/>
+              </a:spcBef>
+              <a:spcAft>
+                <a:spcPct val="0"/>
+              </a:spcAft>
+            </a:pPr>
+            <a:r>
+              <a:rPr lang="en-US" sz="2400" dirty="0">
+                <a:solidFill>
+                  <a:srgbClr val="E95EBE"/>
+                </a:solidFill>
+                <a:ea typeface="Segoe UI" pitchFamily="34" charset="0"/>
+                <a:cs typeface="Segoe UI" pitchFamily="34" charset="0"/>
+              </a:rPr>
+              <a:t>????????????????????????????</a:t>
+            </a:r>
+          </a:p>
+        </p:txBody>
+      </p:sp>
+    </p:spTree>
+    <p:extLst>
+      <p:ext uri="{BB962C8B-B14F-4D97-AF65-F5344CB8AC3E}">
+        <p14:creationId xmlns:p14="http://schemas.microsoft.com/office/powerpoint/2010/main" val="205074615"/>
+      </p:ext>
+    </p:extLst>
+  </p:cSld>
+  <p:clrMapOvr>
+    <a:masterClrMapping/>
+  </p:clrMapOvr>
+  <p:transition>
+    <p:fade/>
+  </p:transition>
+</p:sld>
+</file>
+
+<file path=ppt/slides/slide7.xml><?xml version="1.0" encoding="utf-8"?>
+<p:sld xmlns:a="http://schemas.openxmlformats.org/drawingml/2006/main" xmlns:r="http://schemas.openxmlformats.org/officeDocument/2006/relationships" xmlns:p="http://schemas.openxmlformats.org/presentationml/2006/main">
+  <p:cSld>
+    <p:spTree>
+      <p:nvGrpSpPr>
+        <p:cNvPr id="1" name=""/>
+        <p:cNvGrpSpPr/>
+        <p:nvPr/>
+      </p:nvGrpSpPr>
+      <p:grpSpPr>
+        <a:xfrm>
+          <a:off x="0" y="0"/>
+          <a:ext cx="0" cy="0"/>
+          <a:chOff x="0" y="0"/>
+          <a:chExt cx="0" cy="0"/>
+        </a:xfrm>
+      </p:grpSpPr>
+      <p:sp>
+        <p:nvSpPr>
+          <p:cNvPr id="2" name="Title 1"/>
+          <p:cNvSpPr>
+            <a:spLocks noGrp="1"/>
+          </p:cNvSpPr>
+          <p:nvPr>
+            <p:ph type="title"/>
+          </p:nvPr>
+        </p:nvSpPr>
+        <p:spPr/>
+        <p:txBody>
+          <a:bodyPr/>
+          <a:lstStyle/>
+          <a:p>
+            <a:r>
+              <a:rPr lang="en-US" dirty="0"/>
+              <a:t>Answer</a:t>
+            </a:r>
+          </a:p>
+        </p:txBody>
+      </p:sp>
+      <p:sp>
+        <p:nvSpPr>
+          <p:cNvPr id="3" name="Content Placeholder 2"/>
+          <p:cNvSpPr>
+            <a:spLocks noGrp="1"/>
+          </p:cNvSpPr>
+          <p:nvPr>
+            <p:ph idx="1"/>
+          </p:nvPr>
+        </p:nvSpPr>
+        <p:spPr/>
+        <p:txBody>
+          <a:bodyPr anchor="ctr">
+            <a:normAutofit/>
+          </a:bodyPr>
+          <a:lstStyle/>
+          <a:p>
+            <a:pPr marL="57150" indent="0">
+              <a:buNone/>
+            </a:pPr>
+            <a:r>
+              <a:rPr lang="en-US" sz="4800" dirty="0">
+                <a:solidFill>
+                  <a:srgbClr val="0000FF"/>
+                </a:solidFill>
+                <a:latin typeface="Consolas" panose="020B0609020204030204" pitchFamily="49" charset="0"/>
+              </a:rPr>
+              <a:t>function</a:t>
+            </a:r>
+            <a:r>
+              <a:rPr lang="en-US" sz="4800" dirty="0">
+                <a:solidFill>
+                  <a:srgbClr val="000000"/>
+                </a:solidFill>
+                <a:latin typeface="Consolas" panose="020B0609020204030204" pitchFamily="49" charset="0"/>
+              </a:rPr>
+              <a:t> </a:t>
+            </a:r>
+            <a:r>
+              <a:rPr lang="en-US" sz="4800" dirty="0" err="1">
+                <a:solidFill>
+                  <a:srgbClr val="000000"/>
+                </a:solidFill>
+                <a:latin typeface="Consolas" panose="020B0609020204030204" pitchFamily="49" charset="0"/>
+              </a:rPr>
+              <a:t>doSomething</a:t>
+            </a:r>
+            <a:r>
+              <a:rPr lang="en-US" sz="4800" dirty="0">
+                <a:solidFill>
+                  <a:srgbClr val="000000"/>
+                </a:solidFill>
+                <a:latin typeface="Consolas" panose="020B0609020204030204" pitchFamily="49" charset="0"/>
+              </a:rPr>
+              <a:t>() {</a:t>
+            </a:r>
+          </a:p>
+          <a:p>
+            <a:pPr marL="57150" indent="0">
+              <a:buNone/>
+            </a:pPr>
+            <a:r>
+              <a:rPr lang="en-US" sz="4800" dirty="0">
+                <a:solidFill>
+                  <a:srgbClr val="000000"/>
+                </a:solidFill>
+                <a:latin typeface="Consolas" panose="020B0609020204030204" pitchFamily="49" charset="0"/>
+              </a:rPr>
+              <a:t>    alert(</a:t>
+            </a:r>
+            <a:r>
+              <a:rPr lang="en-US" sz="4800" dirty="0">
+                <a:solidFill>
+                  <a:srgbClr val="A31515"/>
+                </a:solidFill>
+                <a:latin typeface="Consolas" panose="020B0609020204030204" pitchFamily="49" charset="0"/>
+              </a:rPr>
+              <a:t>"JS Code"</a:t>
+            </a:r>
+            <a:r>
+              <a:rPr lang="en-US" sz="4800" dirty="0">
+                <a:solidFill>
+                  <a:srgbClr val="000000"/>
+                </a:solidFill>
+                <a:latin typeface="Consolas" panose="020B0609020204030204" pitchFamily="49" charset="0"/>
+              </a:rPr>
+              <a:t>);</a:t>
+            </a:r>
+          </a:p>
+          <a:p>
+            <a:pPr marL="57150" indent="0">
+              <a:buNone/>
+            </a:pPr>
+            <a:r>
+              <a:rPr lang="en-US" sz="4800" dirty="0">
+                <a:solidFill>
+                  <a:srgbClr val="000000"/>
+                </a:solidFill>
+                <a:latin typeface="Consolas" panose="020B0609020204030204" pitchFamily="49" charset="0"/>
+              </a:rPr>
+              <a:t>}</a:t>
+            </a:r>
           </a:p>
         </p:txBody>
       </p:sp>
@@ -38645,13 +38186,6 @@
   <p:transition>
     <p:fade/>
   </p:transition>
-  <p:timing>
-    <p:tnLst>
-      <p:par>
-        <p:cTn id="1" dur="indefinite" restart="never" nodeType="tmRoot"/>
-      </p:par>
-    </p:tnLst>
-  </p:timing>
 </p:sld>
 </file>
 
@@ -38694,18 +38228,10 @@
           <a:p>
             <a:r>
               <a:rPr lang="en-US" dirty="0"/>
-              <a:t>4</a:t>
+              <a:t>4. Write the proper attribute to call a function named </a:t>
             </a:r>
             <a:r>
-              <a:rPr lang="en-US" dirty="0" smtClean="0"/>
-              <a:t>. Write </a:t>
-            </a:r>
-            <a:r>
-              <a:rPr lang="en-US" dirty="0" smtClean="0"/>
-              <a:t>the proper attribute to call a function named </a:t>
-            </a:r>
-            <a:r>
-              <a:rPr lang="en-US" sz="4000" cap="none" dirty="0" err="1" smtClean="0">
+              <a:rPr lang="en-US" sz="4000" cap="none" dirty="0" err="1">
                 <a:solidFill>
                   <a:schemeClr val="accent1">
                     <a:lumMod val="20000"/>
@@ -38717,10 +38243,9 @@
               <a:t>SendMessage</a:t>
             </a:r>
             <a:r>
-              <a:rPr lang="en-US" dirty="0" smtClean="0"/>
+              <a:rPr lang="en-US" dirty="0"/>
               <a:t> when a button is clicked</a:t>
             </a:r>
-            <a:endParaRPr lang="en-US" dirty="0"/>
           </a:p>
         </p:txBody>
       </p:sp>
@@ -38766,7 +38291,7 @@
               <a:t> </a:t>
             </a:r>
             <a:r>
-              <a:rPr lang="en-US" sz="4800" dirty="0" smtClean="0">
+              <a:rPr lang="en-US" sz="4800" dirty="0">
                 <a:solidFill>
                   <a:srgbClr val="CD3131"/>
                 </a:solidFill>
@@ -38775,7 +38300,7 @@
               <a:t>… </a:t>
             </a:r>
             <a:r>
-              <a:rPr lang="en-US" sz="4800" dirty="0" smtClean="0">
+              <a:rPr lang="en-US" sz="4800" dirty="0">
                 <a:solidFill>
                   <a:srgbClr val="800000"/>
                 </a:solidFill>
@@ -38876,7 +38401,7 @@
                 <a:spcPct val="0"/>
               </a:spcAft>
             </a:pPr>
-            <a:endParaRPr lang="en-US" sz="2400" dirty="0" err="1" smtClean="0">
+            <a:endParaRPr lang="en-US" sz="2400" dirty="0" err="1">
               <a:gradFill>
                 <a:gsLst>
                   <a:gs pos="0">
@@ -38925,7 +38450,7 @@
               </a:spcAft>
             </a:pPr>
             <a:r>
-              <a:rPr lang="en-US" sz="2400" dirty="0" smtClean="0">
+              <a:rPr lang="en-US" sz="2400" dirty="0">
                 <a:solidFill>
                   <a:schemeClr val="accent1"/>
                 </a:solidFill>
@@ -38948,13 +38473,6 @@
   <p:transition>
     <p:fade/>
   </p:transition>
-  <p:timing>
-    <p:tnLst>
-      <p:par>
-        <p:cTn id="1" dur="indefinite" restart="never" nodeType="tmRoot"/>
-      </p:par>
-    </p:tnLst>
-  </p:timing>
 </p:sld>
 </file>
 
@@ -38991,10 +38509,9 @@
           <a:lstStyle/>
           <a:p>
             <a:r>
-              <a:rPr lang="en-US" dirty="0" smtClean="0"/>
+              <a:rPr lang="en-US" dirty="0"/>
               <a:t>Answer</a:t>
             </a:r>
-            <a:endParaRPr lang="en-US" dirty="0"/>
           </a:p>
         </p:txBody>
       </p:sp>
@@ -39046,7 +38563,7 @@
               <a:t>onclick</a:t>
             </a:r>
             <a:r>
-              <a:rPr lang="en-US" sz="3200" dirty="0" smtClean="0">
+              <a:rPr lang="en-US" sz="3200" dirty="0">
                 <a:solidFill>
                   <a:srgbClr val="000000"/>
                 </a:solidFill>
@@ -39055,7 +38572,7 @@
               <a:t>=</a:t>
             </a:r>
             <a:r>
-              <a:rPr lang="en-US" sz="3200" dirty="0" smtClean="0">
+              <a:rPr lang="en-US" sz="3200" dirty="0">
                 <a:solidFill>
                   <a:srgbClr val="0000FF"/>
                 </a:solidFill>
@@ -39064,7 +38581,7 @@
               <a:t>"</a:t>
             </a:r>
             <a:r>
-              <a:rPr lang="en-US" sz="3200" dirty="0" err="1" smtClean="0">
+              <a:rPr lang="en-US" sz="3200" dirty="0" err="1">
                 <a:solidFill>
                   <a:srgbClr val="0000FF"/>
                 </a:solidFill>
@@ -39106,16 +38623,7 @@
                 </a:solidFill>
                 <a:latin typeface="Consolas" panose="020B0609020204030204" pitchFamily="49" charset="0"/>
               </a:rPr>
-              <a:t>&lt;/button</a:t>
-            </a:r>
-            <a:r>
-              <a:rPr lang="en-US" sz="3200" dirty="0" smtClean="0">
-                <a:solidFill>
-                  <a:srgbClr val="800000"/>
-                </a:solidFill>
-                <a:latin typeface="Consolas" panose="020B0609020204030204" pitchFamily="49" charset="0"/>
-              </a:rPr>
-              <a:t>&gt;</a:t>
+              <a:t>&lt;/button&gt;</a:t>
             </a:r>
           </a:p>
           <a:p>
@@ -39194,7 +38702,7 @@
                 <a:spcPct val="0"/>
               </a:spcAft>
             </a:pPr>
-            <a:endParaRPr lang="en-US" sz="2400" dirty="0" err="1" smtClean="0">
+            <a:endParaRPr lang="en-US" sz="2400" dirty="0" err="1">
               <a:gradFill>
                 <a:gsLst>
                   <a:gs pos="0">
@@ -39225,13 +38733,6 @@
   <p:transition>
     <p:fade/>
   </p:transition>
-  <p:timing>
-    <p:tnLst>
-      <p:par>
-        <p:cTn id="1" dur="indefinite" restart="never" nodeType="tmRoot"/>
-      </p:par>
-    </p:tnLst>
-  </p:timing>
 </p:sld>
 </file>
 

</xml_diff>